<commit_message>
add optimum targeting effect
</commit_message>
<xml_diff>
--- a/targeting.pptx
+++ b/targeting.pptx
@@ -6,6 +6,7 @@
   </p:sldMasterIdLst>
   <p:sldIdLst>
     <p:sldId id="256" r:id="rId2"/>
+    <p:sldId id="257" r:id="rId3"/>
   </p:sldIdLst>
   <p:sldSz cx="9144000" cy="5143500" type="screen16x9"/>
   <p:notesSz cx="6858000" cy="9144000"/>
@@ -3172,6 +3173,1177 @@
           </a:p>
         </p:txBody>
       </p:sp>
+    </p:spTree>
+  </p:cSld>
+</p:sld>
+</file>
+
+<file path=ppt/slides/slide2.xml><?xml version="1.0" encoding="utf-8"?>
+<p:sld xmlns:a="http://schemas.openxmlformats.org/drawingml/2006/main" xmlns:r="http://schemas.openxmlformats.org/officeDocument/2006/relationships" xmlns:p="http://schemas.openxmlformats.org/presentationml/2006/main">
+  <p:cSld>
+    <p:spTree>
+      <p:nvGrpSpPr>
+        <p:cNvPr id="1" name=""/>
+        <p:cNvGrpSpPr/>
+        <p:nvPr/>
+      </p:nvGrpSpPr>
+      <p:grpSpPr>
+        <a:xfrm>
+          <a:off x="0" y="0"/>
+          <a:ext cx="0" cy="0"/>
+          <a:chOff x="0" y="0"/>
+          <a:chExt cx="0" cy="0"/>
+        </a:xfrm>
+      </p:grpSpPr>
+      <p:sp>
+        <p:nvSpPr>
+          <p:cNvPr id="2" name="Title 1"/>
+          <p:cNvSpPr>
+            <a:spLocks noGrp="1"/>
+          </p:cNvSpPr>
+          <p:nvPr>
+            <p:ph type="title"/>
+          </p:nvPr>
+        </p:nvSpPr>
+        <p:spPr/>
+        <p:txBody>
+          <a:bodyPr/>
+          <a:lstStyle/>
+          <a:p>
+            <a:pPr lvl="0" indent="0" marL="0">
+              <a:buNone/>
+            </a:pPr>
+            <a:r>
+              <a:rPr/>
+              <a:t>一律介入と最適ターゲティングの効果</a:t>
+            </a:r>
+          </a:p>
+        </p:txBody>
+      </p:sp>
+      <p:sp>
+        <p:nvSpPr>
+          <p:cNvPr id="3" name="Content Placeholder 2"/>
+          <p:cNvSpPr>
+            <a:spLocks noGrp="1"/>
+          </p:cNvSpPr>
+          <p:nvPr>
+            <p:ph idx="1"/>
+          </p:nvPr>
+        </p:nvSpPr>
+        <p:spPr/>
+        <p:txBody>
+          <a:bodyPr/>
+          <a:lstStyle/>
+          <a:p>
+            <a:pPr lvl="0" indent="0" marL="0">
+              <a:buNone/>
+            </a:pPr>
+            <a:r>
+              <a:rPr/>
+              <a:t>アウトカム：返信時に提供意向を示したかどうか</a:t>
+            </a:r>
+          </a:p>
+        </p:txBody>
+      </p:sp>
+      <p:graphicFrame xmlns:a="http://schemas.openxmlformats.org/drawingml/2006/main" xmlns:r="http://schemas.openxmlformats.org/officeDocument/2006/relationships" xmlns:p="http://schemas.openxmlformats.org/presentationml/2006/main">
+        <p:nvGraphicFramePr>
+          <p:cNvPr id="322076925" name=""/>
+          <p:cNvGraphicFramePr>
+            <a:graphicFrameLocks noGrp="true"/>
+          </p:cNvGraphicFramePr>
+          <p:nvPr/>
+        </p:nvGraphicFramePr>
+        <p:xfrm rot="0">
+          <a:off x="914400" y="1828800"/>
+          <a:ext cx="9144000" cy="5486400"/>
+        </p:xfrm>
+        <a:graphic>
+          <a:graphicData uri="http://schemas.openxmlformats.org/drawingml/2006/table">
+            <a:tbl>
+              <a:tblPr/>
+              <a:tblGrid>
+                <a:gridCol w="1828800"/>
+                <a:gridCol w="914400"/>
+                <a:gridCol w="914400"/>
+              </a:tblGrid>
+              <a:tr h="228600">
+                <a:tc>
+                  <a:txBody>
+                    <a:bodyPr/>
+                    <a:lstStyle/>
+                    <a:p>
+                      <a:pPr algn="l" marL="63500" marR="63500">
+                        <a:lnSpc>
+                          <a:spcPct val="100000"/>
+                        </a:lnSpc>
+                        <a:spcBef>
+                          <a:spcPts val="500"/>
+                        </a:spcBef>
+                        <a:spcAft>
+                          <a:spcPts val="500"/>
+                        </a:spcAft>
+                        <a:buNone/>
+                      </a:pPr>
+                      <a:r>
+                        <a:rPr cap="none" sz="1100" i="0" b="0" u="none">
+                          <a:solidFill>
+                            <a:srgbClr val="000000">
+                              <a:alpha val="100000"/>
+                            </a:srgbClr>
+                          </a:solidFill>
+                          <a:latin typeface="Arial"/>
+                          <a:cs typeface="Arial"/>
+                          <a:ea typeface="Arial"/>
+                          <a:sym typeface="Arial"/>
+                        </a:rPr>
+                        <a:t/>
+                      </a:r>
+                    </a:p>
+                  </a:txBody>
+                  <a:tcPr anchor="ctr" marB="63500" marT="63500" marR="0" marL="0">
+                    <a:lnL algn="ctr" cmpd="sng" cap="flat" w="0">
+                      <a:noFill/>
+                      <a:prstDash val="solid"/>
+                    </a:lnL>
+                    <a:lnR algn="ctr" cmpd="sng" cap="flat" w="0">
+                      <a:noFill/>
+                      <a:prstDash val="solid"/>
+                    </a:lnR>
+                    <a:lnT algn="ctr" cmpd="sng" cap="flat" w="12700">
+                      <a:solidFill>
+                        <a:srgbClr val="000000">
+                          <a:alpha val="100000"/>
+                        </a:srgbClr>
+                      </a:solidFill>
+                      <a:prstDash val="solid"/>
+                    </a:lnT>
+                    <a:lnB algn="ctr" cmpd="sng" cap="flat" w="0">
+                      <a:noFill/>
+                      <a:prstDash val="solid"/>
+                    </a:lnB>
+                    <a:solidFill>
+                      <a:srgbClr val="FFFFFF">
+                        <a:alpha val="0"/>
+                      </a:srgbClr>
+                    </a:solidFill>
+                  </a:tcPr>
+                </a:tc>
+                <a:tc gridSpan="2">
+                  <a:txBody>
+                    <a:bodyPr/>
+                    <a:lstStyle/>
+                    <a:p>
+                      <a:pPr algn="ctr" marL="63500" marR="63500">
+                        <a:lnSpc>
+                          <a:spcPct val="100000"/>
+                        </a:lnSpc>
+                        <a:spcBef>
+                          <a:spcPts val="500"/>
+                        </a:spcBef>
+                        <a:spcAft>
+                          <a:spcPts val="500"/>
+                        </a:spcAft>
+                        <a:buNone/>
+                      </a:pPr>
+                      <a:r>
+                        <a:rPr cap="none" sz="1100" i="0" b="0" u="none">
+                          <a:solidFill>
+                            <a:srgbClr val="000000">
+                              <a:alpha val="100000"/>
+                            </a:srgbClr>
+                          </a:solidFill>
+                          <a:latin typeface="Arial"/>
+                          <a:cs typeface="Arial"/>
+                          <a:ea typeface="Arial"/>
+                          <a:sym typeface="Arial"/>
+                        </a:rPr>
+                        <a:t>Predicted treatment effect</a:t>
+                      </a:r>
+                    </a:p>
+                  </a:txBody>
+                  <a:tcPr anchor="ctr" marB="63500" marT="63500" marR="0" marL="0">
+                    <a:lnL algn="ctr" cmpd="sng" cap="flat" w="0">
+                      <a:noFill/>
+                      <a:prstDash val="solid"/>
+                    </a:lnL>
+                    <a:lnR algn="ctr" cmpd="sng" cap="flat" w="0">
+                      <a:noFill/>
+                      <a:prstDash val="solid"/>
+                    </a:lnR>
+                    <a:lnT algn="ctr" cmpd="sng" cap="flat" w="12700">
+                      <a:solidFill>
+                        <a:srgbClr val="000000">
+                          <a:alpha val="100000"/>
+                        </a:srgbClr>
+                      </a:solidFill>
+                      <a:prstDash val="solid"/>
+                    </a:lnT>
+                    <a:lnB algn="ctr" cmpd="sng" cap="flat" w="0">
+                      <a:noFill/>
+                      <a:prstDash val="solid"/>
+                    </a:lnB>
+                    <a:solidFill>
+                      <a:srgbClr val="FFFFFF">
+                        <a:alpha val="0"/>
+                      </a:srgbClr>
+                    </a:solidFill>
+                  </a:tcPr>
+                </a:tc>
+                <a:tc hMerge="true">
+                  <a:txBody>
+                    <a:bodyPr/>
+                    <a:lstStyle/>
+                    <a:p>
+                      <a:pPr algn="ctr" marL="63500" marR="63500">
+                        <a:lnSpc>
+                          <a:spcPct val="100000"/>
+                        </a:lnSpc>
+                        <a:spcBef>
+                          <a:spcPts val="500"/>
+                        </a:spcBef>
+                        <a:spcAft>
+                          <a:spcPts val="500"/>
+                        </a:spcAft>
+                        <a:buNone/>
+                      </a:pPr>
+                      <a:r>
+                        <a:rPr cap="none" sz="1100" i="0" b="0" u="none">
+                          <a:solidFill>
+                            <a:srgbClr val="000000">
+                              <a:alpha val="100000"/>
+                            </a:srgbClr>
+                          </a:solidFill>
+                          <a:latin typeface="Arial"/>
+                          <a:cs typeface="Arial"/>
+                          <a:ea typeface="Arial"/>
+                          <a:sym typeface="Arial"/>
+                        </a:rPr>
+                        <a:t>Predicted treatment effect</a:t>
+                      </a:r>
+                    </a:p>
+                  </a:txBody>
+                  <a:tcPr anchor="ctr" marB="63500" marT="63500" marR="0" marL="0">
+                    <a:lnL algn="ctr" cmpd="sng" cap="flat" w="0">
+                      <a:noFill/>
+                      <a:prstDash val="solid"/>
+                    </a:lnL>
+                    <a:lnR algn="ctr" cmpd="sng" cap="flat" w="0">
+                      <a:noFill/>
+                      <a:prstDash val="solid"/>
+                    </a:lnR>
+                    <a:lnT algn="ctr" cmpd="sng" cap="flat" w="12700">
+                      <a:solidFill>
+                        <a:srgbClr val="000000">
+                          <a:alpha val="100000"/>
+                        </a:srgbClr>
+                      </a:solidFill>
+                      <a:prstDash val="solid"/>
+                    </a:lnT>
+                    <a:lnB algn="ctr" cmpd="sng" cap="flat" w="0">
+                      <a:noFill/>
+                      <a:prstDash val="solid"/>
+                    </a:lnB>
+                    <a:solidFill>
+                      <a:srgbClr val="FFFFFF">
+                        <a:alpha val="0"/>
+                      </a:srgbClr>
+                    </a:solidFill>
+                  </a:tcPr>
+                </a:tc>
+              </a:tr>
+              <a:tr h="228600">
+                <a:tc>
+                  <a:txBody>
+                    <a:bodyPr/>
+                    <a:lstStyle/>
+                    <a:p>
+                      <a:pPr algn="l" marL="63500" marR="63500">
+                        <a:lnSpc>
+                          <a:spcPct val="100000"/>
+                        </a:lnSpc>
+                        <a:spcBef>
+                          <a:spcPts val="500"/>
+                        </a:spcBef>
+                        <a:spcAft>
+                          <a:spcPts val="500"/>
+                        </a:spcAft>
+                        <a:buNone/>
+                      </a:pPr>
+                      <a:r>
+                        <a:rPr cap="none" sz="1100" i="0" b="0" u="none">
+                          <a:solidFill>
+                            <a:srgbClr val="000000">
+                              <a:alpha val="100000"/>
+                            </a:srgbClr>
+                          </a:solidFill>
+                          <a:latin typeface="Arial"/>
+                          <a:cs typeface="Arial"/>
+                          <a:ea typeface="Arial"/>
+                          <a:sym typeface="Arial"/>
+                        </a:rPr>
+                        <a:t> </a:t>
+                      </a:r>
+                    </a:p>
+                  </a:txBody>
+                  <a:tcPr anchor="ctr" marB="63500" marT="63500" marR="0" marL="0">
+                    <a:lnL algn="ctr" cmpd="sng" cap="flat" w="0">
+                      <a:noFill/>
+                      <a:prstDash val="solid"/>
+                    </a:lnL>
+                    <a:lnR algn="ctr" cmpd="sng" cap="flat" w="0">
+                      <a:noFill/>
+                      <a:prstDash val="solid"/>
+                    </a:lnR>
+                    <a:lnT algn="ctr" cmpd="sng" cap="flat" w="0">
+                      <a:noFill/>
+                      <a:prstDash val="solid"/>
+                    </a:lnT>
+                    <a:lnB algn="ctr" cmpd="sng" cap="flat" w="12700">
+                      <a:solidFill>
+                        <a:srgbClr val="000000">
+                          <a:alpha val="100000"/>
+                        </a:srgbClr>
+                      </a:solidFill>
+                      <a:prstDash val="solid"/>
+                    </a:lnB>
+                    <a:solidFill>
+                      <a:srgbClr val="FFFFFF">
+                        <a:alpha val="0"/>
+                      </a:srgbClr>
+                    </a:solidFill>
+                  </a:tcPr>
+                </a:tc>
+                <a:tc>
+                  <a:txBody>
+                    <a:bodyPr/>
+                    <a:lstStyle/>
+                    <a:p>
+                      <a:pPr algn="ctr" marL="63500" marR="63500">
+                        <a:lnSpc>
+                          <a:spcPct val="100000"/>
+                        </a:lnSpc>
+                        <a:spcBef>
+                          <a:spcPts val="500"/>
+                        </a:spcBef>
+                        <a:spcAft>
+                          <a:spcPts val="500"/>
+                        </a:spcAft>
+                        <a:buNone/>
+                      </a:pPr>
+                      <a:r>
+                        <a:rPr cap="none" sz="1100" i="0" b="0" u="none">
+                          <a:solidFill>
+                            <a:srgbClr val="000000">
+                              <a:alpha val="100000"/>
+                            </a:srgbClr>
+                          </a:solidFill>
+                          <a:latin typeface="Arial"/>
+                          <a:cs typeface="Arial"/>
+                          <a:ea typeface="Arial"/>
+                          <a:sym typeface="Arial"/>
+                        </a:rPr>
+                        <a:t>Mean</a:t>
+                      </a:r>
+                    </a:p>
+                  </a:txBody>
+                  <a:tcPr anchor="ctr" marB="63500" marT="63500" marR="0" marL="0">
+                    <a:lnL algn="ctr" cmpd="sng" cap="flat" w="0">
+                      <a:noFill/>
+                      <a:prstDash val="solid"/>
+                    </a:lnL>
+                    <a:lnR algn="ctr" cmpd="sng" cap="flat" w="0">
+                      <a:noFill/>
+                      <a:prstDash val="solid"/>
+                    </a:lnR>
+                    <a:lnT algn="ctr" cmpd="sng" cap="flat" w="0">
+                      <a:noFill/>
+                      <a:prstDash val="solid"/>
+                    </a:lnT>
+                    <a:lnB algn="ctr" cmpd="sng" cap="flat" w="12700">
+                      <a:solidFill>
+                        <a:srgbClr val="000000">
+                          <a:alpha val="100000"/>
+                        </a:srgbClr>
+                      </a:solidFill>
+                      <a:prstDash val="solid"/>
+                    </a:lnB>
+                    <a:solidFill>
+                      <a:srgbClr val="FFFFFF">
+                        <a:alpha val="0"/>
+                      </a:srgbClr>
+                    </a:solidFill>
+                  </a:tcPr>
+                </a:tc>
+                <a:tc>
+                  <a:txBody>
+                    <a:bodyPr/>
+                    <a:lstStyle/>
+                    <a:p>
+                      <a:pPr algn="ctr" marL="63500" marR="63500">
+                        <a:lnSpc>
+                          <a:spcPct val="100000"/>
+                        </a:lnSpc>
+                        <a:spcBef>
+                          <a:spcPts val="500"/>
+                        </a:spcBef>
+                        <a:spcAft>
+                          <a:spcPts val="500"/>
+                        </a:spcAft>
+                        <a:buNone/>
+                      </a:pPr>
+                      <a:r>
+                        <a:rPr cap="none" sz="1100" i="0" b="0" u="none">
+                          <a:solidFill>
+                            <a:srgbClr val="000000">
+                              <a:alpha val="100000"/>
+                            </a:srgbClr>
+                          </a:solidFill>
+                          <a:latin typeface="Arial"/>
+                          <a:cs typeface="Arial"/>
+                          <a:ea typeface="Arial"/>
+                          <a:sym typeface="Arial"/>
+                        </a:rPr>
+                        <a:t>SD</a:t>
+                      </a:r>
+                    </a:p>
+                  </a:txBody>
+                  <a:tcPr anchor="ctr" marB="63500" marT="63500" marR="0" marL="0">
+                    <a:lnL algn="ctr" cmpd="sng" cap="flat" w="0">
+                      <a:noFill/>
+                      <a:prstDash val="solid"/>
+                    </a:lnL>
+                    <a:lnR algn="ctr" cmpd="sng" cap="flat" w="0">
+                      <a:noFill/>
+                      <a:prstDash val="solid"/>
+                    </a:lnR>
+                    <a:lnT algn="ctr" cmpd="sng" cap="flat" w="0">
+                      <a:noFill/>
+                      <a:prstDash val="solid"/>
+                    </a:lnT>
+                    <a:lnB algn="ctr" cmpd="sng" cap="flat" w="12700">
+                      <a:solidFill>
+                        <a:srgbClr val="000000">
+                          <a:alpha val="100000"/>
+                        </a:srgbClr>
+                      </a:solidFill>
+                      <a:prstDash val="solid"/>
+                    </a:lnB>
+                    <a:solidFill>
+                      <a:srgbClr val="FFFFFF">
+                        <a:alpha val="0"/>
+                      </a:srgbClr>
+                    </a:solidFill>
+                  </a:tcPr>
+                </a:tc>
+              </a:tr>
+              <a:tr h="228600">
+                <a:tc>
+                  <a:txBody>
+                    <a:bodyPr/>
+                    <a:lstStyle/>
+                    <a:p>
+                      <a:pPr algn="l" marL="63500" marR="63500">
+                        <a:lnSpc>
+                          <a:spcPct val="100000"/>
+                        </a:lnSpc>
+                        <a:spcBef>
+                          <a:spcPts val="500"/>
+                        </a:spcBef>
+                        <a:spcAft>
+                          <a:spcPts val="500"/>
+                        </a:spcAft>
+                        <a:buNone/>
+                      </a:pPr>
+                      <a:r>
+                        <a:rPr cap="none" sz="1100" i="0" b="0" u="none">
+                          <a:solidFill>
+                            <a:srgbClr val="000000">
+                              <a:alpha val="100000"/>
+                            </a:srgbClr>
+                          </a:solidFill>
+                          <a:latin typeface="Arial"/>
+                          <a:cs typeface="Arial"/>
+                          <a:ea typeface="Arial"/>
+                          <a:sym typeface="Arial"/>
+                        </a:rPr>
+                        <a:t>Treatment B (uniform)</a:t>
+                      </a:r>
+                    </a:p>
+                  </a:txBody>
+                  <a:tcPr anchor="ctr" marB="63500" marT="63500" marR="0" marL="0">
+                    <a:lnL algn="ctr" cmpd="sng" cap="flat" w="0">
+                      <a:noFill/>
+                      <a:prstDash val="solid"/>
+                    </a:lnL>
+                    <a:lnR algn="ctr" cmpd="sng" cap="flat" w="0">
+                      <a:noFill/>
+                      <a:prstDash val="solid"/>
+                    </a:lnR>
+                    <a:lnT algn="ctr" cmpd="sng" cap="flat" w="0">
+                      <a:noFill/>
+                      <a:prstDash val="solid"/>
+                    </a:lnT>
+                    <a:lnB algn="ctr" cmpd="sng" cap="flat" w="0">
+                      <a:noFill/>
+                      <a:prstDash val="solid"/>
+                    </a:lnB>
+                    <a:solidFill>
+                      <a:srgbClr val="FFFFFF">
+                        <a:alpha val="0"/>
+                      </a:srgbClr>
+                    </a:solidFill>
+                  </a:tcPr>
+                </a:tc>
+                <a:tc>
+                  <a:txBody>
+                    <a:bodyPr/>
+                    <a:lstStyle/>
+                    <a:p>
+                      <a:pPr algn="ctr" marL="63500" marR="63500">
+                        <a:lnSpc>
+                          <a:spcPct val="100000"/>
+                        </a:lnSpc>
+                        <a:spcBef>
+                          <a:spcPts val="500"/>
+                        </a:spcBef>
+                        <a:spcAft>
+                          <a:spcPts val="500"/>
+                        </a:spcAft>
+                        <a:buNone/>
+                      </a:pPr>
+                      <a:r>
+                        <a:rPr cap="none" sz="1100" i="0" b="0" u="none">
+                          <a:solidFill>
+                            <a:srgbClr val="000000">
+                              <a:alpha val="100000"/>
+                            </a:srgbClr>
+                          </a:solidFill>
+                          <a:latin typeface="Arial"/>
+                          <a:cs typeface="Arial"/>
+                          <a:ea typeface="Arial"/>
+                          <a:sym typeface="Arial"/>
+                        </a:rPr>
+                        <a:t>0.0206</a:t>
+                      </a:r>
+                    </a:p>
+                  </a:txBody>
+                  <a:tcPr anchor="ctr" marB="63500" marT="63500" marR="0" marL="0">
+                    <a:lnL algn="ctr" cmpd="sng" cap="flat" w="0">
+                      <a:noFill/>
+                      <a:prstDash val="solid"/>
+                    </a:lnL>
+                    <a:lnR algn="ctr" cmpd="sng" cap="flat" w="0">
+                      <a:noFill/>
+                      <a:prstDash val="solid"/>
+                    </a:lnR>
+                    <a:lnT algn="ctr" cmpd="sng" cap="flat" w="0">
+                      <a:noFill/>
+                      <a:prstDash val="solid"/>
+                    </a:lnT>
+                    <a:lnB algn="ctr" cmpd="sng" cap="flat" w="0">
+                      <a:noFill/>
+                      <a:prstDash val="solid"/>
+                    </a:lnB>
+                    <a:solidFill>
+                      <a:srgbClr val="FFFFFF">
+                        <a:alpha val="0"/>
+                      </a:srgbClr>
+                    </a:solidFill>
+                  </a:tcPr>
+                </a:tc>
+                <a:tc>
+                  <a:txBody>
+                    <a:bodyPr/>
+                    <a:lstStyle/>
+                    <a:p>
+                      <a:pPr algn="ctr" marL="63500" marR="63500">
+                        <a:lnSpc>
+                          <a:spcPct val="100000"/>
+                        </a:lnSpc>
+                        <a:spcBef>
+                          <a:spcPts val="500"/>
+                        </a:spcBef>
+                        <a:spcAft>
+                          <a:spcPts val="500"/>
+                        </a:spcAft>
+                        <a:buNone/>
+                      </a:pPr>
+                      <a:r>
+                        <a:rPr cap="none" sz="1100" i="0" b="0" u="none">
+                          <a:solidFill>
+                            <a:srgbClr val="000000">
+                              <a:alpha val="100000"/>
+                            </a:srgbClr>
+                          </a:solidFill>
+                          <a:latin typeface="Arial"/>
+                          <a:cs typeface="Arial"/>
+                          <a:ea typeface="Arial"/>
+                          <a:sym typeface="Arial"/>
+                        </a:rPr>
+                        <a:t>0.0570</a:t>
+                      </a:r>
+                    </a:p>
+                  </a:txBody>
+                  <a:tcPr anchor="ctr" marB="63500" marT="63500" marR="0" marL="0">
+                    <a:lnL algn="ctr" cmpd="sng" cap="flat" w="0">
+                      <a:noFill/>
+                      <a:prstDash val="solid"/>
+                    </a:lnL>
+                    <a:lnR algn="ctr" cmpd="sng" cap="flat" w="0">
+                      <a:noFill/>
+                      <a:prstDash val="solid"/>
+                    </a:lnR>
+                    <a:lnT algn="ctr" cmpd="sng" cap="flat" w="0">
+                      <a:noFill/>
+                      <a:prstDash val="solid"/>
+                    </a:lnT>
+                    <a:lnB algn="ctr" cmpd="sng" cap="flat" w="0">
+                      <a:noFill/>
+                      <a:prstDash val="solid"/>
+                    </a:lnB>
+                    <a:solidFill>
+                      <a:srgbClr val="FFFFFF">
+                        <a:alpha val="0"/>
+                      </a:srgbClr>
+                    </a:solidFill>
+                  </a:tcPr>
+                </a:tc>
+              </a:tr>
+              <a:tr h="228600">
+                <a:tc>
+                  <a:txBody>
+                    <a:bodyPr/>
+                    <a:lstStyle/>
+                    <a:p>
+                      <a:pPr algn="l" marL="63500" marR="63500">
+                        <a:lnSpc>
+                          <a:spcPct val="100000"/>
+                        </a:lnSpc>
+                        <a:spcBef>
+                          <a:spcPts val="500"/>
+                        </a:spcBef>
+                        <a:spcAft>
+                          <a:spcPts val="500"/>
+                        </a:spcAft>
+                        <a:buNone/>
+                      </a:pPr>
+                      <a:r>
+                        <a:rPr cap="none" sz="1100" i="0" b="0" u="none">
+                          <a:solidFill>
+                            <a:srgbClr val="000000">
+                              <a:alpha val="100000"/>
+                            </a:srgbClr>
+                          </a:solidFill>
+                          <a:latin typeface="Arial"/>
+                          <a:cs typeface="Arial"/>
+                          <a:ea typeface="Arial"/>
+                          <a:sym typeface="Arial"/>
+                        </a:rPr>
+                        <a:t>Treatment C (uniform)</a:t>
+                      </a:r>
+                    </a:p>
+                  </a:txBody>
+                  <a:tcPr anchor="ctr" marB="63500" marT="63500" marR="0" marL="0">
+                    <a:lnL algn="ctr" cmpd="sng" cap="flat" w="0">
+                      <a:noFill/>
+                      <a:prstDash val="solid"/>
+                    </a:lnL>
+                    <a:lnR algn="ctr" cmpd="sng" cap="flat" w="0">
+                      <a:noFill/>
+                      <a:prstDash val="solid"/>
+                    </a:lnR>
+                    <a:lnT algn="ctr" cmpd="sng" cap="flat" w="0">
+                      <a:noFill/>
+                      <a:prstDash val="solid"/>
+                    </a:lnT>
+                    <a:lnB algn="ctr" cmpd="sng" cap="flat" w="0">
+                      <a:noFill/>
+                      <a:prstDash val="solid"/>
+                    </a:lnB>
+                    <a:solidFill>
+                      <a:srgbClr val="FFFFFF">
+                        <a:alpha val="0"/>
+                      </a:srgbClr>
+                    </a:solidFill>
+                  </a:tcPr>
+                </a:tc>
+                <a:tc>
+                  <a:txBody>
+                    <a:bodyPr/>
+                    <a:lstStyle/>
+                    <a:p>
+                      <a:pPr algn="ctr" marL="63500" marR="63500">
+                        <a:lnSpc>
+                          <a:spcPct val="100000"/>
+                        </a:lnSpc>
+                        <a:spcBef>
+                          <a:spcPts val="500"/>
+                        </a:spcBef>
+                        <a:spcAft>
+                          <a:spcPts val="500"/>
+                        </a:spcAft>
+                        <a:buNone/>
+                      </a:pPr>
+                      <a:r>
+                        <a:rPr cap="none" sz="1100" i="0" b="0" u="none">
+                          <a:solidFill>
+                            <a:srgbClr val="000000">
+                              <a:alpha val="100000"/>
+                            </a:srgbClr>
+                          </a:solidFill>
+                          <a:latin typeface="Arial"/>
+                          <a:cs typeface="Arial"/>
+                          <a:ea typeface="Arial"/>
+                          <a:sym typeface="Arial"/>
+                        </a:rPr>
+                        <a:t>-0.0019</a:t>
+                      </a:r>
+                    </a:p>
+                  </a:txBody>
+                  <a:tcPr anchor="ctr" marB="63500" marT="63500" marR="0" marL="0">
+                    <a:lnL algn="ctr" cmpd="sng" cap="flat" w="0">
+                      <a:noFill/>
+                      <a:prstDash val="solid"/>
+                    </a:lnL>
+                    <a:lnR algn="ctr" cmpd="sng" cap="flat" w="0">
+                      <a:noFill/>
+                      <a:prstDash val="solid"/>
+                    </a:lnR>
+                    <a:lnT algn="ctr" cmpd="sng" cap="flat" w="0">
+                      <a:noFill/>
+                      <a:prstDash val="solid"/>
+                    </a:lnT>
+                    <a:lnB algn="ctr" cmpd="sng" cap="flat" w="0">
+                      <a:noFill/>
+                      <a:prstDash val="solid"/>
+                    </a:lnB>
+                    <a:solidFill>
+                      <a:srgbClr val="FFFFFF">
+                        <a:alpha val="0"/>
+                      </a:srgbClr>
+                    </a:solidFill>
+                  </a:tcPr>
+                </a:tc>
+                <a:tc>
+                  <a:txBody>
+                    <a:bodyPr/>
+                    <a:lstStyle/>
+                    <a:p>
+                      <a:pPr algn="ctr" marL="63500" marR="63500">
+                        <a:lnSpc>
+                          <a:spcPct val="100000"/>
+                        </a:lnSpc>
+                        <a:spcBef>
+                          <a:spcPts val="500"/>
+                        </a:spcBef>
+                        <a:spcAft>
+                          <a:spcPts val="500"/>
+                        </a:spcAft>
+                        <a:buNone/>
+                      </a:pPr>
+                      <a:r>
+                        <a:rPr cap="none" sz="1100" i="0" b="0" u="none">
+                          <a:solidFill>
+                            <a:srgbClr val="000000">
+                              <a:alpha val="100000"/>
+                            </a:srgbClr>
+                          </a:solidFill>
+                          <a:latin typeface="Arial"/>
+                          <a:cs typeface="Arial"/>
+                          <a:ea typeface="Arial"/>
+                          <a:sym typeface="Arial"/>
+                        </a:rPr>
+                        <a:t>0.0598</a:t>
+                      </a:r>
+                    </a:p>
+                  </a:txBody>
+                  <a:tcPr anchor="ctr" marB="63500" marT="63500" marR="0" marL="0">
+                    <a:lnL algn="ctr" cmpd="sng" cap="flat" w="0">
+                      <a:noFill/>
+                      <a:prstDash val="solid"/>
+                    </a:lnL>
+                    <a:lnR algn="ctr" cmpd="sng" cap="flat" w="0">
+                      <a:noFill/>
+                      <a:prstDash val="solid"/>
+                    </a:lnR>
+                    <a:lnT algn="ctr" cmpd="sng" cap="flat" w="0">
+                      <a:noFill/>
+                      <a:prstDash val="solid"/>
+                    </a:lnT>
+                    <a:lnB algn="ctr" cmpd="sng" cap="flat" w="0">
+                      <a:noFill/>
+                      <a:prstDash val="solid"/>
+                    </a:lnB>
+                    <a:solidFill>
+                      <a:srgbClr val="FFFFFF">
+                        <a:alpha val="0"/>
+                      </a:srgbClr>
+                    </a:solidFill>
+                  </a:tcPr>
+                </a:tc>
+              </a:tr>
+              <a:tr h="228600">
+                <a:tc>
+                  <a:txBody>
+                    <a:bodyPr/>
+                    <a:lstStyle/>
+                    <a:p>
+                      <a:pPr algn="l" marL="63500" marR="63500">
+                        <a:lnSpc>
+                          <a:spcPct val="100000"/>
+                        </a:lnSpc>
+                        <a:spcBef>
+                          <a:spcPts val="500"/>
+                        </a:spcBef>
+                        <a:spcAft>
+                          <a:spcPts val="500"/>
+                        </a:spcAft>
+                        <a:buNone/>
+                      </a:pPr>
+                      <a:r>
+                        <a:rPr cap="none" sz="1100" i="0" b="0" u="none">
+                          <a:solidFill>
+                            <a:srgbClr val="000000">
+                              <a:alpha val="100000"/>
+                            </a:srgbClr>
+                          </a:solidFill>
+                          <a:latin typeface="Arial"/>
+                          <a:cs typeface="Arial"/>
+                          <a:ea typeface="Arial"/>
+                          <a:sym typeface="Arial"/>
+                        </a:rPr>
+                        <a:t>Treatment D (uniform)</a:t>
+                      </a:r>
+                    </a:p>
+                  </a:txBody>
+                  <a:tcPr anchor="ctr" marB="63500" marT="63500" marR="0" marL="0">
+                    <a:lnL algn="ctr" cmpd="sng" cap="flat" w="0">
+                      <a:noFill/>
+                      <a:prstDash val="solid"/>
+                    </a:lnL>
+                    <a:lnR algn="ctr" cmpd="sng" cap="flat" w="0">
+                      <a:noFill/>
+                      <a:prstDash val="solid"/>
+                    </a:lnR>
+                    <a:lnT algn="ctr" cmpd="sng" cap="flat" w="0">
+                      <a:noFill/>
+                      <a:prstDash val="solid"/>
+                    </a:lnT>
+                    <a:lnB algn="ctr" cmpd="sng" cap="flat" w="0">
+                      <a:noFill/>
+                      <a:prstDash val="solid"/>
+                    </a:lnB>
+                    <a:solidFill>
+                      <a:srgbClr val="FFFFFF">
+                        <a:alpha val="0"/>
+                      </a:srgbClr>
+                    </a:solidFill>
+                  </a:tcPr>
+                </a:tc>
+                <a:tc>
+                  <a:txBody>
+                    <a:bodyPr/>
+                    <a:lstStyle/>
+                    <a:p>
+                      <a:pPr algn="ctr" marL="63500" marR="63500">
+                        <a:lnSpc>
+                          <a:spcPct val="100000"/>
+                        </a:lnSpc>
+                        <a:spcBef>
+                          <a:spcPts val="500"/>
+                        </a:spcBef>
+                        <a:spcAft>
+                          <a:spcPts val="500"/>
+                        </a:spcAft>
+                        <a:buNone/>
+                      </a:pPr>
+                      <a:r>
+                        <a:rPr cap="none" sz="1100" i="0" b="0" u="none">
+                          <a:solidFill>
+                            <a:srgbClr val="000000">
+                              <a:alpha val="100000"/>
+                            </a:srgbClr>
+                          </a:solidFill>
+                          <a:latin typeface="Arial"/>
+                          <a:cs typeface="Arial"/>
+                          <a:ea typeface="Arial"/>
+                          <a:sym typeface="Arial"/>
+                        </a:rPr>
+                        <a:t>0.0079</a:t>
+                      </a:r>
+                    </a:p>
+                  </a:txBody>
+                  <a:tcPr anchor="ctr" marB="63500" marT="63500" marR="0" marL="0">
+                    <a:lnL algn="ctr" cmpd="sng" cap="flat" w="0">
+                      <a:noFill/>
+                      <a:prstDash val="solid"/>
+                    </a:lnL>
+                    <a:lnR algn="ctr" cmpd="sng" cap="flat" w="0">
+                      <a:noFill/>
+                      <a:prstDash val="solid"/>
+                    </a:lnR>
+                    <a:lnT algn="ctr" cmpd="sng" cap="flat" w="0">
+                      <a:noFill/>
+                      <a:prstDash val="solid"/>
+                    </a:lnT>
+                    <a:lnB algn="ctr" cmpd="sng" cap="flat" w="0">
+                      <a:noFill/>
+                      <a:prstDash val="solid"/>
+                    </a:lnB>
+                    <a:solidFill>
+                      <a:srgbClr val="FFFFFF">
+                        <a:alpha val="0"/>
+                      </a:srgbClr>
+                    </a:solidFill>
+                  </a:tcPr>
+                </a:tc>
+                <a:tc>
+                  <a:txBody>
+                    <a:bodyPr/>
+                    <a:lstStyle/>
+                    <a:p>
+                      <a:pPr algn="ctr" marL="63500" marR="63500">
+                        <a:lnSpc>
+                          <a:spcPct val="100000"/>
+                        </a:lnSpc>
+                        <a:spcBef>
+                          <a:spcPts val="500"/>
+                        </a:spcBef>
+                        <a:spcAft>
+                          <a:spcPts val="500"/>
+                        </a:spcAft>
+                        <a:buNone/>
+                      </a:pPr>
+                      <a:r>
+                        <a:rPr cap="none" sz="1100" i="0" b="0" u="none">
+                          <a:solidFill>
+                            <a:srgbClr val="000000">
+                              <a:alpha val="100000"/>
+                            </a:srgbClr>
+                          </a:solidFill>
+                          <a:latin typeface="Arial"/>
+                          <a:cs typeface="Arial"/>
+                          <a:ea typeface="Arial"/>
+                          <a:sym typeface="Arial"/>
+                        </a:rPr>
+                        <a:t>0.0628</a:t>
+                      </a:r>
+                    </a:p>
+                  </a:txBody>
+                  <a:tcPr anchor="ctr" marB="63500" marT="63500" marR="0" marL="0">
+                    <a:lnL algn="ctr" cmpd="sng" cap="flat" w="0">
+                      <a:noFill/>
+                      <a:prstDash val="solid"/>
+                    </a:lnL>
+                    <a:lnR algn="ctr" cmpd="sng" cap="flat" w="0">
+                      <a:noFill/>
+                      <a:prstDash val="solid"/>
+                    </a:lnR>
+                    <a:lnT algn="ctr" cmpd="sng" cap="flat" w="0">
+                      <a:noFill/>
+                      <a:prstDash val="solid"/>
+                    </a:lnT>
+                    <a:lnB algn="ctr" cmpd="sng" cap="flat" w="0">
+                      <a:noFill/>
+                      <a:prstDash val="solid"/>
+                    </a:lnB>
+                    <a:solidFill>
+                      <a:srgbClr val="FFFFFF">
+                        <a:alpha val="0"/>
+                      </a:srgbClr>
+                    </a:solidFill>
+                  </a:tcPr>
+                </a:tc>
+              </a:tr>
+              <a:tr h="228600">
+                <a:tc>
+                  <a:txBody>
+                    <a:bodyPr/>
+                    <a:lstStyle/>
+                    <a:p>
+                      <a:pPr algn="l" marL="63500" marR="63500">
+                        <a:lnSpc>
+                          <a:spcPct val="100000"/>
+                        </a:lnSpc>
+                        <a:spcBef>
+                          <a:spcPts val="500"/>
+                        </a:spcBef>
+                        <a:spcAft>
+                          <a:spcPts val="500"/>
+                        </a:spcAft>
+                        <a:buNone/>
+                      </a:pPr>
+                      <a:r>
+                        <a:rPr cap="none" sz="1100" i="0" b="0" u="none">
+                          <a:solidFill>
+                            <a:srgbClr val="000000">
+                              <a:alpha val="100000"/>
+                            </a:srgbClr>
+                          </a:solidFill>
+                          <a:latin typeface="Arial"/>
+                          <a:cs typeface="Arial"/>
+                          <a:ea typeface="Arial"/>
+                          <a:sym typeface="Arial"/>
+                        </a:rPr>
+                        <a:t>Optimum targeting</a:t>
+                      </a:r>
+                    </a:p>
+                  </a:txBody>
+                  <a:tcPr anchor="ctr" marB="63500" marT="63500" marR="0" marL="0">
+                    <a:lnL algn="ctr" cmpd="sng" cap="flat" w="0">
+                      <a:noFill/>
+                      <a:prstDash val="solid"/>
+                    </a:lnL>
+                    <a:lnR algn="ctr" cmpd="sng" cap="flat" w="0">
+                      <a:noFill/>
+                      <a:prstDash val="solid"/>
+                    </a:lnR>
+                    <a:lnT algn="ctr" cmpd="sng" cap="flat" w="0">
+                      <a:noFill/>
+                      <a:prstDash val="solid"/>
+                    </a:lnT>
+                    <a:lnB algn="ctr" cmpd="sng" cap="flat" w="12700">
+                      <a:solidFill>
+                        <a:srgbClr val="000000">
+                          <a:alpha val="100000"/>
+                        </a:srgbClr>
+                      </a:solidFill>
+                      <a:prstDash val="solid"/>
+                    </a:lnB>
+                    <a:solidFill>
+                      <a:srgbClr val="FFFFFF">
+                        <a:alpha val="0"/>
+                      </a:srgbClr>
+                    </a:solidFill>
+                  </a:tcPr>
+                </a:tc>
+                <a:tc>
+                  <a:txBody>
+                    <a:bodyPr/>
+                    <a:lstStyle/>
+                    <a:p>
+                      <a:pPr algn="ctr" marL="63500" marR="63500">
+                        <a:lnSpc>
+                          <a:spcPct val="100000"/>
+                        </a:lnSpc>
+                        <a:spcBef>
+                          <a:spcPts val="500"/>
+                        </a:spcBef>
+                        <a:spcAft>
+                          <a:spcPts val="500"/>
+                        </a:spcAft>
+                        <a:buNone/>
+                      </a:pPr>
+                      <a:r>
+                        <a:rPr cap="none" sz="1100" i="0" b="0" u="none">
+                          <a:solidFill>
+                            <a:srgbClr val="000000">
+                              <a:alpha val="100000"/>
+                            </a:srgbClr>
+                          </a:solidFill>
+                          <a:latin typeface="Arial"/>
+                          <a:cs typeface="Arial"/>
+                          <a:ea typeface="Arial"/>
+                          <a:sym typeface="Arial"/>
+                        </a:rPr>
+                        <a:t>0.0473</a:t>
+                      </a:r>
+                    </a:p>
+                  </a:txBody>
+                  <a:tcPr anchor="ctr" marB="63500" marT="63500" marR="0" marL="0">
+                    <a:lnL algn="ctr" cmpd="sng" cap="flat" w="0">
+                      <a:noFill/>
+                      <a:prstDash val="solid"/>
+                    </a:lnL>
+                    <a:lnR algn="ctr" cmpd="sng" cap="flat" w="0">
+                      <a:noFill/>
+                      <a:prstDash val="solid"/>
+                    </a:lnR>
+                    <a:lnT algn="ctr" cmpd="sng" cap="flat" w="0">
+                      <a:noFill/>
+                      <a:prstDash val="solid"/>
+                    </a:lnT>
+                    <a:lnB algn="ctr" cmpd="sng" cap="flat" w="12700">
+                      <a:solidFill>
+                        <a:srgbClr val="000000">
+                          <a:alpha val="100000"/>
+                        </a:srgbClr>
+                      </a:solidFill>
+                      <a:prstDash val="solid"/>
+                    </a:lnB>
+                    <a:solidFill>
+                      <a:srgbClr val="FFFFFF">
+                        <a:alpha val="0"/>
+                      </a:srgbClr>
+                    </a:solidFill>
+                  </a:tcPr>
+                </a:tc>
+                <a:tc>
+                  <a:txBody>
+                    <a:bodyPr/>
+                    <a:lstStyle/>
+                    <a:p>
+                      <a:pPr algn="ctr" marL="63500" marR="63500">
+                        <a:lnSpc>
+                          <a:spcPct val="100000"/>
+                        </a:lnSpc>
+                        <a:spcBef>
+                          <a:spcPts val="500"/>
+                        </a:spcBef>
+                        <a:spcAft>
+                          <a:spcPts val="500"/>
+                        </a:spcAft>
+                        <a:buNone/>
+                      </a:pPr>
+                      <a:r>
+                        <a:rPr cap="none" sz="1100" i="0" b="0" u="none">
+                          <a:solidFill>
+                            <a:srgbClr val="000000">
+                              <a:alpha val="100000"/>
+                            </a:srgbClr>
+                          </a:solidFill>
+                          <a:latin typeface="Arial"/>
+                          <a:cs typeface="Arial"/>
+                          <a:ea typeface="Arial"/>
+                          <a:sym typeface="Arial"/>
+                        </a:rPr>
+                        <a:t>0.0530</a:t>
+                      </a:r>
+                    </a:p>
+                  </a:txBody>
+                  <a:tcPr anchor="ctr" marB="63500" marT="63500" marR="0" marL="0">
+                    <a:lnL algn="ctr" cmpd="sng" cap="flat" w="0">
+                      <a:noFill/>
+                      <a:prstDash val="solid"/>
+                    </a:lnL>
+                    <a:lnR algn="ctr" cmpd="sng" cap="flat" w="0">
+                      <a:noFill/>
+                      <a:prstDash val="solid"/>
+                    </a:lnR>
+                    <a:lnT algn="ctr" cmpd="sng" cap="flat" w="0">
+                      <a:noFill/>
+                      <a:prstDash val="solid"/>
+                    </a:lnT>
+                    <a:lnB algn="ctr" cmpd="sng" cap="flat" w="12700">
+                      <a:solidFill>
+                        <a:srgbClr val="000000">
+                          <a:alpha val="100000"/>
+                        </a:srgbClr>
+                      </a:solidFill>
+                      <a:prstDash val="solid"/>
+                    </a:lnB>
+                    <a:solidFill>
+                      <a:srgbClr val="FFFFFF">
+                        <a:alpha val="0"/>
+                      </a:srgbClr>
+                    </a:solidFill>
+                  </a:tcPr>
+                </a:tc>
+              </a:tr>
+            </a:tbl>
+          </a:graphicData>
+        </a:graphic>
+      </p:graphicFrame>
     </p:spTree>
   </p:cSld>
 </p:sld>

</xml_diff>

<commit_message>
add ATE of targeting
</commit_message>
<xml_diff>
--- a/targeting.pptx
+++ b/targeting.pptx
@@ -1,6 +1,6 @@
 
 <file path=ppt/presentation.xml><?xml version="1.0" encoding="utf-8"?>
-<p:presentation xmlns:a="http://schemas.openxmlformats.org/drawingml/2006/main" xmlns:p="http://schemas.openxmlformats.org/presentationml/2006/main" xmlns:r="http://schemas.openxmlformats.org/officeDocument/2006/relationships" autoCompressPictures="0" saveSubsetFonts="1">
+<p:presentation xmlns:a="http://schemas.openxmlformats.org/drawingml/2006/main" xmlns:r="http://schemas.openxmlformats.org/officeDocument/2006/relationships" xmlns:p="http://schemas.openxmlformats.org/presentationml/2006/main" saveSubsetFonts="1" autoCompressPictures="0">
   <p:sldMasterIdLst>
     <p:sldMasterId id="2147483648" r:id="rId1"/>
   </p:sldMasterIdLst>
@@ -17,8 +17,8 @@
     <a:defPPr>
       <a:defRPr lang="en-US"/>
     </a:defPPr>
-    <a:lvl1pPr algn="l" defTabSz="457200" eaLnBrk="1" hangingPunct="1" latinLnBrk="0" marL="0" rtl="0">
-      <a:defRPr kern="1200" sz="1800">
+    <a:lvl1pPr marL="0" algn="l" defTabSz="457200" rtl="0" eaLnBrk="1" latinLnBrk="0" hangingPunct="1">
+      <a:defRPr sz="1800" kern="1200">
         <a:solidFill>
           <a:schemeClr val="tx1"/>
         </a:solidFill>
@@ -27,8 +27,8 @@
         <a:cs typeface="+mn-cs"/>
       </a:defRPr>
     </a:lvl1pPr>
-    <a:lvl2pPr algn="l" defTabSz="457200" eaLnBrk="1" hangingPunct="1" latinLnBrk="0" marL="457200" rtl="0">
-      <a:defRPr kern="1200" sz="1800">
+    <a:lvl2pPr marL="457200" algn="l" defTabSz="457200" rtl="0" eaLnBrk="1" latinLnBrk="0" hangingPunct="1">
+      <a:defRPr sz="1800" kern="1200">
         <a:solidFill>
           <a:schemeClr val="tx1"/>
         </a:solidFill>
@@ -37,8 +37,8 @@
         <a:cs typeface="+mn-cs"/>
       </a:defRPr>
     </a:lvl2pPr>
-    <a:lvl3pPr algn="l" defTabSz="457200" eaLnBrk="1" hangingPunct="1" latinLnBrk="0" marL="914400" rtl="0">
-      <a:defRPr kern="1200" sz="1800">
+    <a:lvl3pPr marL="914400" algn="l" defTabSz="457200" rtl="0" eaLnBrk="1" latinLnBrk="0" hangingPunct="1">
+      <a:defRPr sz="1800" kern="1200">
         <a:solidFill>
           <a:schemeClr val="tx1"/>
         </a:solidFill>
@@ -47,8 +47,8 @@
         <a:cs typeface="+mn-cs"/>
       </a:defRPr>
     </a:lvl3pPr>
-    <a:lvl4pPr algn="l" defTabSz="457200" eaLnBrk="1" hangingPunct="1" latinLnBrk="0" marL="1371600" rtl="0">
-      <a:defRPr kern="1200" sz="1800">
+    <a:lvl4pPr marL="1371600" algn="l" defTabSz="457200" rtl="0" eaLnBrk="1" latinLnBrk="0" hangingPunct="1">
+      <a:defRPr sz="1800" kern="1200">
         <a:solidFill>
           <a:schemeClr val="tx1"/>
         </a:solidFill>
@@ -57,8 +57,8 @@
         <a:cs typeface="+mn-cs"/>
       </a:defRPr>
     </a:lvl4pPr>
-    <a:lvl5pPr algn="l" defTabSz="457200" eaLnBrk="1" hangingPunct="1" latinLnBrk="0" marL="1828800" rtl="0">
-      <a:defRPr kern="1200" sz="1800">
+    <a:lvl5pPr marL="1828800" algn="l" defTabSz="457200" rtl="0" eaLnBrk="1" latinLnBrk="0" hangingPunct="1">
+      <a:defRPr sz="1800" kern="1200">
         <a:solidFill>
           <a:schemeClr val="tx1"/>
         </a:solidFill>
@@ -67,8 +67,8 @@
         <a:cs typeface="+mn-cs"/>
       </a:defRPr>
     </a:lvl5pPr>
-    <a:lvl6pPr algn="l" defTabSz="457200" eaLnBrk="1" hangingPunct="1" latinLnBrk="0" marL="2286000" rtl="0">
-      <a:defRPr kern="1200" sz="1800">
+    <a:lvl6pPr marL="2286000" algn="l" defTabSz="457200" rtl="0" eaLnBrk="1" latinLnBrk="0" hangingPunct="1">
+      <a:defRPr sz="1800" kern="1200">
         <a:solidFill>
           <a:schemeClr val="tx1"/>
         </a:solidFill>
@@ -77,8 +77,8 @@
         <a:cs typeface="+mn-cs"/>
       </a:defRPr>
     </a:lvl6pPr>
-    <a:lvl7pPr algn="l" defTabSz="457200" eaLnBrk="1" hangingPunct="1" latinLnBrk="0" marL="2743200" rtl="0">
-      <a:defRPr kern="1200" sz="1800">
+    <a:lvl7pPr marL="2743200" algn="l" defTabSz="457200" rtl="0" eaLnBrk="1" latinLnBrk="0" hangingPunct="1">
+      <a:defRPr sz="1800" kern="1200">
         <a:solidFill>
           <a:schemeClr val="tx1"/>
         </a:solidFill>
@@ -87,8 +87,8 @@
         <a:cs typeface="+mn-cs"/>
       </a:defRPr>
     </a:lvl7pPr>
-    <a:lvl8pPr algn="l" defTabSz="457200" eaLnBrk="1" hangingPunct="1" latinLnBrk="0" marL="3200400" rtl="0">
-      <a:defRPr kern="1200" sz="1800">
+    <a:lvl8pPr marL="3200400" algn="l" defTabSz="457200" rtl="0" eaLnBrk="1" latinLnBrk="0" hangingPunct="1">
+      <a:defRPr sz="1800" kern="1200">
         <a:solidFill>
           <a:schemeClr val="tx1"/>
         </a:solidFill>
@@ -97,8 +97,8 @@
         <a:cs typeface="+mn-cs"/>
       </a:defRPr>
     </a:lvl8pPr>
-    <a:lvl9pPr algn="l" defTabSz="457200" eaLnBrk="1" hangingPunct="1" latinLnBrk="0" marL="3657600" rtl="0">
-      <a:defRPr kern="1200" sz="1800">
+    <a:lvl9pPr marL="3657600" algn="l" defTabSz="457200" rtl="0" eaLnBrk="1" latinLnBrk="0" hangingPunct="1">
+      <a:defRPr sz="1800" kern="1200">
         <a:solidFill>
           <a:schemeClr val="tx1"/>
         </a:solidFill>
@@ -306,7 +306,7 @@
           <a:p>
             <a:fld id="{241EB5C9-1307-BA42-ABA2-0BC069CD8E7F}" type="datetimeFigureOut">
               <a:rPr lang="en-US" smtClean="0"/>
-              <a:t>1/2/22</a:t>
+              <a:t>12/28/2023</a:t>
             </a:fld>
             <a:endParaRPr lang="en-US"/>
           </a:p>
@@ -474,7 +474,7 @@
           <a:p>
             <a:fld id="{241EB5C9-1307-BA42-ABA2-0BC069CD8E7F}" type="datetimeFigureOut">
               <a:rPr lang="en-US" smtClean="0"/>
-              <a:t>1/2/22</a:t>
+              <a:t>12/28/2023</a:t>
             </a:fld>
             <a:endParaRPr lang="en-US"/>
           </a:p>
@@ -652,7 +652,7 @@
           <a:p>
             <a:fld id="{241EB5C9-1307-BA42-ABA2-0BC069CD8E7F}" type="datetimeFigureOut">
               <a:rPr lang="en-US" smtClean="0"/>
-              <a:t>1/2/22</a:t>
+              <a:t>12/28/2023</a:t>
             </a:fld>
             <a:endParaRPr lang="en-US"/>
           </a:p>
@@ -820,7 +820,7 @@
           <a:p>
             <a:fld id="{241EB5C9-1307-BA42-ABA2-0BC069CD8E7F}" type="datetimeFigureOut">
               <a:rPr lang="en-US" smtClean="0"/>
-              <a:t>1/2/22</a:t>
+              <a:t>12/28/2023</a:t>
             </a:fld>
             <a:endParaRPr lang="en-US"/>
           </a:p>
@@ -1065,7 +1065,7 @@
           <a:p>
             <a:fld id="{241EB5C9-1307-BA42-ABA2-0BC069CD8E7F}" type="datetimeFigureOut">
               <a:rPr lang="en-US" smtClean="0"/>
-              <a:t>1/2/22</a:t>
+              <a:t>12/28/2023</a:t>
             </a:fld>
             <a:endParaRPr lang="en-US"/>
           </a:p>
@@ -1350,7 +1350,7 @@
           <a:p>
             <a:fld id="{241EB5C9-1307-BA42-ABA2-0BC069CD8E7F}" type="datetimeFigureOut">
               <a:rPr lang="en-US" smtClean="0"/>
-              <a:t>1/2/22</a:t>
+              <a:t>12/28/2023</a:t>
             </a:fld>
             <a:endParaRPr lang="en-US"/>
           </a:p>
@@ -1769,7 +1769,7 @@
           <a:p>
             <a:fld id="{241EB5C9-1307-BA42-ABA2-0BC069CD8E7F}" type="datetimeFigureOut">
               <a:rPr lang="en-US" smtClean="0"/>
-              <a:t>1/2/22</a:t>
+              <a:t>12/28/2023</a:t>
             </a:fld>
             <a:endParaRPr lang="en-US"/>
           </a:p>
@@ -1886,7 +1886,7 @@
           <a:p>
             <a:fld id="{241EB5C9-1307-BA42-ABA2-0BC069CD8E7F}" type="datetimeFigureOut">
               <a:rPr lang="en-US" smtClean="0"/>
-              <a:t>1/2/22</a:t>
+              <a:t>12/28/2023</a:t>
             </a:fld>
             <a:endParaRPr lang="en-US"/>
           </a:p>
@@ -1981,7 +1981,7 @@
           <a:p>
             <a:fld id="{241EB5C9-1307-BA42-ABA2-0BC069CD8E7F}" type="datetimeFigureOut">
               <a:rPr lang="en-US" smtClean="0"/>
-              <a:t>1/2/22</a:t>
+              <a:t>12/28/2023</a:t>
             </a:fld>
             <a:endParaRPr lang="en-US"/>
           </a:p>
@@ -2256,7 +2256,7 @@
           <a:p>
             <a:fld id="{241EB5C9-1307-BA42-ABA2-0BC069CD8E7F}" type="datetimeFigureOut">
               <a:rPr lang="en-US" smtClean="0"/>
-              <a:t>1/2/22</a:t>
+              <a:t>12/28/2023</a:t>
             </a:fld>
             <a:endParaRPr lang="en-US"/>
           </a:p>
@@ -2508,7 +2508,7 @@
           <a:p>
             <a:fld id="{241EB5C9-1307-BA42-ABA2-0BC069CD8E7F}" type="datetimeFigureOut">
               <a:rPr lang="en-US" smtClean="0"/>
-              <a:t>1/2/22</a:t>
+              <a:t>12/28/2023</a:t>
             </a:fld>
             <a:endParaRPr lang="en-US"/>
           </a:p>
@@ -2570,7 +2570,7 @@
 </file>
 
 <file path=ppt/slideMasters/slideMaster1.xml><?xml version="1.0" encoding="utf-8"?>
-<p:sldMaster xmlns:a="http://schemas.openxmlformats.org/drawingml/2006/main" xmlns:p="http://schemas.openxmlformats.org/presentationml/2006/main" xmlns:r="http://schemas.openxmlformats.org/officeDocument/2006/relationships">
+<p:sldMaster xmlns:a="http://schemas.openxmlformats.org/drawingml/2006/main" xmlns:r="http://schemas.openxmlformats.org/officeDocument/2006/relationships" xmlns:p="http://schemas.openxmlformats.org/presentationml/2006/main">
   <p:cSld>
     <p:bg>
       <p:bgRef idx="1001">
@@ -2611,7 +2611,7 @@
           </a:prstGeom>
         </p:spPr>
         <p:txBody>
-          <a:bodyPr anchor="ctr" bIns="45720" lIns="91440" rIns="91440" rtlCol="0" tIns="45720" vert="horz">
+          <a:bodyPr vert="horz" lIns="91440" tIns="45720" rIns="91440" bIns="45720" rtlCol="0" anchor="ctr">
             <a:normAutofit/>
           </a:bodyPr>
           <a:lstStyle/>
@@ -2630,7 +2630,7 @@
             <a:spLocks noGrp="1"/>
           </p:cNvSpPr>
           <p:nvPr>
-            <p:ph idx="1" type="body"/>
+            <p:ph type="body" idx="1"/>
           </p:nvPr>
         </p:nvSpPr>
         <p:spPr>
@@ -2643,7 +2643,7 @@
           </a:prstGeom>
         </p:spPr>
         <p:txBody>
-          <a:bodyPr bIns="45720" lIns="91440" rIns="91440" rtlCol="0" tIns="45720" vert="horz">
+          <a:bodyPr vert="horz" lIns="91440" tIns="45720" rIns="91440" bIns="45720" rtlCol="0">
             <a:normAutofit/>
           </a:bodyPr>
           <a:lstStyle/>
@@ -2691,7 +2691,7 @@
             <a:spLocks noGrp="1"/>
           </p:cNvSpPr>
           <p:nvPr>
-            <p:ph idx="2" sz="half" type="dt"/>
+            <p:ph type="dt" sz="half" idx="2"/>
           </p:nvPr>
         </p:nvSpPr>
         <p:spPr>
@@ -2704,7 +2704,7 @@
           </a:prstGeom>
         </p:spPr>
         <p:txBody>
-          <a:bodyPr anchor="ctr" bIns="45720" lIns="91440" rIns="91440" rtlCol="0" tIns="45720" vert="horz"/>
+          <a:bodyPr vert="horz" lIns="91440" tIns="45720" rIns="91440" bIns="45720" rtlCol="0" anchor="ctr"/>
           <a:lstStyle>
             <a:lvl1pPr algn="l">
               <a:defRPr sz="900">
@@ -2719,7 +2719,7 @@
           <a:p>
             <a:fld id="{241EB5C9-1307-BA42-ABA2-0BC069CD8E7F}" type="datetimeFigureOut">
               <a:rPr lang="en-US" smtClean="0"/>
-              <a:t>1/2/22</a:t>
+              <a:t>12/28/2023</a:t>
             </a:fld>
             <a:endParaRPr lang="en-US"/>
           </a:p>
@@ -2732,7 +2732,7 @@
             <a:spLocks noGrp="1"/>
           </p:cNvSpPr>
           <p:nvPr>
-            <p:ph idx="3" sz="quarter" type="ftr"/>
+            <p:ph type="ftr" sz="quarter" idx="3"/>
           </p:nvPr>
         </p:nvSpPr>
         <p:spPr>
@@ -2745,7 +2745,7 @@
           </a:prstGeom>
         </p:spPr>
         <p:txBody>
-          <a:bodyPr anchor="ctr" bIns="45720" lIns="91440" rIns="91440" rtlCol="0" tIns="45720" vert="horz"/>
+          <a:bodyPr vert="horz" lIns="91440" tIns="45720" rIns="91440" bIns="45720" rtlCol="0" anchor="ctr"/>
           <a:lstStyle>
             <a:lvl1pPr algn="ctr">
               <a:defRPr sz="900">
@@ -2769,7 +2769,7 @@
             <a:spLocks noGrp="1"/>
           </p:cNvSpPr>
           <p:nvPr>
-            <p:ph idx="4" sz="quarter" type="sldNum"/>
+            <p:ph type="sldNum" sz="quarter" idx="4"/>
           </p:nvPr>
         </p:nvSpPr>
         <p:spPr>
@@ -2782,7 +2782,7 @@
           </a:prstGeom>
         </p:spPr>
         <p:txBody>
-          <a:bodyPr anchor="ctr" bIns="45720" lIns="91440" rIns="91440" rtlCol="0" tIns="45720" vert="horz"/>
+          <a:bodyPr vert="horz" lIns="91440" tIns="45720" rIns="91440" bIns="45720" rtlCol="0" anchor="ctr"/>
           <a:lstStyle>
             <a:lvl1pPr algn="r">
               <a:defRPr sz="900">
@@ -2810,7 +2810,7 @@
       </p:ext>
     </p:extLst>
   </p:cSld>
-  <p:clrMap accent1="accent1" accent2="accent2" accent3="accent3" accent4="accent4" accent5="accent5" accent6="accent6" bg1="lt1" bg2="lt2" folHlink="folHlink" hlink="hlink" tx1="dk1" tx2="dk2"/>
+  <p:clrMap bg1="lt1" tx1="dk1" bg2="lt2" tx2="dk2" accent1="accent1" accent2="accent2" accent3="accent3" accent4="accent4" accent5="accent5" accent6="accent6" hlink="hlink" folHlink="folHlink"/>
   <p:sldLayoutIdLst>
     <p:sldLayoutId id="2147483649" r:id="rId1"/>
     <p:sldLayoutId id="2147483650" r:id="rId2"/>
@@ -2826,12 +2826,12 @@
   </p:sldLayoutIdLst>
   <p:txStyles>
     <p:titleStyle>
-      <a:lvl1pPr algn="ctr" defTabSz="342900" eaLnBrk="1" hangingPunct="1" latinLnBrk="0" rtl="0">
+      <a:lvl1pPr algn="ctr" defTabSz="342900" rtl="0" eaLnBrk="1" latinLnBrk="0" hangingPunct="1">
         <a:spcBef>
           <a:spcPct val="0"/>
         </a:spcBef>
         <a:buNone/>
-        <a:defRPr kern="1200" sz="3300">
+        <a:defRPr sz="3300" kern="1200">
           <a:solidFill>
             <a:schemeClr val="tx1"/>
           </a:solidFill>
@@ -2842,13 +2842,13 @@
       </a:lvl1pPr>
     </p:titleStyle>
     <p:bodyStyle>
-      <a:lvl1pPr algn="l" defTabSz="342900" eaLnBrk="1" hangingPunct="1" indent="-342900" latinLnBrk="0" marL="342900" rtl="0">
+      <a:lvl1pPr marL="342900" indent="-342900" algn="l" defTabSz="342900" rtl="0" eaLnBrk="1" latinLnBrk="0" hangingPunct="1">
         <a:spcBef>
           <a:spcPct val="20000"/>
         </a:spcBef>
         <a:buFont typeface="Arial"/>
         <a:buChar char="•"/>
-        <a:defRPr kern="1200" sz="2400">
+        <a:defRPr sz="2400" kern="1200">
           <a:solidFill>
             <a:schemeClr val="tx1"/>
           </a:solidFill>
@@ -2857,13 +2857,13 @@
           <a:cs typeface="+mn-cs"/>
         </a:defRPr>
       </a:lvl1pPr>
-      <a:lvl2pPr algn="l" defTabSz="342900" eaLnBrk="1" hangingPunct="1" indent="-342900" latinLnBrk="0" marL="685800" rtl="0">
+      <a:lvl2pPr marL="685800" indent="-342900" algn="l" defTabSz="342900" rtl="0" eaLnBrk="1" latinLnBrk="0" hangingPunct="1">
         <a:spcBef>
           <a:spcPct val="20000"/>
         </a:spcBef>
         <a:buFont typeface="Arial"/>
         <a:buChar char="–"/>
-        <a:defRPr kern="1200" sz="2100">
+        <a:defRPr sz="2100" kern="1200">
           <a:solidFill>
             <a:schemeClr val="tx1"/>
           </a:solidFill>
@@ -2872,13 +2872,13 @@
           <a:cs typeface="+mn-cs"/>
         </a:defRPr>
       </a:lvl2pPr>
-      <a:lvl3pPr algn="l" defTabSz="342900" eaLnBrk="1" hangingPunct="1" indent="-342900" latinLnBrk="0" marL="1028700" rtl="0">
+      <a:lvl3pPr marL="1028700" indent="-342900" algn="l" defTabSz="342900" rtl="0" eaLnBrk="1" latinLnBrk="0" hangingPunct="1">
         <a:spcBef>
           <a:spcPct val="20000"/>
         </a:spcBef>
         <a:buFont typeface="Arial"/>
         <a:buChar char="•"/>
-        <a:defRPr kern="1200" sz="1800">
+        <a:defRPr sz="1800" kern="1200">
           <a:solidFill>
             <a:schemeClr val="tx1"/>
           </a:solidFill>
@@ -2887,13 +2887,13 @@
           <a:cs typeface="+mn-cs"/>
         </a:defRPr>
       </a:lvl3pPr>
-      <a:lvl4pPr algn="l" defTabSz="342900" eaLnBrk="1" hangingPunct="1" indent="-342900" latinLnBrk="0" marL="1371600" rtl="0">
+      <a:lvl4pPr marL="1371600" indent="-342900" algn="l" defTabSz="342900" rtl="0" eaLnBrk="1" latinLnBrk="0" hangingPunct="1">
         <a:spcBef>
           <a:spcPct val="20000"/>
         </a:spcBef>
         <a:buFont typeface="Arial"/>
         <a:buChar char="–"/>
-        <a:defRPr kern="1200" sz="1500">
+        <a:defRPr sz="1500" kern="1200">
           <a:solidFill>
             <a:schemeClr val="tx1"/>
           </a:solidFill>
@@ -2902,13 +2902,13 @@
           <a:cs typeface="+mn-cs"/>
         </a:defRPr>
       </a:lvl4pPr>
-      <a:lvl5pPr algn="l" defTabSz="342900" eaLnBrk="1" hangingPunct="1" indent="-342900" latinLnBrk="0" marL="1714500" rtl="0">
+      <a:lvl5pPr marL="1714500" indent="-342900" algn="l" defTabSz="342900" rtl="0" eaLnBrk="1" latinLnBrk="0" hangingPunct="1">
         <a:spcBef>
           <a:spcPct val="20000"/>
         </a:spcBef>
         <a:buFont typeface="Arial"/>
         <a:buChar char="»"/>
-        <a:defRPr kern="1200" sz="1500">
+        <a:defRPr sz="1500" kern="1200">
           <a:solidFill>
             <a:schemeClr val="tx1"/>
           </a:solidFill>
@@ -2917,13 +2917,13 @@
           <a:cs typeface="+mn-cs"/>
         </a:defRPr>
       </a:lvl5pPr>
-      <a:lvl6pPr algn="l" defTabSz="342900" eaLnBrk="1" hangingPunct="1" indent="-342900" latinLnBrk="0" marL="2057400" rtl="0">
+      <a:lvl6pPr marL="2057400" indent="-342900" algn="l" defTabSz="342900" rtl="0" eaLnBrk="1" latinLnBrk="0" hangingPunct="1">
         <a:spcBef>
           <a:spcPct val="20000"/>
         </a:spcBef>
         <a:buFont typeface="Arial"/>
         <a:buChar char="•"/>
-        <a:defRPr kern="1200" sz="1500">
+        <a:defRPr sz="1500" kern="1200">
           <a:solidFill>
             <a:schemeClr val="tx1"/>
           </a:solidFill>
@@ -2932,13 +2932,13 @@
           <a:cs typeface="+mn-cs"/>
         </a:defRPr>
       </a:lvl6pPr>
-      <a:lvl7pPr algn="l" defTabSz="342900" eaLnBrk="1" hangingPunct="1" indent="-342900" latinLnBrk="0" marL="2400300" rtl="0">
+      <a:lvl7pPr marL="2400300" indent="-342900" algn="l" defTabSz="342900" rtl="0" eaLnBrk="1" latinLnBrk="0" hangingPunct="1">
         <a:spcBef>
           <a:spcPct val="20000"/>
         </a:spcBef>
         <a:buFont typeface="Arial"/>
         <a:buChar char="•"/>
-        <a:defRPr kern="1200" sz="1500">
+        <a:defRPr sz="1500" kern="1200">
           <a:solidFill>
             <a:schemeClr val="tx1"/>
           </a:solidFill>
@@ -2947,13 +2947,13 @@
           <a:cs typeface="+mn-cs"/>
         </a:defRPr>
       </a:lvl7pPr>
-      <a:lvl8pPr algn="l" defTabSz="342900" eaLnBrk="1" hangingPunct="1" indent="-342900" latinLnBrk="0" marL="2743200" rtl="0">
+      <a:lvl8pPr marL="2743200" indent="-342900" algn="l" defTabSz="342900" rtl="0" eaLnBrk="1" latinLnBrk="0" hangingPunct="1">
         <a:spcBef>
           <a:spcPct val="20000"/>
         </a:spcBef>
         <a:buFont typeface="Arial"/>
         <a:buChar char="•"/>
-        <a:defRPr kern="1200" sz="1500">
+        <a:defRPr sz="1500" kern="1200">
           <a:solidFill>
             <a:schemeClr val="tx1"/>
           </a:solidFill>
@@ -2962,13 +2962,13 @@
           <a:cs typeface="+mn-cs"/>
         </a:defRPr>
       </a:lvl8pPr>
-      <a:lvl9pPr algn="l" defTabSz="342900" eaLnBrk="1" hangingPunct="1" indent="-342900" latinLnBrk="0" marL="3086100" rtl="0">
+      <a:lvl9pPr marL="3086100" indent="-342900" algn="l" defTabSz="342900" rtl="0" eaLnBrk="1" latinLnBrk="0" hangingPunct="1">
         <a:spcBef>
           <a:spcPct val="20000"/>
         </a:spcBef>
         <a:buFont typeface="Arial"/>
         <a:buChar char="•"/>
-        <a:defRPr kern="1200" sz="1500">
+        <a:defRPr sz="1500" kern="1200">
           <a:solidFill>
             <a:schemeClr val="tx1"/>
           </a:solidFill>
@@ -2982,8 +2982,8 @@
       <a:defPPr>
         <a:defRPr lang="en-US"/>
       </a:defPPr>
-      <a:lvl1pPr algn="l" defTabSz="342900" eaLnBrk="1" hangingPunct="1" latinLnBrk="0" marL="0" rtl="0">
-        <a:defRPr kern="1200" sz="1350">
+      <a:lvl1pPr marL="0" algn="l" defTabSz="342900" rtl="0" eaLnBrk="1" latinLnBrk="0" hangingPunct="1">
+        <a:defRPr sz="1350" kern="1200">
           <a:solidFill>
             <a:schemeClr val="tx1"/>
           </a:solidFill>
@@ -2992,8 +2992,8 @@
           <a:cs typeface="+mn-cs"/>
         </a:defRPr>
       </a:lvl1pPr>
-      <a:lvl2pPr algn="l" defTabSz="342900" eaLnBrk="1" hangingPunct="1" latinLnBrk="0" marL="342900" rtl="0">
-        <a:defRPr kern="1200" sz="1350">
+      <a:lvl2pPr marL="342900" algn="l" defTabSz="342900" rtl="0" eaLnBrk="1" latinLnBrk="0" hangingPunct="1">
+        <a:defRPr sz="1350" kern="1200">
           <a:solidFill>
             <a:schemeClr val="tx1"/>
           </a:solidFill>
@@ -3002,8 +3002,8 @@
           <a:cs typeface="+mn-cs"/>
         </a:defRPr>
       </a:lvl2pPr>
-      <a:lvl3pPr algn="l" defTabSz="342900" eaLnBrk="1" hangingPunct="1" latinLnBrk="0" marL="685800" rtl="0">
-        <a:defRPr kern="1200" sz="1350">
+      <a:lvl3pPr marL="685800" algn="l" defTabSz="342900" rtl="0" eaLnBrk="1" latinLnBrk="0" hangingPunct="1">
+        <a:defRPr sz="1350" kern="1200">
           <a:solidFill>
             <a:schemeClr val="tx1"/>
           </a:solidFill>
@@ -3012,8 +3012,8 @@
           <a:cs typeface="+mn-cs"/>
         </a:defRPr>
       </a:lvl3pPr>
-      <a:lvl4pPr algn="l" defTabSz="342900" eaLnBrk="1" hangingPunct="1" latinLnBrk="0" marL="1028700" rtl="0">
-        <a:defRPr kern="1200" sz="1350">
+      <a:lvl4pPr marL="1028700" algn="l" defTabSz="342900" rtl="0" eaLnBrk="1" latinLnBrk="0" hangingPunct="1">
+        <a:defRPr sz="1350" kern="1200">
           <a:solidFill>
             <a:schemeClr val="tx1"/>
           </a:solidFill>
@@ -3022,8 +3022,8 @@
           <a:cs typeface="+mn-cs"/>
         </a:defRPr>
       </a:lvl4pPr>
-      <a:lvl5pPr algn="l" defTabSz="342900" eaLnBrk="1" hangingPunct="1" latinLnBrk="0" marL="1371600" rtl="0">
-        <a:defRPr kern="1200" sz="1350">
+      <a:lvl5pPr marL="1371600" algn="l" defTabSz="342900" rtl="0" eaLnBrk="1" latinLnBrk="0" hangingPunct="1">
+        <a:defRPr sz="1350" kern="1200">
           <a:solidFill>
             <a:schemeClr val="tx1"/>
           </a:solidFill>
@@ -3032,8 +3032,8 @@
           <a:cs typeface="+mn-cs"/>
         </a:defRPr>
       </a:lvl5pPr>
-      <a:lvl6pPr algn="l" defTabSz="342900" eaLnBrk="1" hangingPunct="1" latinLnBrk="0" marL="1714500" rtl="0">
-        <a:defRPr kern="1200" sz="1350">
+      <a:lvl6pPr marL="1714500" algn="l" defTabSz="342900" rtl="0" eaLnBrk="1" latinLnBrk="0" hangingPunct="1">
+        <a:defRPr sz="1350" kern="1200">
           <a:solidFill>
             <a:schemeClr val="tx1"/>
           </a:solidFill>
@@ -3042,8 +3042,8 @@
           <a:cs typeface="+mn-cs"/>
         </a:defRPr>
       </a:lvl6pPr>
-      <a:lvl7pPr algn="l" defTabSz="342900" eaLnBrk="1" hangingPunct="1" latinLnBrk="0" marL="2057400" rtl="0">
-        <a:defRPr kern="1200" sz="1350">
+      <a:lvl7pPr marL="2057400" algn="l" defTabSz="342900" rtl="0" eaLnBrk="1" latinLnBrk="0" hangingPunct="1">
+        <a:defRPr sz="1350" kern="1200">
           <a:solidFill>
             <a:schemeClr val="tx1"/>
           </a:solidFill>
@@ -3052,8 +3052,8 @@
           <a:cs typeface="+mn-cs"/>
         </a:defRPr>
       </a:lvl7pPr>
-      <a:lvl8pPr algn="l" defTabSz="342900" eaLnBrk="1" hangingPunct="1" latinLnBrk="0" marL="2400300" rtl="0">
-        <a:defRPr kern="1200" sz="1350">
+      <a:lvl8pPr marL="2400300" algn="l" defTabSz="342900" rtl="0" eaLnBrk="1" latinLnBrk="0" hangingPunct="1">
+        <a:defRPr sz="1350" kern="1200">
           <a:solidFill>
             <a:schemeClr val="tx1"/>
           </a:solidFill>
@@ -3062,8 +3062,8 @@
           <a:cs typeface="+mn-cs"/>
         </a:defRPr>
       </a:lvl8pPr>
-      <a:lvl9pPr algn="l" defTabSz="342900" eaLnBrk="1" hangingPunct="1" latinLnBrk="0" marL="2743200" rtl="0">
-        <a:defRPr kern="1200" sz="1350">
+      <a:lvl9pPr marL="2743200" algn="l" defTabSz="342900" rtl="0" eaLnBrk="1" latinLnBrk="0" hangingPunct="1">
+        <a:defRPr sz="1350" kern="1200">
           <a:solidFill>
             <a:schemeClr val="tx1"/>
           </a:solidFill>
@@ -3114,11 +3114,10 @@
           <a:bodyPr/>
           <a:lstStyle/>
           <a:p>
-            <a:pPr lvl="0" indent="0" marL="0">
+            <a:pPr marL="0" lvl="0" indent="0">
               <a:buNone/>
             </a:pPr>
             <a:r>
-              <a:rPr/>
               <a:t>骨髄バンクドナーコーディネート初期行程におけるコーディネート進行率増加を目指した介入研究</a:t>
             </a:r>
           </a:p>
@@ -3131,7 +3130,7 @@
             <a:spLocks noGrp="1"/>
           </p:cNvSpPr>
           <p:nvPr>
-            <p:ph idx="1" type="subTitle"/>
+            <p:ph type="subTitle" idx="1"/>
           </p:nvPr>
         </p:nvSpPr>
         <p:spPr>
@@ -3144,33 +3143,28 @@
           <a:bodyPr/>
           <a:lstStyle/>
           <a:p>
-            <a:pPr lvl="0" indent="0" marL="0">
+            <a:pPr marL="0" lvl="0" indent="0">
               <a:buNone/>
             </a:pPr>
             <a:br/>
             <a:br/>
             <a:r>
-              <a:rPr/>
               <a:t>大竹文雄（大阪大学）</a:t>
             </a:r>
             <a:br/>
             <a:r>
-              <a:rPr/>
               <a:t>加藤大貴（大阪大学）</a:t>
             </a:r>
             <a:br/>
             <a:r>
-              <a:rPr/>
               <a:t>黒澤彩子（伊那中央病院）</a:t>
             </a:r>
             <a:br/>
             <a:r>
-              <a:rPr/>
               <a:t>吉内一浩（東京大学）</a:t>
             </a:r>
             <a:br/>
             <a:r>
-              <a:rPr/>
               <a:t>福田隆浩（国立がん研究センター中央病院）</a:t>
             </a:r>
           </a:p>
@@ -3178,6 +3172,9 @@
       </p:sp>
     </p:spTree>
   </p:cSld>
+  <p:clrMapOvr>
+    <a:masterClrMapping/>
+  </p:clrMapOvr>
 </p:sld>
 </file>
 
@@ -3213,11 +3210,10 @@
           <a:bodyPr/>
           <a:lstStyle/>
           <a:p>
-            <a:pPr lvl="0" indent="0" marL="0">
+            <a:pPr marL="0" lvl="0" indent="0">
               <a:buNone/>
             </a:pPr>
             <a:r>
-              <a:rPr/>
               <a:t>一律介入と最適ターゲティングの効果</a:t>
             </a:r>
           </a:p>
@@ -3238,36 +3234,67 @@
           <a:bodyPr/>
           <a:lstStyle/>
           <a:p>
-            <a:pPr lvl="0" indent="0" marL="0">
+            <a:pPr marL="0" lvl="0" indent="0">
               <a:buNone/>
             </a:pPr>
             <a:r>
-              <a:rPr/>
               <a:t>アウトカム：返信時に提供意向を示したかどうか</a:t>
             </a:r>
           </a:p>
         </p:txBody>
       </p:sp>
-      <p:graphicFrame xmlns:a="http://schemas.openxmlformats.org/drawingml/2006/main" xmlns:r="http://schemas.openxmlformats.org/officeDocument/2006/relationships" xmlns:p="http://schemas.openxmlformats.org/presentationml/2006/main">
+      <p:graphicFrame>
         <p:nvGraphicFramePr>
-          <p:cNvPr id="459957587" name=""/>
+          <p:cNvPr id="820423760" name="表 820423759"/>
           <p:cNvGraphicFramePr>
-            <a:graphicFrameLocks noGrp="true"/>
+            <a:graphicFrameLocks noGrp="1"/>
           </p:cNvGraphicFramePr>
           <p:nvPr/>
         </p:nvGraphicFramePr>
-        <p:xfrm rot="0">
+        <p:xfrm>
           <a:off x="914400" y="1828800"/>
-          <a:ext cx="9144000" cy="5486400"/>
+          <a:ext cx="5486400" cy="1844040"/>
         </p:xfrm>
         <a:graphic>
           <a:graphicData uri="http://schemas.openxmlformats.org/drawingml/2006/table">
             <a:tbl>
               <a:tblPr/>
               <a:tblGrid>
-                <a:gridCol w="1828800"/>
-                <a:gridCol w="914400"/>
-                <a:gridCol w="914400"/>
+                <a:gridCol w="1828800">
+                  <a:extLst>
+                    <a:ext uri="{9D8B030D-6E8A-4147-A177-3AD203B41FA5}">
+                      <a16:colId xmlns:a16="http://schemas.microsoft.com/office/drawing/2014/main" val="20000"/>
+                    </a:ext>
+                  </a:extLst>
+                </a:gridCol>
+                <a:gridCol w="914400">
+                  <a:extLst>
+                    <a:ext uri="{9D8B030D-6E8A-4147-A177-3AD203B41FA5}">
+                      <a16:colId xmlns:a16="http://schemas.microsoft.com/office/drawing/2014/main" val="20001"/>
+                    </a:ext>
+                  </a:extLst>
+                </a:gridCol>
+                <a:gridCol w="914400">
+                  <a:extLst>
+                    <a:ext uri="{9D8B030D-6E8A-4147-A177-3AD203B41FA5}">
+                      <a16:colId xmlns:a16="http://schemas.microsoft.com/office/drawing/2014/main" val="20002"/>
+                    </a:ext>
+                  </a:extLst>
+                </a:gridCol>
+                <a:gridCol w="914400">
+                  <a:extLst>
+                    <a:ext uri="{9D8B030D-6E8A-4147-A177-3AD203B41FA5}">
+                      <a16:colId xmlns:a16="http://schemas.microsoft.com/office/drawing/2014/main" val="20003"/>
+                    </a:ext>
+                  </a:extLst>
+                </a:gridCol>
+                <a:gridCol w="914400">
+                  <a:extLst>
+                    <a:ext uri="{9D8B030D-6E8A-4147-A177-3AD203B41FA5}">
+                      <a16:colId xmlns:a16="http://schemas.microsoft.com/office/drawing/2014/main" val="20004"/>
+                    </a:ext>
+                  </a:extLst>
+                </a:gridCol>
               </a:tblGrid>
               <a:tr h="228600">
                 <a:tc>
@@ -3275,7 +3302,7 @@
                     <a:bodyPr/>
                     <a:lstStyle/>
                     <a:p>
-                      <a:pPr algn="l" marL="63500" marR="63500">
+                      <a:pPr marL="63500" marR="63500" algn="l">
                         <a:lnSpc>
                           <a:spcPct val="100000"/>
                         </a:lnSpc>
@@ -3287,32 +3314,19 @@
                         </a:spcAft>
                         <a:buNone/>
                       </a:pPr>
-                      <a:r>
-                        <a:rPr cap="none" sz="1100" i="0" b="0" u="none">
-                          <a:solidFill>
-                            <a:srgbClr val="000000">
-                              <a:alpha val="100000"/>
-                            </a:srgbClr>
-                          </a:solidFill>
-                          <a:latin typeface="Arial"/>
-                          <a:cs typeface="Arial"/>
-                          <a:ea typeface="Arial"/>
-                          <a:sym typeface="Arial"/>
-                        </a:rPr>
-                        <a:t/>
-                      </a:r>
+                      <a:endParaRPr/>
                     </a:p>
                   </a:txBody>
-                  <a:tcPr anchor="ctr" marB="63500" marT="63500" marR="0" marL="0">
-                    <a:lnL algn="ctr" cmpd="sng" cap="flat" w="0">
+                  <a:tcPr marL="0" marR="0" marT="63500" marB="63500" anchor="ctr">
+                    <a:lnL w="0" cap="flat" cmpd="sng" algn="ctr">
                       <a:noFill/>
                       <a:prstDash val="solid"/>
                     </a:lnL>
-                    <a:lnR algn="ctr" cmpd="sng" cap="flat" w="0">
+                    <a:lnR w="0" cap="flat" cmpd="sng" algn="ctr">
                       <a:noFill/>
                       <a:prstDash val="solid"/>
                     </a:lnR>
-                    <a:lnT algn="ctr" cmpd="sng" cap="flat" w="12700">
+                    <a:lnT w="12700" cap="flat" cmpd="sng" algn="ctr">
                       <a:solidFill>
                         <a:srgbClr val="000000">
                           <a:alpha val="100000"/>
@@ -3320,7 +3334,7 @@
                       </a:solidFill>
                       <a:prstDash val="solid"/>
                     </a:lnT>
-                    <a:lnB algn="ctr" cmpd="sng" cap="flat" w="0">
+                    <a:lnB w="0" cap="flat" cmpd="sng" algn="ctr">
                       <a:noFill/>
                       <a:prstDash val="solid"/>
                     </a:lnB>
@@ -3336,7 +3350,7 @@
                     <a:bodyPr/>
                     <a:lstStyle/>
                     <a:p>
-                      <a:pPr algn="ctr" marL="63500" marR="63500">
+                      <a:pPr marL="63500" marR="63500" algn="ctr">
                         <a:lnSpc>
                           <a:spcPct val="100000"/>
                         </a:lnSpc>
@@ -3349,7 +3363,7 @@
                         <a:buNone/>
                       </a:pPr>
                       <a:r>
-                        <a:rPr cap="none" sz="1100" i="0" b="0" u="none">
+                        <a:rPr sz="1100" b="0" i="0" u="none" cap="none">
                           <a:solidFill>
                             <a:srgbClr val="000000">
                               <a:alpha val="100000"/>
@@ -3357,23 +3371,22 @@
                           </a:solidFill>
                           <a:latin typeface="Arial"/>
                           <a:cs typeface="Arial"/>
-                          <a:ea typeface="Arial"/>
                           <a:sym typeface="Arial"/>
                         </a:rPr>
-                        <a:t>Predicted treatment effect</a:t>
+                        <a:t>Targeting</a:t>
                       </a:r>
                     </a:p>
                   </a:txBody>
-                  <a:tcPr anchor="ctr" marB="63500" marT="63500" marR="0" marL="0">
-                    <a:lnL algn="ctr" cmpd="sng" cap="flat" w="0">
+                  <a:tcPr marL="0" marR="0" marT="63500" marB="63500" anchor="ctr">
+                    <a:lnL w="0" cap="flat" cmpd="sng" algn="ctr">
                       <a:noFill/>
                       <a:prstDash val="solid"/>
                     </a:lnL>
-                    <a:lnR algn="ctr" cmpd="sng" cap="flat" w="0">
+                    <a:lnR w="0" cap="flat" cmpd="sng" algn="ctr">
                       <a:noFill/>
                       <a:prstDash val="solid"/>
                     </a:lnR>
-                    <a:lnT algn="ctr" cmpd="sng" cap="flat" w="12700">
+                    <a:lnT w="12700" cap="flat" cmpd="sng" algn="ctr">
                       <a:solidFill>
                         <a:srgbClr val="000000">
                           <a:alpha val="100000"/>
@@ -3381,7 +3394,7 @@
                       </a:solidFill>
                       <a:prstDash val="solid"/>
                     </a:lnT>
-                    <a:lnB algn="ctr" cmpd="sng" cap="flat" w="0">
+                    <a:lnB w="0" cap="flat" cmpd="sng" algn="ctr">
                       <a:noFill/>
                       <a:prstDash val="solid"/>
                     </a:lnB>
@@ -3392,12 +3405,12 @@
                     </a:solidFill>
                   </a:tcPr>
                 </a:tc>
-                <a:tc hMerge="true">
+                <a:tc hMerge="1">
                   <a:txBody>
                     <a:bodyPr/>
                     <a:lstStyle/>
                     <a:p>
-                      <a:pPr algn="ctr" marL="63500" marR="63500">
+                      <a:pPr marL="63500" marR="63500" algn="ctr">
                         <a:lnSpc>
                           <a:spcPct val="100000"/>
                         </a:lnSpc>
@@ -3410,7 +3423,7 @@
                         <a:buNone/>
                       </a:pPr>
                       <a:r>
-                        <a:rPr cap="none" sz="1100" i="0" b="0" u="none">
+                        <a:rPr sz="1100" b="0" i="0" u="none" cap="none">
                           <a:solidFill>
                             <a:srgbClr val="000000">
                               <a:alpha val="100000"/>
@@ -3418,23 +3431,22 @@
                           </a:solidFill>
                           <a:latin typeface="Arial"/>
                           <a:cs typeface="Arial"/>
-                          <a:ea typeface="Arial"/>
                           <a:sym typeface="Arial"/>
                         </a:rPr>
-                        <a:t>Predicted treatment effect</a:t>
+                        <a:t>Targeting</a:t>
                       </a:r>
                     </a:p>
                   </a:txBody>
-                  <a:tcPr anchor="ctr" marB="63500" marT="63500" marR="0" marL="0">
-                    <a:lnL algn="ctr" cmpd="sng" cap="flat" w="0">
+                  <a:tcPr marL="0" marR="0" marT="63500" marB="63500" anchor="ctr">
+                    <a:lnL w="0" cap="flat" cmpd="sng" algn="ctr">
                       <a:noFill/>
                       <a:prstDash val="solid"/>
                     </a:lnL>
-                    <a:lnR algn="ctr" cmpd="sng" cap="flat" w="0">
+                    <a:lnR w="0" cap="flat" cmpd="sng" algn="ctr">
                       <a:noFill/>
                       <a:prstDash val="solid"/>
                     </a:lnR>
-                    <a:lnT algn="ctr" cmpd="sng" cap="flat" w="12700">
+                    <a:lnT w="12700" cap="flat" cmpd="sng" algn="ctr">
                       <a:solidFill>
                         <a:srgbClr val="000000">
                           <a:alpha val="100000"/>
@@ -3442,7 +3454,7 @@
                       </a:solidFill>
                       <a:prstDash val="solid"/>
                     </a:lnT>
-                    <a:lnB algn="ctr" cmpd="sng" cap="flat" w="0">
+                    <a:lnB w="0" cap="flat" cmpd="sng" algn="ctr">
                       <a:noFill/>
                       <a:prstDash val="solid"/>
                     </a:lnB>
@@ -3453,6 +3465,131 @@
                     </a:solidFill>
                   </a:tcPr>
                 </a:tc>
+                <a:tc gridSpan="2">
+                  <a:txBody>
+                    <a:bodyPr/>
+                    <a:lstStyle/>
+                    <a:p>
+                      <a:pPr marL="63500" marR="63500" algn="ctr">
+                        <a:lnSpc>
+                          <a:spcPct val="100000"/>
+                        </a:lnSpc>
+                        <a:spcBef>
+                          <a:spcPts val="500"/>
+                        </a:spcBef>
+                        <a:spcAft>
+                          <a:spcPts val="500"/>
+                        </a:spcAft>
+                        <a:buNone/>
+                      </a:pPr>
+                      <a:r>
+                        <a:rPr sz="1100" b="0" i="0" u="none" cap="none">
+                          <a:solidFill>
+                            <a:srgbClr val="000000">
+                              <a:alpha val="100000"/>
+                            </a:srgbClr>
+                          </a:solidFill>
+                          <a:latin typeface="Arial"/>
+                          <a:cs typeface="Arial"/>
+                          <a:sym typeface="Arial"/>
+                        </a:rPr>
+                        <a:t>Uniform</a:t>
+                      </a:r>
+                    </a:p>
+                  </a:txBody>
+                  <a:tcPr marL="0" marR="0" marT="63500" marB="63500" anchor="ctr">
+                    <a:lnL w="0" cap="flat" cmpd="sng" algn="ctr">
+                      <a:noFill/>
+                      <a:prstDash val="solid"/>
+                    </a:lnL>
+                    <a:lnR w="0" cap="flat" cmpd="sng" algn="ctr">
+                      <a:noFill/>
+                      <a:prstDash val="solid"/>
+                    </a:lnR>
+                    <a:lnT w="12700" cap="flat" cmpd="sng" algn="ctr">
+                      <a:solidFill>
+                        <a:srgbClr val="000000">
+                          <a:alpha val="100000"/>
+                        </a:srgbClr>
+                      </a:solidFill>
+                      <a:prstDash val="solid"/>
+                    </a:lnT>
+                    <a:lnB w="0" cap="flat" cmpd="sng" algn="ctr">
+                      <a:noFill/>
+                      <a:prstDash val="solid"/>
+                    </a:lnB>
+                    <a:solidFill>
+                      <a:srgbClr val="FFFFFF">
+                        <a:alpha val="0"/>
+                      </a:srgbClr>
+                    </a:solidFill>
+                  </a:tcPr>
+                </a:tc>
+                <a:tc hMerge="1">
+                  <a:txBody>
+                    <a:bodyPr/>
+                    <a:lstStyle/>
+                    <a:p>
+                      <a:pPr marL="63500" marR="63500" algn="ctr">
+                        <a:lnSpc>
+                          <a:spcPct val="100000"/>
+                        </a:lnSpc>
+                        <a:spcBef>
+                          <a:spcPts val="500"/>
+                        </a:spcBef>
+                        <a:spcAft>
+                          <a:spcPts val="500"/>
+                        </a:spcAft>
+                        <a:buNone/>
+                      </a:pPr>
+                      <a:r>
+                        <a:rPr sz="1100" b="0" i="0" u="none" cap="none">
+                          <a:solidFill>
+                            <a:srgbClr val="000000">
+                              <a:alpha val="100000"/>
+                            </a:srgbClr>
+                          </a:solidFill>
+                          <a:latin typeface="Arial"/>
+                          <a:cs typeface="Arial"/>
+                          <a:sym typeface="Arial"/>
+                        </a:rPr>
+                        <a:t>Uniform</a:t>
+                      </a:r>
+                    </a:p>
+                  </a:txBody>
+                  <a:tcPr marL="0" marR="0" marT="63500" marB="63500" anchor="ctr">
+                    <a:lnL w="0" cap="flat" cmpd="sng" algn="ctr">
+                      <a:noFill/>
+                      <a:prstDash val="solid"/>
+                    </a:lnL>
+                    <a:lnR w="0" cap="flat" cmpd="sng" algn="ctr">
+                      <a:noFill/>
+                      <a:prstDash val="solid"/>
+                    </a:lnR>
+                    <a:lnT w="12700" cap="flat" cmpd="sng" algn="ctr">
+                      <a:solidFill>
+                        <a:srgbClr val="000000">
+                          <a:alpha val="100000"/>
+                        </a:srgbClr>
+                      </a:solidFill>
+                      <a:prstDash val="solid"/>
+                    </a:lnT>
+                    <a:lnB w="0" cap="flat" cmpd="sng" algn="ctr">
+                      <a:noFill/>
+                      <a:prstDash val="solid"/>
+                    </a:lnB>
+                    <a:solidFill>
+                      <a:srgbClr val="FFFFFF">
+                        <a:alpha val="0"/>
+                      </a:srgbClr>
+                    </a:solidFill>
+                  </a:tcPr>
+                </a:tc>
+                <a:extLst>
+                  <a:ext uri="{0D108BD9-81ED-4DB2-BD59-A6C34878D82A}">
+                    <a16:rowId xmlns:a16="http://schemas.microsoft.com/office/drawing/2014/main" val="10000"/>
+                  </a:ext>
+                </a:extLst>
               </a:tr>
               <a:tr h="228600">
                 <a:tc>
@@ -3460,7 +3597,7 @@
                     <a:bodyPr/>
                     <a:lstStyle/>
                     <a:p>
-                      <a:pPr algn="l" marL="63500" marR="63500">
+                      <a:pPr marL="63500" marR="63500" algn="l">
                         <a:lnSpc>
                           <a:spcPct val="100000"/>
                         </a:lnSpc>
@@ -3473,7 +3610,7 @@
                         <a:buNone/>
                       </a:pPr>
                       <a:r>
-                        <a:rPr cap="none" sz="1100" i="0" b="0" u="none">
+                        <a:rPr sz="1100" b="0" i="0" u="none" cap="none">
                           <a:solidFill>
                             <a:srgbClr val="000000">
                               <a:alpha val="100000"/>
@@ -3481,27 +3618,26 @@
                           </a:solidFill>
                           <a:latin typeface="Arial"/>
                           <a:cs typeface="Arial"/>
-                          <a:ea typeface="Arial"/>
                           <a:sym typeface="Arial"/>
                         </a:rPr>
                         <a:t> </a:t>
                       </a:r>
                     </a:p>
                   </a:txBody>
-                  <a:tcPr anchor="ctr" marB="63500" marT="63500" marR="0" marL="0">
-                    <a:lnL algn="ctr" cmpd="sng" cap="flat" w="0">
+                  <a:tcPr marL="0" marR="0" marT="63500" marB="63500" anchor="ctr">
+                    <a:lnL w="0" cap="flat" cmpd="sng" algn="ctr">
                       <a:noFill/>
                       <a:prstDash val="solid"/>
                     </a:lnL>
-                    <a:lnR algn="ctr" cmpd="sng" cap="flat" w="0">
+                    <a:lnR w="0" cap="flat" cmpd="sng" algn="ctr">
                       <a:noFill/>
                       <a:prstDash val="solid"/>
                     </a:lnR>
-                    <a:lnT algn="ctr" cmpd="sng" cap="flat" w="0">
+                    <a:lnT w="0" cap="flat" cmpd="sng" algn="ctr">
                       <a:noFill/>
                       <a:prstDash val="solid"/>
                     </a:lnT>
-                    <a:lnB algn="ctr" cmpd="sng" cap="flat" w="12700">
+                    <a:lnB w="12700" cap="flat" cmpd="sng" algn="ctr">
                       <a:solidFill>
                         <a:srgbClr val="000000">
                           <a:alpha val="100000"/>
@@ -3521,7 +3657,7 @@
                     <a:bodyPr/>
                     <a:lstStyle/>
                     <a:p>
-                      <a:pPr algn="ctr" marL="63500" marR="63500">
+                      <a:pPr marL="63500" marR="63500" algn="ctr">
                         <a:lnSpc>
                           <a:spcPct val="100000"/>
                         </a:lnSpc>
@@ -3534,7 +3670,7 @@
                         <a:buNone/>
                       </a:pPr>
                       <a:r>
-                        <a:rPr cap="none" sz="1100" i="0" b="0" u="none">
+                        <a:rPr sz="1100" b="0" i="0" u="none" cap="none">
                           <a:solidFill>
                             <a:srgbClr val="000000">
                               <a:alpha val="100000"/>
@@ -3542,27 +3678,26 @@
                           </a:solidFill>
                           <a:latin typeface="Arial"/>
                           <a:cs typeface="Arial"/>
-                          <a:ea typeface="Arial"/>
                           <a:sym typeface="Arial"/>
                         </a:rPr>
                         <a:t>Mean</a:t>
                       </a:r>
                     </a:p>
                   </a:txBody>
-                  <a:tcPr anchor="ctr" marB="63500" marT="63500" marR="0" marL="0">
-                    <a:lnL algn="ctr" cmpd="sng" cap="flat" w="0">
+                  <a:tcPr marL="0" marR="0" marT="63500" marB="63500" anchor="ctr">
+                    <a:lnL w="0" cap="flat" cmpd="sng" algn="ctr">
                       <a:noFill/>
                       <a:prstDash val="solid"/>
                     </a:lnL>
-                    <a:lnR algn="ctr" cmpd="sng" cap="flat" w="0">
+                    <a:lnR w="0" cap="flat" cmpd="sng" algn="ctr">
                       <a:noFill/>
                       <a:prstDash val="solid"/>
                     </a:lnR>
-                    <a:lnT algn="ctr" cmpd="sng" cap="flat" w="0">
+                    <a:lnT w="0" cap="flat" cmpd="sng" algn="ctr">
                       <a:noFill/>
                       <a:prstDash val="solid"/>
                     </a:lnT>
-                    <a:lnB algn="ctr" cmpd="sng" cap="flat" w="12700">
+                    <a:lnB w="12700" cap="flat" cmpd="sng" algn="ctr">
                       <a:solidFill>
                         <a:srgbClr val="000000">
                           <a:alpha val="100000"/>
@@ -3582,7 +3717,7 @@
                     <a:bodyPr/>
                     <a:lstStyle/>
                     <a:p>
-                      <a:pPr algn="ctr" marL="63500" marR="63500">
+                      <a:pPr marL="63500" marR="63500" algn="ctr">
                         <a:lnSpc>
                           <a:spcPct val="100000"/>
                         </a:lnSpc>
@@ -3595,7 +3730,7 @@
                         <a:buNone/>
                       </a:pPr>
                       <a:r>
-                        <a:rPr cap="none" sz="1100" i="0" b="0" u="none">
+                        <a:rPr sz="1100" b="0" i="0" u="none" cap="none">
                           <a:solidFill>
                             <a:srgbClr val="000000">
                               <a:alpha val="100000"/>
@@ -3603,91 +3738,31 @@
                           </a:solidFill>
                           <a:latin typeface="Arial"/>
                           <a:cs typeface="Arial"/>
-                          <a:ea typeface="Arial"/>
                           <a:sym typeface="Arial"/>
                         </a:rPr>
                         <a:t>SD</a:t>
                       </a:r>
                     </a:p>
                   </a:txBody>
-                  <a:tcPr anchor="ctr" marB="63500" marT="63500" marR="0" marL="0">
-                    <a:lnL algn="ctr" cmpd="sng" cap="flat" w="0">
+                  <a:tcPr marL="0" marR="0" marT="63500" marB="63500" anchor="ctr">
+                    <a:lnL w="0" cap="flat" cmpd="sng" algn="ctr">
                       <a:noFill/>
                       <a:prstDash val="solid"/>
                     </a:lnL>
-                    <a:lnR algn="ctr" cmpd="sng" cap="flat" w="0">
+                    <a:lnR w="0" cap="flat" cmpd="sng" algn="ctr">
                       <a:noFill/>
                       <a:prstDash val="solid"/>
                     </a:lnR>
-                    <a:lnT algn="ctr" cmpd="sng" cap="flat" w="0">
+                    <a:lnT w="0" cap="flat" cmpd="sng" algn="ctr">
                       <a:noFill/>
                       <a:prstDash val="solid"/>
                     </a:lnT>
-                    <a:lnB algn="ctr" cmpd="sng" cap="flat" w="12700">
+                    <a:lnB w="12700" cap="flat" cmpd="sng" algn="ctr">
                       <a:solidFill>
                         <a:srgbClr val="000000">
                           <a:alpha val="100000"/>
                         </a:srgbClr>
                       </a:solidFill>
-                      <a:prstDash val="solid"/>
-                    </a:lnB>
-                    <a:solidFill>
-                      <a:srgbClr val="FFFFFF">
-                        <a:alpha val="0"/>
-                      </a:srgbClr>
-                    </a:solidFill>
-                  </a:tcPr>
-                </a:tc>
-              </a:tr>
-              <a:tr h="228600">
-                <a:tc>
-                  <a:txBody>
-                    <a:bodyPr/>
-                    <a:lstStyle/>
-                    <a:p>
-                      <a:pPr algn="l" marL="63500" marR="63500">
-                        <a:lnSpc>
-                          <a:spcPct val="100000"/>
-                        </a:lnSpc>
-                        <a:spcBef>
-                          <a:spcPts val="500"/>
-                        </a:spcBef>
-                        <a:spcAft>
-                          <a:spcPts val="500"/>
-                        </a:spcAft>
-                        <a:buNone/>
-                      </a:pPr>
-                      <a:r>
-                        <a:rPr cap="none" sz="1100" i="0" b="0" u="none">
-                          <a:solidFill>
-                            <a:srgbClr val="000000">
-                              <a:alpha val="100000"/>
-                            </a:srgbClr>
-                          </a:solidFill>
-                          <a:latin typeface="Arial"/>
-                          <a:cs typeface="Arial"/>
-                          <a:ea typeface="Arial"/>
-                          <a:sym typeface="Arial"/>
-                        </a:rPr>
-                        <a:t>Treatment B (uniform)</a:t>
-                      </a:r>
-                    </a:p>
-                  </a:txBody>
-                  <a:tcPr anchor="ctr" marB="63500" marT="63500" marR="0" marL="0">
-                    <a:lnL algn="ctr" cmpd="sng" cap="flat" w="0">
-                      <a:noFill/>
-                      <a:prstDash val="solid"/>
-                    </a:lnL>
-                    <a:lnR algn="ctr" cmpd="sng" cap="flat" w="0">
-                      <a:noFill/>
-                      <a:prstDash val="solid"/>
-                    </a:lnR>
-                    <a:lnT algn="ctr" cmpd="sng" cap="flat" w="0">
-                      <a:noFill/>
-                      <a:prstDash val="solid"/>
-                    </a:lnT>
-                    <a:lnB algn="ctr" cmpd="sng" cap="flat" w="0">
-                      <a:noFill/>
                       <a:prstDash val="solid"/>
                     </a:lnB>
                     <a:solidFill>
@@ -3702,7 +3777,7 @@
                     <a:bodyPr/>
                     <a:lstStyle/>
                     <a:p>
-                      <a:pPr algn="ctr" marL="63500" marR="63500">
+                      <a:pPr marL="63500" marR="63500" algn="ctr">
                         <a:lnSpc>
                           <a:spcPct val="100000"/>
                         </a:lnSpc>
@@ -3715,7 +3790,7 @@
                         <a:buNone/>
                       </a:pPr>
                       <a:r>
-                        <a:rPr cap="none" sz="1100" i="0" b="0" u="none">
+                        <a:rPr sz="1100" b="0" i="0" u="none" cap="none">
                           <a:solidFill>
                             <a:srgbClr val="000000">
                               <a:alpha val="100000"/>
@@ -3723,28 +3798,31 @@
                           </a:solidFill>
                           <a:latin typeface="Arial"/>
                           <a:cs typeface="Arial"/>
-                          <a:ea typeface="Arial"/>
                           <a:sym typeface="Arial"/>
                         </a:rPr>
-                        <a:t>0.0206</a:t>
+                        <a:t>Mean</a:t>
                       </a:r>
                     </a:p>
                   </a:txBody>
-                  <a:tcPr anchor="ctr" marB="63500" marT="63500" marR="0" marL="0">
-                    <a:lnL algn="ctr" cmpd="sng" cap="flat" w="0">
+                  <a:tcPr marL="0" marR="0" marT="63500" marB="63500" anchor="ctr">
+                    <a:lnL w="0" cap="flat" cmpd="sng" algn="ctr">
                       <a:noFill/>
                       <a:prstDash val="solid"/>
                     </a:lnL>
-                    <a:lnR algn="ctr" cmpd="sng" cap="flat" w="0">
+                    <a:lnR w="0" cap="flat" cmpd="sng" algn="ctr">
                       <a:noFill/>
                       <a:prstDash val="solid"/>
                     </a:lnR>
-                    <a:lnT algn="ctr" cmpd="sng" cap="flat" w="0">
+                    <a:lnT w="0" cap="flat" cmpd="sng" algn="ctr">
                       <a:noFill/>
                       <a:prstDash val="solid"/>
                     </a:lnT>
-                    <a:lnB algn="ctr" cmpd="sng" cap="flat" w="0">
-                      <a:noFill/>
+                    <a:lnB w="12700" cap="flat" cmpd="sng" algn="ctr">
+                      <a:solidFill>
+                        <a:srgbClr val="000000">
+                          <a:alpha val="100000"/>
+                        </a:srgbClr>
+                      </a:solidFill>
                       <a:prstDash val="solid"/>
                     </a:lnB>
                     <a:solidFill>
@@ -3759,7 +3837,7 @@
                     <a:bodyPr/>
                     <a:lstStyle/>
                     <a:p>
-                      <a:pPr algn="ctr" marL="63500" marR="63500">
+                      <a:pPr marL="63500" marR="63500" algn="ctr">
                         <a:lnSpc>
                           <a:spcPct val="100000"/>
                         </a:lnSpc>
@@ -3772,7 +3850,7 @@
                         <a:buNone/>
                       </a:pPr>
                       <a:r>
-                        <a:rPr cap="none" sz="1100" i="0" b="0" u="none">
+                        <a:rPr sz="1100" b="0" i="0" u="none" cap="none">
                           <a:solidFill>
                             <a:srgbClr val="000000">
                               <a:alpha val="100000"/>
@@ -3780,28 +3858,31 @@
                           </a:solidFill>
                           <a:latin typeface="Arial"/>
                           <a:cs typeface="Arial"/>
-                          <a:ea typeface="Arial"/>
                           <a:sym typeface="Arial"/>
                         </a:rPr>
-                        <a:t>0.0570</a:t>
+                        <a:t>SD</a:t>
                       </a:r>
                     </a:p>
                   </a:txBody>
-                  <a:tcPr anchor="ctr" marB="63500" marT="63500" marR="0" marL="0">
-                    <a:lnL algn="ctr" cmpd="sng" cap="flat" w="0">
+                  <a:tcPr marL="0" marR="0" marT="63500" marB="63500" anchor="ctr">
+                    <a:lnL w="0" cap="flat" cmpd="sng" algn="ctr">
                       <a:noFill/>
                       <a:prstDash val="solid"/>
                     </a:lnL>
-                    <a:lnR algn="ctr" cmpd="sng" cap="flat" w="0">
+                    <a:lnR w="0" cap="flat" cmpd="sng" algn="ctr">
                       <a:noFill/>
                       <a:prstDash val="solid"/>
                     </a:lnR>
-                    <a:lnT algn="ctr" cmpd="sng" cap="flat" w="0">
+                    <a:lnT w="0" cap="flat" cmpd="sng" algn="ctr">
                       <a:noFill/>
                       <a:prstDash val="solid"/>
                     </a:lnT>
-                    <a:lnB algn="ctr" cmpd="sng" cap="flat" w="0">
-                      <a:noFill/>
+                    <a:lnB w="12700" cap="flat" cmpd="sng" algn="ctr">
+                      <a:solidFill>
+                        <a:srgbClr val="000000">
+                          <a:alpha val="100000"/>
+                        </a:srgbClr>
+                      </a:solidFill>
                       <a:prstDash val="solid"/>
                     </a:lnB>
                     <a:solidFill>
@@ -3811,6 +3892,11 @@
                     </a:solidFill>
                   </a:tcPr>
                 </a:tc>
+                <a:extLst>
+                  <a:ext uri="{0D108BD9-81ED-4DB2-BD59-A6C34878D82A}">
+                    <a16:rowId xmlns:a16="http://schemas.microsoft.com/office/drawing/2014/main" val="10001"/>
+                  </a:ext>
+                </a:extLst>
               </a:tr>
               <a:tr h="228600">
                 <a:tc>
@@ -3818,7 +3904,7 @@
                     <a:bodyPr/>
                     <a:lstStyle/>
                     <a:p>
-                      <a:pPr algn="l" marL="63500" marR="63500">
+                      <a:pPr marL="63500" marR="63500" algn="l">
                         <a:lnSpc>
                           <a:spcPct val="100000"/>
                         </a:lnSpc>
@@ -3831,7 +3917,7 @@
                         <a:buNone/>
                       </a:pPr>
                       <a:r>
-                        <a:rPr cap="none" sz="1100" i="0" b="0" u="none">
+                        <a:rPr sz="1100" b="0" i="0" u="none" cap="none">
                           <a:solidFill>
                             <a:srgbClr val="000000">
                               <a:alpha val="100000"/>
@@ -3839,27 +3925,31 @@
                           </a:solidFill>
                           <a:latin typeface="Arial"/>
                           <a:cs typeface="Arial"/>
-                          <a:ea typeface="Arial"/>
                           <a:sym typeface="Arial"/>
                         </a:rPr>
-                        <a:t>Treatment C (uniform)</a:t>
+                        <a:t>Treatment B</a:t>
                       </a:r>
                     </a:p>
                   </a:txBody>
-                  <a:tcPr anchor="ctr" marB="63500" marT="63500" marR="0" marL="0">
-                    <a:lnL algn="ctr" cmpd="sng" cap="flat" w="0">
+                  <a:tcPr marL="0" marR="0" marT="63500" marB="63500" anchor="ctr">
+                    <a:lnL w="0" cap="flat" cmpd="sng" algn="ctr">
                       <a:noFill/>
                       <a:prstDash val="solid"/>
                     </a:lnL>
-                    <a:lnR algn="ctr" cmpd="sng" cap="flat" w="0">
+                    <a:lnR w="0" cap="flat" cmpd="sng" algn="ctr">
                       <a:noFill/>
                       <a:prstDash val="solid"/>
                     </a:lnR>
-                    <a:lnT algn="ctr" cmpd="sng" cap="flat" w="0">
-                      <a:noFill/>
-                      <a:prstDash val="solid"/>
+                    <a:lnT w="12700" cap="flat" cmpd="sng" algn="ctr">
+                      <a:solidFill>
+                        <a:srgbClr val="000000"/>
+                      </a:solidFill>
+                      <a:prstDash val="solid"/>
+                      <a:round/>
+                      <a:headEnd type="none" w="med" len="med"/>
+                      <a:tailEnd type="none" w="med" len="med"/>
                     </a:lnT>
-                    <a:lnB algn="ctr" cmpd="sng" cap="flat" w="0">
+                    <a:lnB w="0" cap="flat" cmpd="sng" algn="ctr">
                       <a:noFill/>
                       <a:prstDash val="solid"/>
                     </a:lnB>
@@ -3875,7 +3965,7 @@
                     <a:bodyPr/>
                     <a:lstStyle/>
                     <a:p>
-                      <a:pPr algn="ctr" marL="63500" marR="63500">
+                      <a:pPr marL="63500" marR="63500" algn="ctr">
                         <a:lnSpc>
                           <a:spcPct val="100000"/>
                         </a:lnSpc>
@@ -3888,7 +3978,7 @@
                         <a:buNone/>
                       </a:pPr>
                       <a:r>
-                        <a:rPr cap="none" sz="1100" i="0" b="0" u="none">
+                        <a:rPr sz="1100" b="0" i="0" u="none" cap="none">
                           <a:solidFill>
                             <a:srgbClr val="000000">
                               <a:alpha val="100000"/>
@@ -3896,27 +3986,31 @@
                           </a:solidFill>
                           <a:latin typeface="Arial"/>
                           <a:cs typeface="Arial"/>
-                          <a:ea typeface="Arial"/>
                           <a:sym typeface="Arial"/>
                         </a:rPr>
-                        <a:t>-0.0019</a:t>
+                        <a:t>0.0336</a:t>
                       </a:r>
                     </a:p>
                   </a:txBody>
-                  <a:tcPr anchor="ctr" marB="63500" marT="63500" marR="0" marL="0">
-                    <a:lnL algn="ctr" cmpd="sng" cap="flat" w="0">
+                  <a:tcPr marL="0" marR="0" marT="63500" marB="63500" anchor="ctr">
+                    <a:lnL w="0" cap="flat" cmpd="sng" algn="ctr">
                       <a:noFill/>
                       <a:prstDash val="solid"/>
                     </a:lnL>
-                    <a:lnR algn="ctr" cmpd="sng" cap="flat" w="0">
+                    <a:lnR w="0" cap="flat" cmpd="sng" algn="ctr">
                       <a:noFill/>
                       <a:prstDash val="solid"/>
                     </a:lnR>
-                    <a:lnT algn="ctr" cmpd="sng" cap="flat" w="0">
-                      <a:noFill/>
-                      <a:prstDash val="solid"/>
+                    <a:lnT w="12700" cap="flat" cmpd="sng" algn="ctr">
+                      <a:solidFill>
+                        <a:srgbClr val="000000"/>
+                      </a:solidFill>
+                      <a:prstDash val="solid"/>
+                      <a:round/>
+                      <a:headEnd type="none" w="med" len="med"/>
+                      <a:tailEnd type="none" w="med" len="med"/>
                     </a:lnT>
-                    <a:lnB algn="ctr" cmpd="sng" cap="flat" w="0">
+                    <a:lnB w="0" cap="flat" cmpd="sng" algn="ctr">
                       <a:noFill/>
                       <a:prstDash val="solid"/>
                     </a:lnB>
@@ -3932,7 +4026,7 @@
                     <a:bodyPr/>
                     <a:lstStyle/>
                     <a:p>
-                      <a:pPr algn="ctr" marL="63500" marR="63500">
+                      <a:pPr marL="63500" marR="63500" algn="ctr">
                         <a:lnSpc>
                           <a:spcPct val="100000"/>
                         </a:lnSpc>
@@ -3945,7 +4039,7 @@
                         <a:buNone/>
                       </a:pPr>
                       <a:r>
-                        <a:rPr cap="none" sz="1100" i="0" b="0" u="none">
+                        <a:rPr sz="1100" b="0" i="0" u="none" cap="none">
                           <a:solidFill>
                             <a:srgbClr val="000000">
                               <a:alpha val="100000"/>
@@ -3953,86 +4047,31 @@
                           </a:solidFill>
                           <a:latin typeface="Arial"/>
                           <a:cs typeface="Arial"/>
-                          <a:ea typeface="Arial"/>
                           <a:sym typeface="Arial"/>
                         </a:rPr>
-                        <a:t>0.0598</a:t>
+                        <a:t>0.0422</a:t>
                       </a:r>
                     </a:p>
                   </a:txBody>
-                  <a:tcPr anchor="ctr" marB="63500" marT="63500" marR="0" marL="0">
-                    <a:lnL algn="ctr" cmpd="sng" cap="flat" w="0">
+                  <a:tcPr marL="0" marR="0" marT="63500" marB="63500" anchor="ctr">
+                    <a:lnL w="0" cap="flat" cmpd="sng" algn="ctr">
                       <a:noFill/>
                       <a:prstDash val="solid"/>
                     </a:lnL>
-                    <a:lnR algn="ctr" cmpd="sng" cap="flat" w="0">
+                    <a:lnR w="0" cap="flat" cmpd="sng" algn="ctr">
                       <a:noFill/>
                       <a:prstDash val="solid"/>
                     </a:lnR>
-                    <a:lnT algn="ctr" cmpd="sng" cap="flat" w="0">
-                      <a:noFill/>
-                      <a:prstDash val="solid"/>
+                    <a:lnT w="12700" cap="flat" cmpd="sng" algn="ctr">
+                      <a:solidFill>
+                        <a:srgbClr val="000000"/>
+                      </a:solidFill>
+                      <a:prstDash val="solid"/>
+                      <a:round/>
+                      <a:headEnd type="none" w="med" len="med"/>
+                      <a:tailEnd type="none" w="med" len="med"/>
                     </a:lnT>
-                    <a:lnB algn="ctr" cmpd="sng" cap="flat" w="0">
-                      <a:noFill/>
-                      <a:prstDash val="solid"/>
-                    </a:lnB>
-                    <a:solidFill>
-                      <a:srgbClr val="FFFFFF">
-                        <a:alpha val="0"/>
-                      </a:srgbClr>
-                    </a:solidFill>
-                  </a:tcPr>
-                </a:tc>
-              </a:tr>
-              <a:tr h="228600">
-                <a:tc>
-                  <a:txBody>
-                    <a:bodyPr/>
-                    <a:lstStyle/>
-                    <a:p>
-                      <a:pPr algn="l" marL="63500" marR="63500">
-                        <a:lnSpc>
-                          <a:spcPct val="100000"/>
-                        </a:lnSpc>
-                        <a:spcBef>
-                          <a:spcPts val="500"/>
-                        </a:spcBef>
-                        <a:spcAft>
-                          <a:spcPts val="500"/>
-                        </a:spcAft>
-                        <a:buNone/>
-                      </a:pPr>
-                      <a:r>
-                        <a:rPr cap="none" sz="1100" i="0" b="0" u="none">
-                          <a:solidFill>
-                            <a:srgbClr val="000000">
-                              <a:alpha val="100000"/>
-                            </a:srgbClr>
-                          </a:solidFill>
-                          <a:latin typeface="Arial"/>
-                          <a:cs typeface="Arial"/>
-                          <a:ea typeface="Arial"/>
-                          <a:sym typeface="Arial"/>
-                        </a:rPr>
-                        <a:t>Treatment D (uniform)</a:t>
-                      </a:r>
-                    </a:p>
-                  </a:txBody>
-                  <a:tcPr anchor="ctr" marB="63500" marT="63500" marR="0" marL="0">
-                    <a:lnL algn="ctr" cmpd="sng" cap="flat" w="0">
-                      <a:noFill/>
-                      <a:prstDash val="solid"/>
-                    </a:lnL>
-                    <a:lnR algn="ctr" cmpd="sng" cap="flat" w="0">
-                      <a:noFill/>
-                      <a:prstDash val="solid"/>
-                    </a:lnR>
-                    <a:lnT algn="ctr" cmpd="sng" cap="flat" w="0">
-                      <a:noFill/>
-                      <a:prstDash val="solid"/>
-                    </a:lnT>
-                    <a:lnB algn="ctr" cmpd="sng" cap="flat" w="0">
+                    <a:lnB w="0" cap="flat" cmpd="sng" algn="ctr">
                       <a:noFill/>
                       <a:prstDash val="solid"/>
                     </a:lnB>
@@ -4048,7 +4087,7 @@
                     <a:bodyPr/>
                     <a:lstStyle/>
                     <a:p>
-                      <a:pPr algn="ctr" marL="63500" marR="63500">
+                      <a:pPr marL="63500" marR="63500" algn="ctr">
                         <a:lnSpc>
                           <a:spcPct val="100000"/>
                         </a:lnSpc>
@@ -4061,7 +4100,7 @@
                         <a:buNone/>
                       </a:pPr>
                       <a:r>
-                        <a:rPr cap="none" sz="1100" i="0" b="0" u="none">
+                        <a:rPr sz="1100" b="0" i="0" u="none" cap="none">
                           <a:solidFill>
                             <a:srgbClr val="000000">
                               <a:alpha val="100000"/>
@@ -4069,27 +4108,31 @@
                           </a:solidFill>
                           <a:latin typeface="Arial"/>
                           <a:cs typeface="Arial"/>
-                          <a:ea typeface="Arial"/>
                           <a:sym typeface="Arial"/>
                         </a:rPr>
-                        <a:t>0.0079</a:t>
+                        <a:t>0.0206</a:t>
                       </a:r>
                     </a:p>
                   </a:txBody>
-                  <a:tcPr anchor="ctr" marB="63500" marT="63500" marR="0" marL="0">
-                    <a:lnL algn="ctr" cmpd="sng" cap="flat" w="0">
+                  <a:tcPr marL="0" marR="0" marT="63500" marB="63500" anchor="ctr">
+                    <a:lnL w="0" cap="flat" cmpd="sng" algn="ctr">
                       <a:noFill/>
                       <a:prstDash val="solid"/>
                     </a:lnL>
-                    <a:lnR algn="ctr" cmpd="sng" cap="flat" w="0">
+                    <a:lnR w="0" cap="flat" cmpd="sng" algn="ctr">
                       <a:noFill/>
                       <a:prstDash val="solid"/>
                     </a:lnR>
-                    <a:lnT algn="ctr" cmpd="sng" cap="flat" w="0">
-                      <a:noFill/>
-                      <a:prstDash val="solid"/>
+                    <a:lnT w="12700" cap="flat" cmpd="sng" algn="ctr">
+                      <a:solidFill>
+                        <a:srgbClr val="000000"/>
+                      </a:solidFill>
+                      <a:prstDash val="solid"/>
+                      <a:round/>
+                      <a:headEnd type="none" w="med" len="med"/>
+                      <a:tailEnd type="none" w="med" len="med"/>
                     </a:lnT>
-                    <a:lnB algn="ctr" cmpd="sng" cap="flat" w="0">
+                    <a:lnB w="0" cap="flat" cmpd="sng" algn="ctr">
                       <a:noFill/>
                       <a:prstDash val="solid"/>
                     </a:lnB>
@@ -4105,7 +4148,7 @@
                     <a:bodyPr/>
                     <a:lstStyle/>
                     <a:p>
-                      <a:pPr algn="ctr" marL="63500" marR="63500">
+                      <a:pPr marL="63500" marR="63500" algn="ctr">
                         <a:lnSpc>
                           <a:spcPct val="100000"/>
                         </a:lnSpc>
@@ -4118,7 +4161,7 @@
                         <a:buNone/>
                       </a:pPr>
                       <a:r>
-                        <a:rPr cap="none" sz="1100" i="0" b="0" u="none">
+                        <a:rPr sz="1100" b="0" i="0" u="none" cap="none">
                           <a:solidFill>
                             <a:srgbClr val="000000">
                               <a:alpha val="100000"/>
@@ -4126,27 +4169,31 @@
                           </a:solidFill>
                           <a:latin typeface="Arial"/>
                           <a:cs typeface="Arial"/>
-                          <a:ea typeface="Arial"/>
                           <a:sym typeface="Arial"/>
                         </a:rPr>
-                        <a:t>0.0628</a:t>
+                        <a:t>0.0570</a:t>
                       </a:r>
                     </a:p>
                   </a:txBody>
-                  <a:tcPr anchor="ctr" marB="63500" marT="63500" marR="0" marL="0">
-                    <a:lnL algn="ctr" cmpd="sng" cap="flat" w="0">
+                  <a:tcPr marL="0" marR="0" marT="63500" marB="63500" anchor="ctr">
+                    <a:lnL w="0" cap="flat" cmpd="sng" algn="ctr">
                       <a:noFill/>
                       <a:prstDash val="solid"/>
                     </a:lnL>
-                    <a:lnR algn="ctr" cmpd="sng" cap="flat" w="0">
+                    <a:lnR w="0" cap="flat" cmpd="sng" algn="ctr">
                       <a:noFill/>
                       <a:prstDash val="solid"/>
                     </a:lnR>
-                    <a:lnT algn="ctr" cmpd="sng" cap="flat" w="0">
-                      <a:noFill/>
-                      <a:prstDash val="solid"/>
+                    <a:lnT w="12700" cap="flat" cmpd="sng" algn="ctr">
+                      <a:solidFill>
+                        <a:srgbClr val="000000"/>
+                      </a:solidFill>
+                      <a:prstDash val="solid"/>
+                      <a:round/>
+                      <a:headEnd type="none" w="med" len="med"/>
+                      <a:tailEnd type="none" w="med" len="med"/>
                     </a:lnT>
-                    <a:lnB algn="ctr" cmpd="sng" cap="flat" w="0">
+                    <a:lnB w="0" cap="flat" cmpd="sng" algn="ctr">
                       <a:noFill/>
                       <a:prstDash val="solid"/>
                     </a:lnB>
@@ -4157,6 +4204,11 @@
                     </a:solidFill>
                   </a:tcPr>
                 </a:tc>
+                <a:extLst>
+                  <a:ext uri="{0D108BD9-81ED-4DB2-BD59-A6C34878D82A}">
+                    <a16:rowId xmlns:a16="http://schemas.microsoft.com/office/drawing/2014/main" val="10002"/>
+                  </a:ext>
+                </a:extLst>
               </a:tr>
               <a:tr h="228600">
                 <a:tc>
@@ -4164,7 +4216,7 @@
                     <a:bodyPr/>
                     <a:lstStyle/>
                     <a:p>
-                      <a:pPr algn="l" marL="63500" marR="63500">
+                      <a:pPr marL="63500" marR="63500" algn="l">
                         <a:lnSpc>
                           <a:spcPct val="100000"/>
                         </a:lnSpc>
@@ -4177,7 +4229,7 @@
                         <a:buNone/>
                       </a:pPr>
                       <a:r>
-                        <a:rPr cap="none" sz="1100" i="0" b="0" u="none">
+                        <a:rPr sz="1100" b="0" i="0" u="none" cap="none">
                           <a:solidFill>
                             <a:srgbClr val="000000">
                               <a:alpha val="100000"/>
@@ -4185,32 +4237,27 @@
                           </a:solidFill>
                           <a:latin typeface="Arial"/>
                           <a:cs typeface="Arial"/>
-                          <a:ea typeface="Arial"/>
                           <a:sym typeface="Arial"/>
                         </a:rPr>
-                        <a:t>Optimum targeting</a:t>
+                        <a:t>Treatment C</a:t>
                       </a:r>
                     </a:p>
                   </a:txBody>
-                  <a:tcPr anchor="ctr" marB="63500" marT="63500" marR="0" marL="0">
-                    <a:lnL algn="ctr" cmpd="sng" cap="flat" w="0">
+                  <a:tcPr marL="0" marR="0" marT="63500" marB="63500" anchor="ctr">
+                    <a:lnL w="0" cap="flat" cmpd="sng" algn="ctr">
                       <a:noFill/>
                       <a:prstDash val="solid"/>
                     </a:lnL>
-                    <a:lnR algn="ctr" cmpd="sng" cap="flat" w="0">
+                    <a:lnR w="0" cap="flat" cmpd="sng" algn="ctr">
                       <a:noFill/>
                       <a:prstDash val="solid"/>
                     </a:lnR>
-                    <a:lnT algn="ctr" cmpd="sng" cap="flat" w="0">
+                    <a:lnT w="0" cap="flat" cmpd="sng" algn="ctr">
                       <a:noFill/>
                       <a:prstDash val="solid"/>
                     </a:lnT>
-                    <a:lnB algn="ctr" cmpd="sng" cap="flat" w="12700">
-                      <a:solidFill>
-                        <a:srgbClr val="000000">
-                          <a:alpha val="100000"/>
-                        </a:srgbClr>
-                      </a:solidFill>
+                    <a:lnB w="0" cap="flat" cmpd="sng" algn="ctr">
+                      <a:noFill/>
                       <a:prstDash val="solid"/>
                     </a:lnB>
                     <a:solidFill>
@@ -4225,7 +4272,7 @@
                     <a:bodyPr/>
                     <a:lstStyle/>
                     <a:p>
-                      <a:pPr algn="ctr" marL="63500" marR="63500">
+                      <a:pPr marL="63500" marR="63500" algn="ctr">
                         <a:lnSpc>
                           <a:spcPct val="100000"/>
                         </a:lnSpc>
@@ -4238,7 +4285,7 @@
                         <a:buNone/>
                       </a:pPr>
                       <a:r>
-                        <a:rPr cap="none" sz="1100" i="0" b="0" u="none">
+                        <a:rPr sz="1100" b="0" i="0" u="none" cap="none">
                           <a:solidFill>
                             <a:srgbClr val="000000">
                               <a:alpha val="100000"/>
@@ -4246,32 +4293,27 @@
                           </a:solidFill>
                           <a:latin typeface="Arial"/>
                           <a:cs typeface="Arial"/>
-                          <a:ea typeface="Arial"/>
                           <a:sym typeface="Arial"/>
                         </a:rPr>
-                        <a:t>0.0473</a:t>
+                        <a:t>0.0230</a:t>
                       </a:r>
                     </a:p>
                   </a:txBody>
-                  <a:tcPr anchor="ctr" marB="63500" marT="63500" marR="0" marL="0">
-                    <a:lnL algn="ctr" cmpd="sng" cap="flat" w="0">
+                  <a:tcPr marL="0" marR="0" marT="63500" marB="63500" anchor="ctr">
+                    <a:lnL w="0" cap="flat" cmpd="sng" algn="ctr">
                       <a:noFill/>
                       <a:prstDash val="solid"/>
                     </a:lnL>
-                    <a:lnR algn="ctr" cmpd="sng" cap="flat" w="0">
+                    <a:lnR w="0" cap="flat" cmpd="sng" algn="ctr">
                       <a:noFill/>
                       <a:prstDash val="solid"/>
                     </a:lnR>
-                    <a:lnT algn="ctr" cmpd="sng" cap="flat" w="0">
+                    <a:lnT w="0" cap="flat" cmpd="sng" algn="ctr">
                       <a:noFill/>
                       <a:prstDash val="solid"/>
                     </a:lnT>
-                    <a:lnB algn="ctr" cmpd="sng" cap="flat" w="12700">
-                      <a:solidFill>
-                        <a:srgbClr val="000000">
-                          <a:alpha val="100000"/>
-                        </a:srgbClr>
-                      </a:solidFill>
+                    <a:lnB w="0" cap="flat" cmpd="sng" algn="ctr">
+                      <a:noFill/>
                       <a:prstDash val="solid"/>
                     </a:lnB>
                     <a:solidFill>
@@ -4286,7 +4328,7 @@
                     <a:bodyPr/>
                     <a:lstStyle/>
                     <a:p>
-                      <a:pPr algn="ctr" marL="63500" marR="63500">
+                      <a:pPr marL="63500" marR="63500" algn="ctr">
                         <a:lnSpc>
                           <a:spcPct val="100000"/>
                         </a:lnSpc>
@@ -4299,7 +4341,7 @@
                         <a:buNone/>
                       </a:pPr>
                       <a:r>
-                        <a:rPr cap="none" sz="1100" i="0" b="0" u="none">
+                        <a:rPr sz="1100" b="0" i="0" u="none" cap="none">
                           <a:solidFill>
                             <a:srgbClr val="000000">
                               <a:alpha val="100000"/>
@@ -4307,32 +4349,27 @@
                           </a:solidFill>
                           <a:latin typeface="Arial"/>
                           <a:cs typeface="Arial"/>
-                          <a:ea typeface="Arial"/>
                           <a:sym typeface="Arial"/>
                         </a:rPr>
-                        <a:t>0.0530</a:t>
+                        <a:t>0.0336</a:t>
                       </a:r>
                     </a:p>
                   </a:txBody>
-                  <a:tcPr anchor="ctr" marB="63500" marT="63500" marR="0" marL="0">
-                    <a:lnL algn="ctr" cmpd="sng" cap="flat" w="0">
+                  <a:tcPr marL="0" marR="0" marT="63500" marB="63500" anchor="ctr">
+                    <a:lnL w="0" cap="flat" cmpd="sng" algn="ctr">
                       <a:noFill/>
                       <a:prstDash val="solid"/>
                     </a:lnL>
-                    <a:lnR algn="ctr" cmpd="sng" cap="flat" w="0">
+                    <a:lnR w="0" cap="flat" cmpd="sng" algn="ctr">
                       <a:noFill/>
                       <a:prstDash val="solid"/>
                     </a:lnR>
-                    <a:lnT algn="ctr" cmpd="sng" cap="flat" w="0">
+                    <a:lnT w="0" cap="flat" cmpd="sng" algn="ctr">
                       <a:noFill/>
                       <a:prstDash val="solid"/>
                     </a:lnT>
-                    <a:lnB algn="ctr" cmpd="sng" cap="flat" w="12700">
-                      <a:solidFill>
-                        <a:srgbClr val="000000">
-                          <a:alpha val="100000"/>
-                        </a:srgbClr>
-                      </a:solidFill>
+                    <a:lnB w="0" cap="flat" cmpd="sng" algn="ctr">
+                      <a:noFill/>
                       <a:prstDash val="solid"/>
                     </a:lnB>
                     <a:solidFill>
@@ -4342,6 +4379,693 @@
                     </a:solidFill>
                   </a:tcPr>
                 </a:tc>
+                <a:tc>
+                  <a:txBody>
+                    <a:bodyPr/>
+                    <a:lstStyle/>
+                    <a:p>
+                      <a:pPr marL="63500" marR="63500" algn="ctr">
+                        <a:lnSpc>
+                          <a:spcPct val="100000"/>
+                        </a:lnSpc>
+                        <a:spcBef>
+                          <a:spcPts val="500"/>
+                        </a:spcBef>
+                        <a:spcAft>
+                          <a:spcPts val="500"/>
+                        </a:spcAft>
+                        <a:buNone/>
+                      </a:pPr>
+                      <a:r>
+                        <a:rPr sz="1100" b="0" i="0" u="none" cap="none">
+                          <a:solidFill>
+                            <a:srgbClr val="000000">
+                              <a:alpha val="100000"/>
+                            </a:srgbClr>
+                          </a:solidFill>
+                          <a:latin typeface="Arial"/>
+                          <a:cs typeface="Arial"/>
+                          <a:sym typeface="Arial"/>
+                        </a:rPr>
+                        <a:t>-0.0019</a:t>
+                      </a:r>
+                    </a:p>
+                  </a:txBody>
+                  <a:tcPr marL="0" marR="0" marT="63500" marB="63500" anchor="ctr">
+                    <a:lnL w="0" cap="flat" cmpd="sng" algn="ctr">
+                      <a:noFill/>
+                      <a:prstDash val="solid"/>
+                    </a:lnL>
+                    <a:lnR w="0" cap="flat" cmpd="sng" algn="ctr">
+                      <a:noFill/>
+                      <a:prstDash val="solid"/>
+                    </a:lnR>
+                    <a:lnT w="0" cap="flat" cmpd="sng" algn="ctr">
+                      <a:noFill/>
+                      <a:prstDash val="solid"/>
+                    </a:lnT>
+                    <a:lnB w="0" cap="flat" cmpd="sng" algn="ctr">
+                      <a:noFill/>
+                      <a:prstDash val="solid"/>
+                    </a:lnB>
+                    <a:solidFill>
+                      <a:srgbClr val="FFFFFF">
+                        <a:alpha val="0"/>
+                      </a:srgbClr>
+                    </a:solidFill>
+                  </a:tcPr>
+                </a:tc>
+                <a:tc>
+                  <a:txBody>
+                    <a:bodyPr/>
+                    <a:lstStyle/>
+                    <a:p>
+                      <a:pPr marL="63500" marR="63500" algn="ctr">
+                        <a:lnSpc>
+                          <a:spcPct val="100000"/>
+                        </a:lnSpc>
+                        <a:spcBef>
+                          <a:spcPts val="500"/>
+                        </a:spcBef>
+                        <a:spcAft>
+                          <a:spcPts val="500"/>
+                        </a:spcAft>
+                        <a:buNone/>
+                      </a:pPr>
+                      <a:r>
+                        <a:rPr sz="1100" b="0" i="0" u="none" cap="none">
+                          <a:solidFill>
+                            <a:srgbClr val="000000">
+                              <a:alpha val="100000"/>
+                            </a:srgbClr>
+                          </a:solidFill>
+                          <a:latin typeface="Arial"/>
+                          <a:cs typeface="Arial"/>
+                          <a:sym typeface="Arial"/>
+                        </a:rPr>
+                        <a:t>0.0598</a:t>
+                      </a:r>
+                    </a:p>
+                  </a:txBody>
+                  <a:tcPr marL="0" marR="0" marT="63500" marB="63500" anchor="ctr">
+                    <a:lnL w="0" cap="flat" cmpd="sng" algn="ctr">
+                      <a:noFill/>
+                      <a:prstDash val="solid"/>
+                    </a:lnL>
+                    <a:lnR w="0" cap="flat" cmpd="sng" algn="ctr">
+                      <a:noFill/>
+                      <a:prstDash val="solid"/>
+                    </a:lnR>
+                    <a:lnT w="0" cap="flat" cmpd="sng" algn="ctr">
+                      <a:noFill/>
+                      <a:prstDash val="solid"/>
+                    </a:lnT>
+                    <a:lnB w="0" cap="flat" cmpd="sng" algn="ctr">
+                      <a:noFill/>
+                      <a:prstDash val="solid"/>
+                    </a:lnB>
+                    <a:solidFill>
+                      <a:srgbClr val="FFFFFF">
+                        <a:alpha val="0"/>
+                      </a:srgbClr>
+                    </a:solidFill>
+                  </a:tcPr>
+                </a:tc>
+                <a:extLst>
+                  <a:ext uri="{0D108BD9-81ED-4DB2-BD59-A6C34878D82A}">
+                    <a16:rowId xmlns:a16="http://schemas.microsoft.com/office/drawing/2014/main" val="10003"/>
+                  </a:ext>
+                </a:extLst>
+              </a:tr>
+              <a:tr h="228600">
+                <a:tc>
+                  <a:txBody>
+                    <a:bodyPr/>
+                    <a:lstStyle/>
+                    <a:p>
+                      <a:pPr marL="63500" marR="63500" algn="l">
+                        <a:lnSpc>
+                          <a:spcPct val="100000"/>
+                        </a:lnSpc>
+                        <a:spcBef>
+                          <a:spcPts val="500"/>
+                        </a:spcBef>
+                        <a:spcAft>
+                          <a:spcPts val="500"/>
+                        </a:spcAft>
+                        <a:buNone/>
+                      </a:pPr>
+                      <a:r>
+                        <a:rPr sz="1100" b="0" i="0" u="none" cap="none">
+                          <a:solidFill>
+                            <a:srgbClr val="000000">
+                              <a:alpha val="100000"/>
+                            </a:srgbClr>
+                          </a:solidFill>
+                          <a:latin typeface="Arial"/>
+                          <a:cs typeface="Arial"/>
+                          <a:sym typeface="Arial"/>
+                        </a:rPr>
+                        <a:t>Treatment D</a:t>
+                      </a:r>
+                    </a:p>
+                  </a:txBody>
+                  <a:tcPr marL="0" marR="0" marT="63500" marB="63500" anchor="ctr">
+                    <a:lnL w="0" cap="flat" cmpd="sng" algn="ctr">
+                      <a:noFill/>
+                      <a:prstDash val="solid"/>
+                    </a:lnL>
+                    <a:lnR w="0" cap="flat" cmpd="sng" algn="ctr">
+                      <a:noFill/>
+                      <a:prstDash val="solid"/>
+                    </a:lnR>
+                    <a:lnT w="0" cap="flat" cmpd="sng" algn="ctr">
+                      <a:noFill/>
+                      <a:prstDash val="solid"/>
+                    </a:lnT>
+                    <a:lnB w="0" cap="flat" cmpd="sng" algn="ctr">
+                      <a:noFill/>
+                      <a:prstDash val="solid"/>
+                    </a:lnB>
+                    <a:solidFill>
+                      <a:srgbClr val="FFFFFF">
+                        <a:alpha val="0"/>
+                      </a:srgbClr>
+                    </a:solidFill>
+                  </a:tcPr>
+                </a:tc>
+                <a:tc>
+                  <a:txBody>
+                    <a:bodyPr/>
+                    <a:lstStyle/>
+                    <a:p>
+                      <a:pPr marL="63500" marR="63500" algn="ctr">
+                        <a:lnSpc>
+                          <a:spcPct val="100000"/>
+                        </a:lnSpc>
+                        <a:spcBef>
+                          <a:spcPts val="500"/>
+                        </a:spcBef>
+                        <a:spcAft>
+                          <a:spcPts val="500"/>
+                        </a:spcAft>
+                        <a:buNone/>
+                      </a:pPr>
+                      <a:r>
+                        <a:rPr sz="1100" b="0" i="0" u="none" cap="none">
+                          <a:solidFill>
+                            <a:srgbClr val="000000">
+                              <a:alpha val="100000"/>
+                            </a:srgbClr>
+                          </a:solidFill>
+                          <a:latin typeface="Arial"/>
+                          <a:cs typeface="Arial"/>
+                          <a:sym typeface="Arial"/>
+                        </a:rPr>
+                        <a:t>0.0287</a:t>
+                      </a:r>
+                    </a:p>
+                  </a:txBody>
+                  <a:tcPr marL="0" marR="0" marT="63500" marB="63500" anchor="ctr">
+                    <a:lnL w="0" cap="flat" cmpd="sng" algn="ctr">
+                      <a:noFill/>
+                      <a:prstDash val="solid"/>
+                    </a:lnL>
+                    <a:lnR w="0" cap="flat" cmpd="sng" algn="ctr">
+                      <a:noFill/>
+                      <a:prstDash val="solid"/>
+                    </a:lnR>
+                    <a:lnT w="0" cap="flat" cmpd="sng" algn="ctr">
+                      <a:noFill/>
+                      <a:prstDash val="solid"/>
+                    </a:lnT>
+                    <a:lnB w="0" cap="flat" cmpd="sng" algn="ctr">
+                      <a:noFill/>
+                      <a:prstDash val="solid"/>
+                    </a:lnB>
+                    <a:solidFill>
+                      <a:srgbClr val="FFFFFF">
+                        <a:alpha val="0"/>
+                      </a:srgbClr>
+                    </a:solidFill>
+                  </a:tcPr>
+                </a:tc>
+                <a:tc>
+                  <a:txBody>
+                    <a:bodyPr/>
+                    <a:lstStyle/>
+                    <a:p>
+                      <a:pPr marL="63500" marR="63500" algn="ctr">
+                        <a:lnSpc>
+                          <a:spcPct val="100000"/>
+                        </a:lnSpc>
+                        <a:spcBef>
+                          <a:spcPts val="500"/>
+                        </a:spcBef>
+                        <a:spcAft>
+                          <a:spcPts val="500"/>
+                        </a:spcAft>
+                        <a:buNone/>
+                      </a:pPr>
+                      <a:r>
+                        <a:rPr sz="1100" b="0" i="0" u="none" cap="none">
+                          <a:solidFill>
+                            <a:srgbClr val="000000">
+                              <a:alpha val="100000"/>
+                            </a:srgbClr>
+                          </a:solidFill>
+                          <a:latin typeface="Arial"/>
+                          <a:cs typeface="Arial"/>
+                          <a:sym typeface="Arial"/>
+                        </a:rPr>
+                        <a:t>0.0390</a:t>
+                      </a:r>
+                    </a:p>
+                  </a:txBody>
+                  <a:tcPr marL="0" marR="0" marT="63500" marB="63500" anchor="ctr">
+                    <a:lnL w="0" cap="flat" cmpd="sng" algn="ctr">
+                      <a:noFill/>
+                      <a:prstDash val="solid"/>
+                    </a:lnL>
+                    <a:lnR w="0" cap="flat" cmpd="sng" algn="ctr">
+                      <a:noFill/>
+                      <a:prstDash val="solid"/>
+                    </a:lnR>
+                    <a:lnT w="0" cap="flat" cmpd="sng" algn="ctr">
+                      <a:noFill/>
+                      <a:prstDash val="solid"/>
+                    </a:lnT>
+                    <a:lnB w="0" cap="flat" cmpd="sng" algn="ctr">
+                      <a:noFill/>
+                      <a:prstDash val="solid"/>
+                    </a:lnB>
+                    <a:solidFill>
+                      <a:srgbClr val="FFFFFF">
+                        <a:alpha val="0"/>
+                      </a:srgbClr>
+                    </a:solidFill>
+                  </a:tcPr>
+                </a:tc>
+                <a:tc>
+                  <a:txBody>
+                    <a:bodyPr/>
+                    <a:lstStyle/>
+                    <a:p>
+                      <a:pPr marL="63500" marR="63500" algn="ctr">
+                        <a:lnSpc>
+                          <a:spcPct val="100000"/>
+                        </a:lnSpc>
+                        <a:spcBef>
+                          <a:spcPts val="500"/>
+                        </a:spcBef>
+                        <a:spcAft>
+                          <a:spcPts val="500"/>
+                        </a:spcAft>
+                        <a:buNone/>
+                      </a:pPr>
+                      <a:r>
+                        <a:rPr sz="1100" b="0" i="0" u="none" cap="none">
+                          <a:solidFill>
+                            <a:srgbClr val="000000">
+                              <a:alpha val="100000"/>
+                            </a:srgbClr>
+                          </a:solidFill>
+                          <a:latin typeface="Arial"/>
+                          <a:cs typeface="Arial"/>
+                          <a:sym typeface="Arial"/>
+                        </a:rPr>
+                        <a:t>0.0079</a:t>
+                      </a:r>
+                    </a:p>
+                  </a:txBody>
+                  <a:tcPr marL="0" marR="0" marT="63500" marB="63500" anchor="ctr">
+                    <a:lnL w="0" cap="flat" cmpd="sng" algn="ctr">
+                      <a:noFill/>
+                      <a:prstDash val="solid"/>
+                    </a:lnL>
+                    <a:lnR w="0" cap="flat" cmpd="sng" algn="ctr">
+                      <a:noFill/>
+                      <a:prstDash val="solid"/>
+                    </a:lnR>
+                    <a:lnT w="0" cap="flat" cmpd="sng" algn="ctr">
+                      <a:noFill/>
+                      <a:prstDash val="solid"/>
+                    </a:lnT>
+                    <a:lnB w="0" cap="flat" cmpd="sng" algn="ctr">
+                      <a:noFill/>
+                      <a:prstDash val="solid"/>
+                    </a:lnB>
+                    <a:solidFill>
+                      <a:srgbClr val="FFFFFF">
+                        <a:alpha val="0"/>
+                      </a:srgbClr>
+                    </a:solidFill>
+                  </a:tcPr>
+                </a:tc>
+                <a:tc>
+                  <a:txBody>
+                    <a:bodyPr/>
+                    <a:lstStyle/>
+                    <a:p>
+                      <a:pPr marL="63500" marR="63500" algn="ctr">
+                        <a:lnSpc>
+                          <a:spcPct val="100000"/>
+                        </a:lnSpc>
+                        <a:spcBef>
+                          <a:spcPts val="500"/>
+                        </a:spcBef>
+                        <a:spcAft>
+                          <a:spcPts val="500"/>
+                        </a:spcAft>
+                        <a:buNone/>
+                      </a:pPr>
+                      <a:r>
+                        <a:rPr sz="1100" b="0" i="0" u="none" cap="none">
+                          <a:solidFill>
+                            <a:srgbClr val="000000">
+                              <a:alpha val="100000"/>
+                            </a:srgbClr>
+                          </a:solidFill>
+                          <a:latin typeface="Arial"/>
+                          <a:cs typeface="Arial"/>
+                          <a:sym typeface="Arial"/>
+                        </a:rPr>
+                        <a:t>0.0628</a:t>
+                      </a:r>
+                    </a:p>
+                  </a:txBody>
+                  <a:tcPr marL="0" marR="0" marT="63500" marB="63500" anchor="ctr">
+                    <a:lnL w="0" cap="flat" cmpd="sng" algn="ctr">
+                      <a:noFill/>
+                      <a:prstDash val="solid"/>
+                    </a:lnL>
+                    <a:lnR w="0" cap="flat" cmpd="sng" algn="ctr">
+                      <a:noFill/>
+                      <a:prstDash val="solid"/>
+                    </a:lnR>
+                    <a:lnT w="0" cap="flat" cmpd="sng" algn="ctr">
+                      <a:noFill/>
+                      <a:prstDash val="solid"/>
+                    </a:lnT>
+                    <a:lnB w="0" cap="flat" cmpd="sng" algn="ctr">
+                      <a:noFill/>
+                      <a:prstDash val="solid"/>
+                    </a:lnB>
+                    <a:solidFill>
+                      <a:srgbClr val="FFFFFF">
+                        <a:alpha val="0"/>
+                      </a:srgbClr>
+                    </a:solidFill>
+                  </a:tcPr>
+                </a:tc>
+                <a:extLst>
+                  <a:ext uri="{0D108BD9-81ED-4DB2-BD59-A6C34878D82A}">
+                    <a16:rowId xmlns:a16="http://schemas.microsoft.com/office/drawing/2014/main" val="10004"/>
+                  </a:ext>
+                </a:extLst>
+              </a:tr>
+              <a:tr h="228600">
+                <a:tc>
+                  <a:txBody>
+                    <a:bodyPr/>
+                    <a:lstStyle/>
+                    <a:p>
+                      <a:pPr marL="63500" marR="63500" algn="l">
+                        <a:lnSpc>
+                          <a:spcPct val="100000"/>
+                        </a:lnSpc>
+                        <a:spcBef>
+                          <a:spcPts val="500"/>
+                        </a:spcBef>
+                        <a:spcAft>
+                          <a:spcPts val="500"/>
+                        </a:spcAft>
+                        <a:buNone/>
+                      </a:pPr>
+                      <a:r>
+                        <a:rPr sz="1100" b="0" i="0" u="none" cap="none">
+                          <a:solidFill>
+                            <a:srgbClr val="000000">
+                              <a:alpha val="100000"/>
+                            </a:srgbClr>
+                          </a:solidFill>
+                          <a:latin typeface="Arial"/>
+                          <a:cs typeface="Arial"/>
+                          <a:sym typeface="Arial"/>
+                        </a:rPr>
+                        <a:t>Optimum targeting</a:t>
+                      </a:r>
+                    </a:p>
+                  </a:txBody>
+                  <a:tcPr marL="0" marR="0" marT="63500" marB="63500" anchor="ctr">
+                    <a:lnL w="0" cap="flat" cmpd="sng" algn="ctr">
+                      <a:noFill/>
+                      <a:prstDash val="solid"/>
+                    </a:lnL>
+                    <a:lnR w="0" cap="flat" cmpd="sng" algn="ctr">
+                      <a:noFill/>
+                      <a:prstDash val="solid"/>
+                    </a:lnR>
+                    <a:lnT w="0" cap="flat" cmpd="sng" algn="ctr">
+                      <a:noFill/>
+                      <a:prstDash val="solid"/>
+                    </a:lnT>
+                    <a:lnB w="12700" cap="flat" cmpd="sng" algn="ctr">
+                      <a:solidFill>
+                        <a:srgbClr val="000000">
+                          <a:alpha val="100000"/>
+                        </a:srgbClr>
+                      </a:solidFill>
+                      <a:prstDash val="solid"/>
+                    </a:lnB>
+                    <a:solidFill>
+                      <a:srgbClr val="FFFFFF">
+                        <a:alpha val="0"/>
+                      </a:srgbClr>
+                    </a:solidFill>
+                  </a:tcPr>
+                </a:tc>
+                <a:tc>
+                  <a:txBody>
+                    <a:bodyPr/>
+                    <a:lstStyle/>
+                    <a:p>
+                      <a:pPr marL="63500" marR="63500" algn="ctr">
+                        <a:lnSpc>
+                          <a:spcPct val="100000"/>
+                        </a:lnSpc>
+                        <a:spcBef>
+                          <a:spcPts val="500"/>
+                        </a:spcBef>
+                        <a:spcAft>
+                          <a:spcPts val="500"/>
+                        </a:spcAft>
+                        <a:buNone/>
+                      </a:pPr>
+                      <a:r>
+                        <a:rPr sz="1100" b="0" i="0" u="none" cap="none">
+                          <a:solidFill>
+                            <a:srgbClr val="000000">
+                              <a:alpha val="100000"/>
+                            </a:srgbClr>
+                          </a:solidFill>
+                          <a:latin typeface="Arial"/>
+                          <a:cs typeface="Arial"/>
+                          <a:sym typeface="Arial"/>
+                        </a:rPr>
+                        <a:t>0.0473</a:t>
+                      </a:r>
+                    </a:p>
+                  </a:txBody>
+                  <a:tcPr marL="0" marR="0" marT="63500" marB="63500" anchor="ctr">
+                    <a:lnL w="0" cap="flat" cmpd="sng" algn="ctr">
+                      <a:noFill/>
+                      <a:prstDash val="solid"/>
+                    </a:lnL>
+                    <a:lnR w="0" cap="flat" cmpd="sng" algn="ctr">
+                      <a:noFill/>
+                      <a:prstDash val="solid"/>
+                    </a:lnR>
+                    <a:lnT w="0" cap="flat" cmpd="sng" algn="ctr">
+                      <a:noFill/>
+                      <a:prstDash val="solid"/>
+                    </a:lnT>
+                    <a:lnB w="12700" cap="flat" cmpd="sng" algn="ctr">
+                      <a:solidFill>
+                        <a:srgbClr val="000000">
+                          <a:alpha val="100000"/>
+                        </a:srgbClr>
+                      </a:solidFill>
+                      <a:prstDash val="solid"/>
+                    </a:lnB>
+                    <a:solidFill>
+                      <a:srgbClr val="FFFFFF">
+                        <a:alpha val="0"/>
+                      </a:srgbClr>
+                    </a:solidFill>
+                  </a:tcPr>
+                </a:tc>
+                <a:tc>
+                  <a:txBody>
+                    <a:bodyPr/>
+                    <a:lstStyle/>
+                    <a:p>
+                      <a:pPr marL="63500" marR="63500" algn="ctr">
+                        <a:lnSpc>
+                          <a:spcPct val="100000"/>
+                        </a:lnSpc>
+                        <a:spcBef>
+                          <a:spcPts val="500"/>
+                        </a:spcBef>
+                        <a:spcAft>
+                          <a:spcPts val="500"/>
+                        </a:spcAft>
+                        <a:buNone/>
+                      </a:pPr>
+                      <a:r>
+                        <a:rPr sz="1100" b="0" i="0" u="none" cap="none">
+                          <a:solidFill>
+                            <a:srgbClr val="000000">
+                              <a:alpha val="100000"/>
+                            </a:srgbClr>
+                          </a:solidFill>
+                          <a:latin typeface="Arial"/>
+                          <a:cs typeface="Arial"/>
+                          <a:sym typeface="Arial"/>
+                        </a:rPr>
+                        <a:t>0.0530</a:t>
+                      </a:r>
+                    </a:p>
+                  </a:txBody>
+                  <a:tcPr marL="0" marR="0" marT="63500" marB="63500" anchor="ctr">
+                    <a:lnL w="0" cap="flat" cmpd="sng" algn="ctr">
+                      <a:noFill/>
+                      <a:prstDash val="solid"/>
+                    </a:lnL>
+                    <a:lnR w="0" cap="flat" cmpd="sng" algn="ctr">
+                      <a:noFill/>
+                      <a:prstDash val="solid"/>
+                    </a:lnR>
+                    <a:lnT w="0" cap="flat" cmpd="sng" algn="ctr">
+                      <a:noFill/>
+                      <a:prstDash val="solid"/>
+                    </a:lnT>
+                    <a:lnB w="12700" cap="flat" cmpd="sng" algn="ctr">
+                      <a:solidFill>
+                        <a:srgbClr val="000000">
+                          <a:alpha val="100000"/>
+                        </a:srgbClr>
+                      </a:solidFill>
+                      <a:prstDash val="solid"/>
+                    </a:lnB>
+                    <a:solidFill>
+                      <a:srgbClr val="FFFFFF">
+                        <a:alpha val="0"/>
+                      </a:srgbClr>
+                    </a:solidFill>
+                  </a:tcPr>
+                </a:tc>
+                <a:tc>
+                  <a:txBody>
+                    <a:bodyPr/>
+                    <a:lstStyle/>
+                    <a:p>
+                      <a:pPr marL="63500" marR="63500" algn="ctr">
+                        <a:lnSpc>
+                          <a:spcPct val="100000"/>
+                        </a:lnSpc>
+                        <a:spcBef>
+                          <a:spcPts val="500"/>
+                        </a:spcBef>
+                        <a:spcAft>
+                          <a:spcPts val="500"/>
+                        </a:spcAft>
+                        <a:buNone/>
+                      </a:pPr>
+                      <a:endParaRPr/>
+                    </a:p>
+                  </a:txBody>
+                  <a:tcPr marL="0" marR="0" marT="63500" marB="63500" anchor="ctr">
+                    <a:lnL w="0" cap="flat" cmpd="sng" algn="ctr">
+                      <a:noFill/>
+                      <a:prstDash val="solid"/>
+                    </a:lnL>
+                    <a:lnR w="0" cap="flat" cmpd="sng" algn="ctr">
+                      <a:noFill/>
+                      <a:prstDash val="solid"/>
+                    </a:lnR>
+                    <a:lnT w="0" cap="flat" cmpd="sng" algn="ctr">
+                      <a:noFill/>
+                      <a:prstDash val="solid"/>
+                    </a:lnT>
+                    <a:lnB w="12700" cap="flat" cmpd="sng" algn="ctr">
+                      <a:solidFill>
+                        <a:srgbClr val="000000">
+                          <a:alpha val="100000"/>
+                        </a:srgbClr>
+                      </a:solidFill>
+                      <a:prstDash val="solid"/>
+                    </a:lnB>
+                    <a:solidFill>
+                      <a:srgbClr val="FFFFFF">
+                        <a:alpha val="0"/>
+                      </a:srgbClr>
+                    </a:solidFill>
+                  </a:tcPr>
+                </a:tc>
+                <a:tc>
+                  <a:txBody>
+                    <a:bodyPr/>
+                    <a:lstStyle/>
+                    <a:p>
+                      <a:pPr marL="63500" marR="63500" algn="ctr">
+                        <a:lnSpc>
+                          <a:spcPct val="100000"/>
+                        </a:lnSpc>
+                        <a:spcBef>
+                          <a:spcPts val="500"/>
+                        </a:spcBef>
+                        <a:spcAft>
+                          <a:spcPts val="500"/>
+                        </a:spcAft>
+                        <a:buNone/>
+                      </a:pPr>
+                      <a:endParaRPr/>
+                    </a:p>
+                  </a:txBody>
+                  <a:tcPr marL="0" marR="0" marT="63500" marB="63500" anchor="ctr">
+                    <a:lnL w="0" cap="flat" cmpd="sng" algn="ctr">
+                      <a:noFill/>
+                      <a:prstDash val="solid"/>
+                    </a:lnL>
+                    <a:lnR w="0" cap="flat" cmpd="sng" algn="ctr">
+                      <a:noFill/>
+                      <a:prstDash val="solid"/>
+                    </a:lnR>
+                    <a:lnT w="0" cap="flat" cmpd="sng" algn="ctr">
+                      <a:noFill/>
+                      <a:prstDash val="solid"/>
+                    </a:lnT>
+                    <a:lnB w="12700" cap="flat" cmpd="sng" algn="ctr">
+                      <a:solidFill>
+                        <a:srgbClr val="000000">
+                          <a:alpha val="100000"/>
+                        </a:srgbClr>
+                      </a:solidFill>
+                      <a:prstDash val="solid"/>
+                    </a:lnB>
+                    <a:solidFill>
+                      <a:srgbClr val="FFFFFF">
+                        <a:alpha val="0"/>
+                      </a:srgbClr>
+                    </a:solidFill>
+                  </a:tcPr>
+                </a:tc>
+                <a:extLst>
+                  <a:ext uri="{0D108BD9-81ED-4DB2-BD59-A6C34878D82A}">
+                    <a16:rowId xmlns:a16="http://schemas.microsoft.com/office/drawing/2014/main" val="10005"/>
+                  </a:ext>
+                </a:extLst>
               </a:tr>
             </a:tbl>
           </a:graphicData>
@@ -4349,6 +5073,9 @@
       </p:graphicFrame>
     </p:spTree>
   </p:cSld>
+  <p:clrMapOvr>
+    <a:masterClrMapping/>
+  </p:clrMapOvr>
 </p:sld>
 </file>
 
@@ -4384,11 +5111,10 @@
           <a:bodyPr/>
           <a:lstStyle/>
           <a:p>
-            <a:pPr lvl="0" indent="0" marL="0">
+            <a:pPr marL="0" lvl="0" indent="0">
               <a:buNone/>
             </a:pPr>
             <a:r>
-              <a:rPr/>
               <a:t>予測介入効果の分布</a:t>
             </a:r>
           </a:p>
@@ -4396,7 +5122,7 @@
       </p:sp>
       <p:pic>
         <p:nvPicPr>
-          <p:cNvPr descr="targeting_files/figure-pptx/dist-targeting-effect-1.png" id="0" name="Picture 1"/>
+          <p:cNvPr id="3" name="Picture 1" descr="targeting_files/figure-pptx/dist-targeting-effect-1.png"/>
           <p:cNvPicPr>
             <a:picLocks noGrp="1" noChangeAspect="1"/>
           </p:cNvPicPr>
@@ -4426,6 +5152,9 @@
       </p:pic>
     </p:spTree>
   </p:cSld>
+  <p:clrMapOvr>
+    <a:masterClrMapping/>
+  </p:clrMapOvr>
 </p:sld>
 </file>
 
@@ -4461,37 +5190,60 @@
           <a:bodyPr/>
           <a:lstStyle/>
           <a:p>
-            <a:pPr lvl="0" indent="0" marL="0">
+            <a:pPr marL="0" lvl="0" indent="0">
               <a:buNone/>
             </a:pPr>
             <a:r>
-              <a:rPr/>
               <a:t>最適ターゲティング別の個人属性の比較</a:t>
             </a:r>
           </a:p>
         </p:txBody>
       </p:sp>
-      <p:graphicFrame xmlns:a="http://schemas.openxmlformats.org/drawingml/2006/main" xmlns:r="http://schemas.openxmlformats.org/officeDocument/2006/relationships" xmlns:p="http://schemas.openxmlformats.org/presentationml/2006/main">
+      <p:graphicFrame>
         <p:nvGraphicFramePr>
-          <p:cNvPr id="45218601" name=""/>
+          <p:cNvPr id="197082987" name="表 197082986"/>
           <p:cNvGraphicFramePr>
-            <a:graphicFrameLocks noGrp="true"/>
+            <a:graphicFrameLocks noGrp="1"/>
           </p:cNvGraphicFramePr>
           <p:nvPr/>
         </p:nvGraphicFramePr>
-        <p:xfrm rot="0">
+        <p:xfrm>
           <a:off x="914400" y="1828800"/>
-          <a:ext cx="9144000" cy="5486400"/>
+          <a:ext cx="6400800" cy="2357120"/>
         </p:xfrm>
         <a:graphic>
           <a:graphicData uri="http://schemas.openxmlformats.org/drawingml/2006/table">
             <a:tbl>
               <a:tblPr/>
               <a:tblGrid>
-                <a:gridCol w="3657600"/>
-                <a:gridCol w="914400"/>
-                <a:gridCol w="914400"/>
-                <a:gridCol w="914400"/>
+                <a:gridCol w="3657600">
+                  <a:extLst>
+                    <a:ext uri="{9D8B030D-6E8A-4147-A177-3AD203B41FA5}">
+                      <a16:colId xmlns:a16="http://schemas.microsoft.com/office/drawing/2014/main" val="20000"/>
+                    </a:ext>
+                  </a:extLst>
+                </a:gridCol>
+                <a:gridCol w="914400">
+                  <a:extLst>
+                    <a:ext uri="{9D8B030D-6E8A-4147-A177-3AD203B41FA5}">
+                      <a16:colId xmlns:a16="http://schemas.microsoft.com/office/drawing/2014/main" val="20001"/>
+                    </a:ext>
+                  </a:extLst>
+                </a:gridCol>
+                <a:gridCol w="914400">
+                  <a:extLst>
+                    <a:ext uri="{9D8B030D-6E8A-4147-A177-3AD203B41FA5}">
+                      <a16:colId xmlns:a16="http://schemas.microsoft.com/office/drawing/2014/main" val="20002"/>
+                    </a:ext>
+                  </a:extLst>
+                </a:gridCol>
+                <a:gridCol w="914400">
+                  <a:extLst>
+                    <a:ext uri="{9D8B030D-6E8A-4147-A177-3AD203B41FA5}">
+                      <a16:colId xmlns:a16="http://schemas.microsoft.com/office/drawing/2014/main" val="20003"/>
+                    </a:ext>
+                  </a:extLst>
+                </a:gridCol>
               </a:tblGrid>
               <a:tr h="228600">
                 <a:tc>
@@ -4499,7 +5251,7 @@
                     <a:bodyPr/>
                     <a:lstStyle/>
                     <a:p>
-                      <a:pPr algn="l" marL="63500" marR="63500">
+                      <a:pPr marL="63500" marR="63500" algn="l">
                         <a:lnSpc>
                           <a:spcPct val="100000"/>
                         </a:lnSpc>
@@ -4512,7 +5264,7 @@
                         <a:buNone/>
                       </a:pPr>
                       <a:r>
-                        <a:rPr cap="none" sz="1100" i="0" b="0" u="none">
+                        <a:rPr sz="1100" b="0" i="0" u="none" cap="none">
                           <a:solidFill>
                             <a:srgbClr val="000000">
                               <a:alpha val="100000"/>
@@ -4520,23 +5272,22 @@
                           </a:solidFill>
                           <a:latin typeface="Arial"/>
                           <a:cs typeface="Arial"/>
-                          <a:ea typeface="Arial"/>
                           <a:sym typeface="Arial"/>
                         </a:rPr>
                         <a:t> </a:t>
                       </a:r>
                     </a:p>
                   </a:txBody>
-                  <a:tcPr anchor="ctr" marB="63500" marT="63500" marR="0" marL="0">
-                    <a:lnL algn="ctr" cmpd="sng" cap="flat" w="0">
+                  <a:tcPr marL="0" marR="0" marT="63500" marB="63500" anchor="ctr">
+                    <a:lnL w="0" cap="flat" cmpd="sng" algn="ctr">
                       <a:noFill/>
                       <a:prstDash val="solid"/>
                     </a:lnL>
-                    <a:lnR algn="ctr" cmpd="sng" cap="flat" w="0">
+                    <a:lnR w="0" cap="flat" cmpd="sng" algn="ctr">
                       <a:noFill/>
                       <a:prstDash val="solid"/>
                     </a:lnR>
-                    <a:lnT algn="ctr" cmpd="sng" cap="flat" w="12700">
+                    <a:lnT w="12700" cap="flat" cmpd="sng" algn="ctr">
                       <a:solidFill>
                         <a:srgbClr val="000000">
                           <a:alpha val="100000"/>
@@ -4544,7 +5295,7 @@
                       </a:solidFill>
                       <a:prstDash val="solid"/>
                     </a:lnT>
-                    <a:lnB algn="ctr" cmpd="sng" cap="flat" w="12700">
+                    <a:lnB w="12700" cap="flat" cmpd="sng" algn="ctr">
                       <a:solidFill>
                         <a:srgbClr val="000000">
                           <a:alpha val="100000"/>
@@ -4564,7 +5315,7 @@
                     <a:bodyPr/>
                     <a:lstStyle/>
                     <a:p>
-                      <a:pPr algn="ctr" marL="63500" marR="63500">
+                      <a:pPr marL="63500" marR="63500" algn="ctr">
                         <a:lnSpc>
                           <a:spcPct val="100000"/>
                         </a:lnSpc>
@@ -4577,7 +5328,7 @@
                         <a:buNone/>
                       </a:pPr>
                       <a:r>
-                        <a:rPr cap="none" sz="1100" i="0" b="0" u="none">
+                        <a:rPr sz="1100" b="0" i="0" u="none" cap="none">
                           <a:solidFill>
                             <a:srgbClr val="000000">
                               <a:alpha val="100000"/>
@@ -4585,23 +5336,22 @@
                           </a:solidFill>
                           <a:latin typeface="Arial"/>
                           <a:cs typeface="Arial"/>
-                          <a:ea typeface="Arial"/>
                           <a:sym typeface="Arial"/>
                         </a:rPr>
                         <a:t>Treatment B</a:t>
                       </a:r>
                     </a:p>
                   </a:txBody>
-                  <a:tcPr anchor="ctr" marB="63500" marT="63500" marR="0" marL="0">
-                    <a:lnL algn="ctr" cmpd="sng" cap="flat" w="0">
+                  <a:tcPr marL="0" marR="0" marT="63500" marB="63500" anchor="ctr">
+                    <a:lnL w="0" cap="flat" cmpd="sng" algn="ctr">
                       <a:noFill/>
                       <a:prstDash val="solid"/>
                     </a:lnL>
-                    <a:lnR algn="ctr" cmpd="sng" cap="flat" w="0">
+                    <a:lnR w="0" cap="flat" cmpd="sng" algn="ctr">
                       <a:noFill/>
                       <a:prstDash val="solid"/>
                     </a:lnR>
-                    <a:lnT algn="ctr" cmpd="sng" cap="flat" w="12700">
+                    <a:lnT w="12700" cap="flat" cmpd="sng" algn="ctr">
                       <a:solidFill>
                         <a:srgbClr val="000000">
                           <a:alpha val="100000"/>
@@ -4609,7 +5359,7 @@
                       </a:solidFill>
                       <a:prstDash val="solid"/>
                     </a:lnT>
-                    <a:lnB algn="ctr" cmpd="sng" cap="flat" w="12700">
+                    <a:lnB w="12700" cap="flat" cmpd="sng" algn="ctr">
                       <a:solidFill>
                         <a:srgbClr val="000000">
                           <a:alpha val="100000"/>
@@ -4629,7 +5379,7 @@
                     <a:bodyPr/>
                     <a:lstStyle/>
                     <a:p>
-                      <a:pPr algn="ctr" marL="63500" marR="63500">
+                      <a:pPr marL="63500" marR="63500" algn="ctr">
                         <a:lnSpc>
                           <a:spcPct val="100000"/>
                         </a:lnSpc>
@@ -4642,7 +5392,7 @@
                         <a:buNone/>
                       </a:pPr>
                       <a:r>
-                        <a:rPr cap="none" sz="1100" i="0" b="0" u="none">
+                        <a:rPr sz="1100" b="0" i="0" u="none" cap="none">
                           <a:solidFill>
                             <a:srgbClr val="000000">
                               <a:alpha val="100000"/>
@@ -4650,23 +5400,22 @@
                           </a:solidFill>
                           <a:latin typeface="Arial"/>
                           <a:cs typeface="Arial"/>
-                          <a:ea typeface="Arial"/>
                           <a:sym typeface="Arial"/>
                         </a:rPr>
                         <a:t>Treatment C</a:t>
                       </a:r>
                     </a:p>
                   </a:txBody>
-                  <a:tcPr anchor="ctr" marB="63500" marT="63500" marR="0" marL="0">
-                    <a:lnL algn="ctr" cmpd="sng" cap="flat" w="0">
+                  <a:tcPr marL="0" marR="0" marT="63500" marB="63500" anchor="ctr">
+                    <a:lnL w="0" cap="flat" cmpd="sng" algn="ctr">
                       <a:noFill/>
                       <a:prstDash val="solid"/>
                     </a:lnL>
-                    <a:lnR algn="ctr" cmpd="sng" cap="flat" w="0">
+                    <a:lnR w="0" cap="flat" cmpd="sng" algn="ctr">
                       <a:noFill/>
                       <a:prstDash val="solid"/>
                     </a:lnR>
-                    <a:lnT algn="ctr" cmpd="sng" cap="flat" w="12700">
+                    <a:lnT w="12700" cap="flat" cmpd="sng" algn="ctr">
                       <a:solidFill>
                         <a:srgbClr val="000000">
                           <a:alpha val="100000"/>
@@ -4674,7 +5423,7 @@
                       </a:solidFill>
                       <a:prstDash val="solid"/>
                     </a:lnT>
-                    <a:lnB algn="ctr" cmpd="sng" cap="flat" w="12700">
+                    <a:lnB w="12700" cap="flat" cmpd="sng" algn="ctr">
                       <a:solidFill>
                         <a:srgbClr val="000000">
                           <a:alpha val="100000"/>
@@ -4694,7 +5443,7 @@
                     <a:bodyPr/>
                     <a:lstStyle/>
                     <a:p>
-                      <a:pPr algn="ctr" marL="63500" marR="63500">
+                      <a:pPr marL="63500" marR="63500" algn="ctr">
                         <a:lnSpc>
                           <a:spcPct val="100000"/>
                         </a:lnSpc>
@@ -4707,7 +5456,7 @@
                         <a:buNone/>
                       </a:pPr>
                       <a:r>
-                        <a:rPr cap="none" sz="1100" i="0" b="0" u="none">
+                        <a:rPr sz="1100" b="0" i="0" u="none" cap="none">
                           <a:solidFill>
                             <a:srgbClr val="000000">
                               <a:alpha val="100000"/>
@@ -4715,23 +5464,22 @@
                           </a:solidFill>
                           <a:latin typeface="Arial"/>
                           <a:cs typeface="Arial"/>
-                          <a:ea typeface="Arial"/>
                           <a:sym typeface="Arial"/>
                         </a:rPr>
                         <a:t>Treatment D</a:t>
                       </a:r>
                     </a:p>
                   </a:txBody>
-                  <a:tcPr anchor="ctr" marB="63500" marT="63500" marR="0" marL="0">
-                    <a:lnL algn="ctr" cmpd="sng" cap="flat" w="0">
+                  <a:tcPr marL="0" marR="0" marT="63500" marB="63500" anchor="ctr">
+                    <a:lnL w="0" cap="flat" cmpd="sng" algn="ctr">
                       <a:noFill/>
                       <a:prstDash val="solid"/>
                     </a:lnL>
-                    <a:lnR algn="ctr" cmpd="sng" cap="flat" w="0">
+                    <a:lnR w="0" cap="flat" cmpd="sng" algn="ctr">
                       <a:noFill/>
                       <a:prstDash val="solid"/>
                     </a:lnR>
-                    <a:lnT algn="ctr" cmpd="sng" cap="flat" w="12700">
+                    <a:lnT w="12700" cap="flat" cmpd="sng" algn="ctr">
                       <a:solidFill>
                         <a:srgbClr val="000000">
                           <a:alpha val="100000"/>
@@ -4739,7 +5487,7 @@
                       </a:solidFill>
                       <a:prstDash val="solid"/>
                     </a:lnT>
-                    <a:lnB algn="ctr" cmpd="sng" cap="flat" w="12700">
+                    <a:lnB w="12700" cap="flat" cmpd="sng" algn="ctr">
                       <a:solidFill>
                         <a:srgbClr val="000000">
                           <a:alpha val="100000"/>
@@ -4754,6 +5502,11 @@
                     </a:solidFill>
                   </a:tcPr>
                 </a:tc>
+                <a:extLst>
+                  <a:ext uri="{0D108BD9-81ED-4DB2-BD59-A6C34878D82A}">
+                    <a16:rowId xmlns:a16="http://schemas.microsoft.com/office/drawing/2014/main" val="10000"/>
+                  </a:ext>
+                </a:extLst>
               </a:tr>
               <a:tr h="228600">
                 <a:tc>
@@ -4761,7 +5514,7 @@
                     <a:bodyPr/>
                     <a:lstStyle/>
                     <a:p>
-                      <a:pPr algn="l" marL="63500" marR="63500">
+                      <a:pPr marL="63500" marR="63500" algn="l">
                         <a:lnSpc>
                           <a:spcPct val="100000"/>
                         </a:lnSpc>
@@ -4774,7 +5527,7 @@
                         <a:buNone/>
                       </a:pPr>
                       <a:r>
-                        <a:rPr cap="none" sz="1100" i="0" b="0" u="none">
+                        <a:rPr sz="1100" b="0" i="0" u="none" cap="none">
                           <a:solidFill>
                             <a:srgbClr val="000000">
                               <a:alpha val="100000"/>
@@ -4782,27 +5535,31 @@
                           </a:solidFill>
                           <a:latin typeface="Arial"/>
                           <a:cs typeface="Arial"/>
-                          <a:ea typeface="Arial"/>
                           <a:sym typeface="Arial"/>
                         </a:rPr>
                         <a:t>Male (= 1)</a:t>
                       </a:r>
                     </a:p>
                   </a:txBody>
-                  <a:tcPr anchor="ctr" marB="63500" marT="63500" marR="0" marL="0">
-                    <a:lnL algn="ctr" cmpd="sng" cap="flat" w="0">
+                  <a:tcPr marL="0" marR="0" marT="63500" marB="63500" anchor="ctr">
+                    <a:lnL w="0" cap="flat" cmpd="sng" algn="ctr">
                       <a:noFill/>
                       <a:prstDash val="solid"/>
                     </a:lnL>
-                    <a:lnR algn="ctr" cmpd="sng" cap="flat" w="0">
+                    <a:lnR w="0" cap="flat" cmpd="sng" algn="ctr">
                       <a:noFill/>
                       <a:prstDash val="solid"/>
                     </a:lnR>
-                    <a:lnT algn="ctr" cmpd="sng" cap="flat" w="0">
-                      <a:noFill/>
-                      <a:prstDash val="solid"/>
+                    <a:lnT w="12700" cap="flat" cmpd="sng" algn="ctr">
+                      <a:solidFill>
+                        <a:srgbClr val="000000"/>
+                      </a:solidFill>
+                      <a:prstDash val="solid"/>
+                      <a:round/>
+                      <a:headEnd type="none" w="med" len="med"/>
+                      <a:tailEnd type="none" w="med" len="med"/>
                     </a:lnT>
-                    <a:lnB algn="ctr" cmpd="sng" cap="flat" w="0">
+                    <a:lnB w="0" cap="flat" cmpd="sng" algn="ctr">
                       <a:noFill/>
                       <a:prstDash val="solid"/>
                     </a:lnB>
@@ -4818,7 +5575,7 @@
                     <a:bodyPr/>
                     <a:lstStyle/>
                     <a:p>
-                      <a:pPr algn="ctr" marL="63500" marR="63500">
+                      <a:pPr marL="63500" marR="63500" algn="ctr">
                         <a:lnSpc>
                           <a:spcPct val="100000"/>
                         </a:lnSpc>
@@ -4831,7 +5588,7 @@
                         <a:buNone/>
                       </a:pPr>
                       <a:r>
-                        <a:rPr cap="none" sz="1100" i="0" b="0" u="none">
+                        <a:rPr sz="1100" b="0" i="0" u="none" cap="none">
                           <a:solidFill>
                             <a:srgbClr val="000000">
                               <a:alpha val="100000"/>
@@ -4839,27 +5596,31 @@
                           </a:solidFill>
                           <a:latin typeface="Arial"/>
                           <a:cs typeface="Arial"/>
-                          <a:ea typeface="Arial"/>
                           <a:sym typeface="Arial"/>
                         </a:rPr>
                         <a:t>0.64</a:t>
                       </a:r>
                     </a:p>
                   </a:txBody>
-                  <a:tcPr anchor="ctr" marB="63500" marT="63500" marR="0" marL="0">
-                    <a:lnL algn="ctr" cmpd="sng" cap="flat" w="0">
+                  <a:tcPr marL="0" marR="0" marT="63500" marB="63500" anchor="ctr">
+                    <a:lnL w="0" cap="flat" cmpd="sng" algn="ctr">
                       <a:noFill/>
                       <a:prstDash val="solid"/>
                     </a:lnL>
-                    <a:lnR algn="ctr" cmpd="sng" cap="flat" w="0">
+                    <a:lnR w="0" cap="flat" cmpd="sng" algn="ctr">
                       <a:noFill/>
                       <a:prstDash val="solid"/>
                     </a:lnR>
-                    <a:lnT algn="ctr" cmpd="sng" cap="flat" w="0">
-                      <a:noFill/>
-                      <a:prstDash val="solid"/>
+                    <a:lnT w="12700" cap="flat" cmpd="sng" algn="ctr">
+                      <a:solidFill>
+                        <a:srgbClr val="000000"/>
+                      </a:solidFill>
+                      <a:prstDash val="solid"/>
+                      <a:round/>
+                      <a:headEnd type="none" w="med" len="med"/>
+                      <a:tailEnd type="none" w="med" len="med"/>
                     </a:lnT>
-                    <a:lnB algn="ctr" cmpd="sng" cap="flat" w="0">
+                    <a:lnB w="0" cap="flat" cmpd="sng" algn="ctr">
                       <a:noFill/>
                       <a:prstDash val="solid"/>
                     </a:lnB>
@@ -4875,7 +5636,7 @@
                     <a:bodyPr/>
                     <a:lstStyle/>
                     <a:p>
-                      <a:pPr algn="ctr" marL="63500" marR="63500">
+                      <a:pPr marL="63500" marR="63500" algn="ctr">
                         <a:lnSpc>
                           <a:spcPct val="100000"/>
                         </a:lnSpc>
@@ -4888,7 +5649,7 @@
                         <a:buNone/>
                       </a:pPr>
                       <a:r>
-                        <a:rPr cap="none" sz="1100" i="0" b="0" u="none">
+                        <a:rPr sz="1100" b="0" i="0" u="none" cap="none">
                           <a:solidFill>
                             <a:srgbClr val="000000">
                               <a:alpha val="100000"/>
@@ -4896,27 +5657,31 @@
                           </a:solidFill>
                           <a:latin typeface="Arial"/>
                           <a:cs typeface="Arial"/>
-                          <a:ea typeface="Arial"/>
                           <a:sym typeface="Arial"/>
                         </a:rPr>
                         <a:t>0.54</a:t>
                       </a:r>
                     </a:p>
                   </a:txBody>
-                  <a:tcPr anchor="ctr" marB="63500" marT="63500" marR="0" marL="0">
-                    <a:lnL algn="ctr" cmpd="sng" cap="flat" w="0">
+                  <a:tcPr marL="0" marR="0" marT="63500" marB="63500" anchor="ctr">
+                    <a:lnL w="0" cap="flat" cmpd="sng" algn="ctr">
                       <a:noFill/>
                       <a:prstDash val="solid"/>
                     </a:lnL>
-                    <a:lnR algn="ctr" cmpd="sng" cap="flat" w="0">
+                    <a:lnR w="0" cap="flat" cmpd="sng" algn="ctr">
                       <a:noFill/>
                       <a:prstDash val="solid"/>
                     </a:lnR>
-                    <a:lnT algn="ctr" cmpd="sng" cap="flat" w="0">
-                      <a:noFill/>
-                      <a:prstDash val="solid"/>
+                    <a:lnT w="12700" cap="flat" cmpd="sng" algn="ctr">
+                      <a:solidFill>
+                        <a:srgbClr val="000000"/>
+                      </a:solidFill>
+                      <a:prstDash val="solid"/>
+                      <a:round/>
+                      <a:headEnd type="none" w="med" len="med"/>
+                      <a:tailEnd type="none" w="med" len="med"/>
                     </a:lnT>
-                    <a:lnB algn="ctr" cmpd="sng" cap="flat" w="0">
+                    <a:lnB w="0" cap="flat" cmpd="sng" algn="ctr">
                       <a:noFill/>
                       <a:prstDash val="solid"/>
                     </a:lnB>
@@ -4932,7 +5697,7 @@
                     <a:bodyPr/>
                     <a:lstStyle/>
                     <a:p>
-                      <a:pPr algn="ctr" marL="63500" marR="63500">
+                      <a:pPr marL="63500" marR="63500" algn="ctr">
                         <a:lnSpc>
                           <a:spcPct val="100000"/>
                         </a:lnSpc>
@@ -4945,7 +5710,7 @@
                         <a:buNone/>
                       </a:pPr>
                       <a:r>
-                        <a:rPr cap="none" sz="1100" i="0" b="0" u="none">
+                        <a:rPr sz="1100" b="0" i="0" u="none" cap="none">
                           <a:solidFill>
                             <a:srgbClr val="000000">
                               <a:alpha val="100000"/>
@@ -4953,27 +5718,31 @@
                           </a:solidFill>
                           <a:latin typeface="Arial"/>
                           <a:cs typeface="Arial"/>
-                          <a:ea typeface="Arial"/>
                           <a:sym typeface="Arial"/>
                         </a:rPr>
                         <a:t>0.67</a:t>
                       </a:r>
                     </a:p>
                   </a:txBody>
-                  <a:tcPr anchor="ctr" marB="63500" marT="63500" marR="0" marL="0">
-                    <a:lnL algn="ctr" cmpd="sng" cap="flat" w="0">
+                  <a:tcPr marL="0" marR="0" marT="63500" marB="63500" anchor="ctr">
+                    <a:lnL w="0" cap="flat" cmpd="sng" algn="ctr">
                       <a:noFill/>
                       <a:prstDash val="solid"/>
                     </a:lnL>
-                    <a:lnR algn="ctr" cmpd="sng" cap="flat" w="0">
+                    <a:lnR w="0" cap="flat" cmpd="sng" algn="ctr">
                       <a:noFill/>
                       <a:prstDash val="solid"/>
                     </a:lnR>
-                    <a:lnT algn="ctr" cmpd="sng" cap="flat" w="0">
-                      <a:noFill/>
-                      <a:prstDash val="solid"/>
+                    <a:lnT w="12700" cap="flat" cmpd="sng" algn="ctr">
+                      <a:solidFill>
+                        <a:srgbClr val="000000"/>
+                      </a:solidFill>
+                      <a:prstDash val="solid"/>
+                      <a:round/>
+                      <a:headEnd type="none" w="med" len="med"/>
+                      <a:tailEnd type="none" w="med" len="med"/>
                     </a:lnT>
-                    <a:lnB algn="ctr" cmpd="sng" cap="flat" w="0">
+                    <a:lnB w="0" cap="flat" cmpd="sng" algn="ctr">
                       <a:noFill/>
                       <a:prstDash val="solid"/>
                     </a:lnB>
@@ -4984,6 +5753,11 @@
                     </a:solidFill>
                   </a:tcPr>
                 </a:tc>
+                <a:extLst>
+                  <a:ext uri="{0D108BD9-81ED-4DB2-BD59-A6C34878D82A}">
+                    <a16:rowId xmlns:a16="http://schemas.microsoft.com/office/drawing/2014/main" val="10001"/>
+                  </a:ext>
+                </a:extLst>
               </a:tr>
               <a:tr h="228600">
                 <a:tc>
@@ -4991,7 +5765,7 @@
                     <a:bodyPr/>
                     <a:lstStyle/>
                     <a:p>
-                      <a:pPr algn="l" marL="63500" marR="63500">
+                      <a:pPr marL="63500" marR="63500" algn="l">
                         <a:lnSpc>
                           <a:spcPct val="100000"/>
                         </a:lnSpc>
@@ -5004,7 +5778,7 @@
                         <a:buNone/>
                       </a:pPr>
                       <a:r>
-                        <a:rPr cap="none" sz="1100" i="0" b="0" u="none">
+                        <a:rPr sz="1100" b="0" i="0" u="none" cap="none">
                           <a:solidFill>
                             <a:srgbClr val="000000">
                               <a:alpha val="100000"/>
@@ -5012,27 +5786,26 @@
                           </a:solidFill>
                           <a:latin typeface="Arial"/>
                           <a:cs typeface="Arial"/>
-                          <a:ea typeface="Arial"/>
                           <a:sym typeface="Arial"/>
                         </a:rPr>
                         <a:t>Age</a:t>
                       </a:r>
                     </a:p>
                   </a:txBody>
-                  <a:tcPr anchor="ctr" marB="63500" marT="63500" marR="0" marL="0">
-                    <a:lnL algn="ctr" cmpd="sng" cap="flat" w="0">
+                  <a:tcPr marL="0" marR="0" marT="63500" marB="63500" anchor="ctr">
+                    <a:lnL w="0" cap="flat" cmpd="sng" algn="ctr">
                       <a:noFill/>
                       <a:prstDash val="solid"/>
                     </a:lnL>
-                    <a:lnR algn="ctr" cmpd="sng" cap="flat" w="0">
+                    <a:lnR w="0" cap="flat" cmpd="sng" algn="ctr">
                       <a:noFill/>
                       <a:prstDash val="solid"/>
                     </a:lnR>
-                    <a:lnT algn="ctr" cmpd="sng" cap="flat" w="0">
+                    <a:lnT w="0" cap="flat" cmpd="sng" algn="ctr">
                       <a:noFill/>
                       <a:prstDash val="solid"/>
                     </a:lnT>
-                    <a:lnB algn="ctr" cmpd="sng" cap="flat" w="0">
+                    <a:lnB w="0" cap="flat" cmpd="sng" algn="ctr">
                       <a:noFill/>
                       <a:prstDash val="solid"/>
                     </a:lnB>
@@ -5048,7 +5821,7 @@
                     <a:bodyPr/>
                     <a:lstStyle/>
                     <a:p>
-                      <a:pPr algn="ctr" marL="63500" marR="63500">
+                      <a:pPr marL="63500" marR="63500" algn="ctr">
                         <a:lnSpc>
                           <a:spcPct val="100000"/>
                         </a:lnSpc>
@@ -5061,7 +5834,7 @@
                         <a:buNone/>
                       </a:pPr>
                       <a:r>
-                        <a:rPr cap="none" sz="1100" i="0" b="0" u="none">
+                        <a:rPr sz="1100" b="0" i="0" u="none" cap="none">
                           <a:solidFill>
                             <a:srgbClr val="000000">
                               <a:alpha val="100000"/>
@@ -5069,27 +5842,26 @@
                           </a:solidFill>
                           <a:latin typeface="Arial"/>
                           <a:cs typeface="Arial"/>
-                          <a:ea typeface="Arial"/>
                           <a:sym typeface="Arial"/>
                         </a:rPr>
                         <a:t>34.97</a:t>
                       </a:r>
                     </a:p>
                   </a:txBody>
-                  <a:tcPr anchor="ctr" marB="63500" marT="63500" marR="0" marL="0">
-                    <a:lnL algn="ctr" cmpd="sng" cap="flat" w="0">
+                  <a:tcPr marL="0" marR="0" marT="63500" marB="63500" anchor="ctr">
+                    <a:lnL w="0" cap="flat" cmpd="sng" algn="ctr">
                       <a:noFill/>
                       <a:prstDash val="solid"/>
                     </a:lnL>
-                    <a:lnR algn="ctr" cmpd="sng" cap="flat" w="0">
+                    <a:lnR w="0" cap="flat" cmpd="sng" algn="ctr">
                       <a:noFill/>
                       <a:prstDash val="solid"/>
                     </a:lnR>
-                    <a:lnT algn="ctr" cmpd="sng" cap="flat" w="0">
+                    <a:lnT w="0" cap="flat" cmpd="sng" algn="ctr">
                       <a:noFill/>
                       <a:prstDash val="solid"/>
                     </a:lnT>
-                    <a:lnB algn="ctr" cmpd="sng" cap="flat" w="0">
+                    <a:lnB w="0" cap="flat" cmpd="sng" algn="ctr">
                       <a:noFill/>
                       <a:prstDash val="solid"/>
                     </a:lnB>
@@ -5105,7 +5877,7 @@
                     <a:bodyPr/>
                     <a:lstStyle/>
                     <a:p>
-                      <a:pPr algn="ctr" marL="63500" marR="63500">
+                      <a:pPr marL="63500" marR="63500" algn="ctr">
                         <a:lnSpc>
                           <a:spcPct val="100000"/>
                         </a:lnSpc>
@@ -5118,7 +5890,7 @@
                         <a:buNone/>
                       </a:pPr>
                       <a:r>
-                        <a:rPr cap="none" sz="1100" i="0" b="0" u="none">
+                        <a:rPr sz="1100" b="0" i="0" u="none" cap="none">
                           <a:solidFill>
                             <a:srgbClr val="000000">
                               <a:alpha val="100000"/>
@@ -5126,27 +5898,26 @@
                           </a:solidFill>
                           <a:latin typeface="Arial"/>
                           <a:cs typeface="Arial"/>
-                          <a:ea typeface="Arial"/>
                           <a:sym typeface="Arial"/>
                         </a:rPr>
                         <a:t>41.44</a:t>
                       </a:r>
                     </a:p>
                   </a:txBody>
-                  <a:tcPr anchor="ctr" marB="63500" marT="63500" marR="0" marL="0">
-                    <a:lnL algn="ctr" cmpd="sng" cap="flat" w="0">
+                  <a:tcPr marL="0" marR="0" marT="63500" marB="63500" anchor="ctr">
+                    <a:lnL w="0" cap="flat" cmpd="sng" algn="ctr">
                       <a:noFill/>
                       <a:prstDash val="solid"/>
                     </a:lnL>
-                    <a:lnR algn="ctr" cmpd="sng" cap="flat" w="0">
+                    <a:lnR w="0" cap="flat" cmpd="sng" algn="ctr">
                       <a:noFill/>
                       <a:prstDash val="solid"/>
                     </a:lnR>
-                    <a:lnT algn="ctr" cmpd="sng" cap="flat" w="0">
+                    <a:lnT w="0" cap="flat" cmpd="sng" algn="ctr">
                       <a:noFill/>
                       <a:prstDash val="solid"/>
                     </a:lnT>
-                    <a:lnB algn="ctr" cmpd="sng" cap="flat" w="0">
+                    <a:lnB w="0" cap="flat" cmpd="sng" algn="ctr">
                       <a:noFill/>
                       <a:prstDash val="solid"/>
                     </a:lnB>
@@ -5162,7 +5933,7 @@
                     <a:bodyPr/>
                     <a:lstStyle/>
                     <a:p>
-                      <a:pPr algn="ctr" marL="63500" marR="63500">
+                      <a:pPr marL="63500" marR="63500" algn="ctr">
                         <a:lnSpc>
                           <a:spcPct val="100000"/>
                         </a:lnSpc>
@@ -5175,7 +5946,7 @@
                         <a:buNone/>
                       </a:pPr>
                       <a:r>
-                        <a:rPr cap="none" sz="1100" i="0" b="0" u="none">
+                        <a:rPr sz="1100" b="0" i="0" u="none" cap="none">
                           <a:solidFill>
                             <a:srgbClr val="000000">
                               <a:alpha val="100000"/>
@@ -5183,27 +5954,26 @@
                           </a:solidFill>
                           <a:latin typeface="Arial"/>
                           <a:cs typeface="Arial"/>
-                          <a:ea typeface="Arial"/>
                           <a:sym typeface="Arial"/>
                         </a:rPr>
                         <a:t>39.64</a:t>
                       </a:r>
                     </a:p>
                   </a:txBody>
-                  <a:tcPr anchor="ctr" marB="63500" marT="63500" marR="0" marL="0">
-                    <a:lnL algn="ctr" cmpd="sng" cap="flat" w="0">
+                  <a:tcPr marL="0" marR="0" marT="63500" marB="63500" anchor="ctr">
+                    <a:lnL w="0" cap="flat" cmpd="sng" algn="ctr">
                       <a:noFill/>
                       <a:prstDash val="solid"/>
                     </a:lnL>
-                    <a:lnR algn="ctr" cmpd="sng" cap="flat" w="0">
+                    <a:lnR w="0" cap="flat" cmpd="sng" algn="ctr">
                       <a:noFill/>
                       <a:prstDash val="solid"/>
                     </a:lnR>
-                    <a:lnT algn="ctr" cmpd="sng" cap="flat" w="0">
+                    <a:lnT w="0" cap="flat" cmpd="sng" algn="ctr">
                       <a:noFill/>
                       <a:prstDash val="solid"/>
                     </a:lnT>
-                    <a:lnB algn="ctr" cmpd="sng" cap="flat" w="0">
+                    <a:lnB w="0" cap="flat" cmpd="sng" algn="ctr">
                       <a:noFill/>
                       <a:prstDash val="solid"/>
                     </a:lnB>
@@ -5214,6 +5984,11 @@
                     </a:solidFill>
                   </a:tcPr>
                 </a:tc>
+                <a:extLst>
+                  <a:ext uri="{0D108BD9-81ED-4DB2-BD59-A6C34878D82A}">
+                    <a16:rowId xmlns:a16="http://schemas.microsoft.com/office/drawing/2014/main" val="10002"/>
+                  </a:ext>
+                </a:extLst>
               </a:tr>
               <a:tr h="228600">
                 <a:tc>
@@ -5221,7 +5996,7 @@
                     <a:bodyPr/>
                     <a:lstStyle/>
                     <a:p>
-                      <a:pPr algn="l" marL="63500" marR="63500">
+                      <a:pPr marL="63500" marR="63500" algn="l">
                         <a:lnSpc>
                           <a:spcPct val="100000"/>
                         </a:lnSpc>
@@ -5234,7 +6009,7 @@
                         <a:buNone/>
                       </a:pPr>
                       <a:r>
-                        <a:rPr cap="none" sz="1100" i="0" b="0" u="none">
+                        <a:rPr sz="1100" b="0" i="0" u="none" cap="none">
                           <a:solidFill>
                             <a:srgbClr val="000000">
                               <a:alpha val="100000"/>
@@ -5242,27 +6017,26 @@
                           </a:solidFill>
                           <a:latin typeface="Arial"/>
                           <a:cs typeface="Arial"/>
-                          <a:ea typeface="Arial"/>
                           <a:sym typeface="Arial"/>
                         </a:rPr>
                         <a:t>Number of past coordinations</a:t>
                       </a:r>
                     </a:p>
                   </a:txBody>
-                  <a:tcPr anchor="ctr" marB="63500" marT="63500" marR="0" marL="0">
-                    <a:lnL algn="ctr" cmpd="sng" cap="flat" w="0">
+                  <a:tcPr marL="0" marR="0" marT="63500" marB="63500" anchor="ctr">
+                    <a:lnL w="0" cap="flat" cmpd="sng" algn="ctr">
                       <a:noFill/>
                       <a:prstDash val="solid"/>
                     </a:lnL>
-                    <a:lnR algn="ctr" cmpd="sng" cap="flat" w="0">
+                    <a:lnR w="0" cap="flat" cmpd="sng" algn="ctr">
                       <a:noFill/>
                       <a:prstDash val="solid"/>
                     </a:lnR>
-                    <a:lnT algn="ctr" cmpd="sng" cap="flat" w="0">
+                    <a:lnT w="0" cap="flat" cmpd="sng" algn="ctr">
                       <a:noFill/>
                       <a:prstDash val="solid"/>
                     </a:lnT>
-                    <a:lnB algn="ctr" cmpd="sng" cap="flat" w="0">
+                    <a:lnB w="0" cap="flat" cmpd="sng" algn="ctr">
                       <a:noFill/>
                       <a:prstDash val="solid"/>
                     </a:lnB>
@@ -5278,7 +6052,7 @@
                     <a:bodyPr/>
                     <a:lstStyle/>
                     <a:p>
-                      <a:pPr algn="ctr" marL="63500" marR="63500">
+                      <a:pPr marL="63500" marR="63500" algn="ctr">
                         <a:lnSpc>
                           <a:spcPct val="100000"/>
                         </a:lnSpc>
@@ -5291,7 +6065,7 @@
                         <a:buNone/>
                       </a:pPr>
                       <a:r>
-                        <a:rPr cap="none" sz="1100" i="0" b="0" u="none">
+                        <a:rPr sz="1100" b="0" i="0" u="none" cap="none">
                           <a:solidFill>
                             <a:srgbClr val="000000">
                               <a:alpha val="100000"/>
@@ -5299,27 +6073,26 @@
                           </a:solidFill>
                           <a:latin typeface="Arial"/>
                           <a:cs typeface="Arial"/>
-                          <a:ea typeface="Arial"/>
                           <a:sym typeface="Arial"/>
                         </a:rPr>
                         <a:t>1.49</a:t>
                       </a:r>
                     </a:p>
                   </a:txBody>
-                  <a:tcPr anchor="ctr" marB="63500" marT="63500" marR="0" marL="0">
-                    <a:lnL algn="ctr" cmpd="sng" cap="flat" w="0">
+                  <a:tcPr marL="0" marR="0" marT="63500" marB="63500" anchor="ctr">
+                    <a:lnL w="0" cap="flat" cmpd="sng" algn="ctr">
                       <a:noFill/>
                       <a:prstDash val="solid"/>
                     </a:lnL>
-                    <a:lnR algn="ctr" cmpd="sng" cap="flat" w="0">
+                    <a:lnR w="0" cap="flat" cmpd="sng" algn="ctr">
                       <a:noFill/>
                       <a:prstDash val="solid"/>
                     </a:lnR>
-                    <a:lnT algn="ctr" cmpd="sng" cap="flat" w="0">
+                    <a:lnT w="0" cap="flat" cmpd="sng" algn="ctr">
                       <a:noFill/>
                       <a:prstDash val="solid"/>
                     </a:lnT>
-                    <a:lnB algn="ctr" cmpd="sng" cap="flat" w="0">
+                    <a:lnB w="0" cap="flat" cmpd="sng" algn="ctr">
                       <a:noFill/>
                       <a:prstDash val="solid"/>
                     </a:lnB>
@@ -5335,7 +6108,7 @@
                     <a:bodyPr/>
                     <a:lstStyle/>
                     <a:p>
-                      <a:pPr algn="ctr" marL="63500" marR="63500">
+                      <a:pPr marL="63500" marR="63500" algn="ctr">
                         <a:lnSpc>
                           <a:spcPct val="100000"/>
                         </a:lnSpc>
@@ -5348,7 +6121,7 @@
                         <a:buNone/>
                       </a:pPr>
                       <a:r>
-                        <a:rPr cap="none" sz="1100" i="0" b="0" u="none">
+                        <a:rPr sz="1100" b="0" i="0" u="none" cap="none">
                           <a:solidFill>
                             <a:srgbClr val="000000">
                               <a:alpha val="100000"/>
@@ -5356,27 +6129,26 @@
                           </a:solidFill>
                           <a:latin typeface="Arial"/>
                           <a:cs typeface="Arial"/>
-                          <a:ea typeface="Arial"/>
                           <a:sym typeface="Arial"/>
                         </a:rPr>
                         <a:t>1.65</a:t>
                       </a:r>
                     </a:p>
                   </a:txBody>
-                  <a:tcPr anchor="ctr" marB="63500" marT="63500" marR="0" marL="0">
-                    <a:lnL algn="ctr" cmpd="sng" cap="flat" w="0">
+                  <a:tcPr marL="0" marR="0" marT="63500" marB="63500" anchor="ctr">
+                    <a:lnL w="0" cap="flat" cmpd="sng" algn="ctr">
                       <a:noFill/>
                       <a:prstDash val="solid"/>
                     </a:lnL>
-                    <a:lnR algn="ctr" cmpd="sng" cap="flat" w="0">
+                    <a:lnR w="0" cap="flat" cmpd="sng" algn="ctr">
                       <a:noFill/>
                       <a:prstDash val="solid"/>
                     </a:lnR>
-                    <a:lnT algn="ctr" cmpd="sng" cap="flat" w="0">
+                    <a:lnT w="0" cap="flat" cmpd="sng" algn="ctr">
                       <a:noFill/>
                       <a:prstDash val="solid"/>
                     </a:lnT>
-                    <a:lnB algn="ctr" cmpd="sng" cap="flat" w="0">
+                    <a:lnB w="0" cap="flat" cmpd="sng" algn="ctr">
                       <a:noFill/>
                       <a:prstDash val="solid"/>
                     </a:lnB>
@@ -5392,7 +6164,7 @@
                     <a:bodyPr/>
                     <a:lstStyle/>
                     <a:p>
-                      <a:pPr algn="ctr" marL="63500" marR="63500">
+                      <a:pPr marL="63500" marR="63500" algn="ctr">
                         <a:lnSpc>
                           <a:spcPct val="100000"/>
                         </a:lnSpc>
@@ -5405,7 +6177,7 @@
                         <a:buNone/>
                       </a:pPr>
                       <a:r>
-                        <a:rPr cap="none" sz="1100" i="0" b="0" u="none">
+                        <a:rPr sz="1100" b="0" i="0" u="none" cap="none">
                           <a:solidFill>
                             <a:srgbClr val="000000">
                               <a:alpha val="100000"/>
@@ -5413,27 +6185,26 @@
                           </a:solidFill>
                           <a:latin typeface="Arial"/>
                           <a:cs typeface="Arial"/>
-                          <a:ea typeface="Arial"/>
                           <a:sym typeface="Arial"/>
                         </a:rPr>
                         <a:t>1.70</a:t>
                       </a:r>
                     </a:p>
                   </a:txBody>
-                  <a:tcPr anchor="ctr" marB="63500" marT="63500" marR="0" marL="0">
-                    <a:lnL algn="ctr" cmpd="sng" cap="flat" w="0">
+                  <a:tcPr marL="0" marR="0" marT="63500" marB="63500" anchor="ctr">
+                    <a:lnL w="0" cap="flat" cmpd="sng" algn="ctr">
                       <a:noFill/>
                       <a:prstDash val="solid"/>
                     </a:lnL>
-                    <a:lnR algn="ctr" cmpd="sng" cap="flat" w="0">
+                    <a:lnR w="0" cap="flat" cmpd="sng" algn="ctr">
                       <a:noFill/>
                       <a:prstDash val="solid"/>
                     </a:lnR>
-                    <a:lnT algn="ctr" cmpd="sng" cap="flat" w="0">
+                    <a:lnT w="0" cap="flat" cmpd="sng" algn="ctr">
                       <a:noFill/>
                       <a:prstDash val="solid"/>
                     </a:lnT>
-                    <a:lnB algn="ctr" cmpd="sng" cap="flat" w="0">
+                    <a:lnB w="0" cap="flat" cmpd="sng" algn="ctr">
                       <a:noFill/>
                       <a:prstDash val="solid"/>
                     </a:lnB>
@@ -5444,6 +6215,11 @@
                     </a:solidFill>
                   </a:tcPr>
                 </a:tc>
+                <a:extLst>
+                  <a:ext uri="{0D108BD9-81ED-4DB2-BD59-A6C34878D82A}">
+                    <a16:rowId xmlns:a16="http://schemas.microsoft.com/office/drawing/2014/main" val="10003"/>
+                  </a:ext>
+                </a:extLst>
               </a:tr>
               <a:tr h="228600">
                 <a:tc>
@@ -5451,7 +6227,7 @@
                     <a:bodyPr/>
                     <a:lstStyle/>
                     <a:p>
-                      <a:pPr algn="l" marL="63500" marR="63500">
+                      <a:pPr marL="63500" marR="63500" algn="l">
                         <a:lnSpc>
                           <a:spcPct val="100000"/>
                         </a:lnSpc>
@@ -5464,7 +6240,7 @@
                         <a:buNone/>
                       </a:pPr>
                       <a:r>
-                        <a:rPr cap="none" sz="1100" i="0" b="0" u="none">
+                        <a:rPr sz="1100" b="0" i="0" u="none" cap="none">
                           <a:solidFill>
                             <a:srgbClr val="000000">
                               <a:alpha val="100000"/>
@@ -5472,27 +6248,26 @@
                           </a:solidFill>
                           <a:latin typeface="Arial"/>
                           <a:cs typeface="Arial"/>
-                          <a:ea typeface="Arial"/>
                           <a:sym typeface="Arial"/>
                         </a:rPr>
                         <a:t>Number of listed hospitals</a:t>
                       </a:r>
                     </a:p>
                   </a:txBody>
-                  <a:tcPr anchor="ctr" marB="63500" marT="63500" marR="0" marL="0">
-                    <a:lnL algn="ctr" cmpd="sng" cap="flat" w="0">
+                  <a:tcPr marL="0" marR="0" marT="63500" marB="63500" anchor="ctr">
+                    <a:lnL w="0" cap="flat" cmpd="sng" algn="ctr">
                       <a:noFill/>
                       <a:prstDash val="solid"/>
                     </a:lnL>
-                    <a:lnR algn="ctr" cmpd="sng" cap="flat" w="0">
+                    <a:lnR w="0" cap="flat" cmpd="sng" algn="ctr">
                       <a:noFill/>
                       <a:prstDash val="solid"/>
                     </a:lnR>
-                    <a:lnT algn="ctr" cmpd="sng" cap="flat" w="0">
+                    <a:lnT w="0" cap="flat" cmpd="sng" algn="ctr">
                       <a:noFill/>
                       <a:prstDash val="solid"/>
                     </a:lnT>
-                    <a:lnB algn="ctr" cmpd="sng" cap="flat" w="0">
+                    <a:lnB w="0" cap="flat" cmpd="sng" algn="ctr">
                       <a:noFill/>
                       <a:prstDash val="solid"/>
                     </a:lnB>
@@ -5508,7 +6283,7 @@
                     <a:bodyPr/>
                     <a:lstStyle/>
                     <a:p>
-                      <a:pPr algn="ctr" marL="63500" marR="63500">
+                      <a:pPr marL="63500" marR="63500" algn="ctr">
                         <a:lnSpc>
                           <a:spcPct val="100000"/>
                         </a:lnSpc>
@@ -5521,7 +6296,7 @@
                         <a:buNone/>
                       </a:pPr>
                       <a:r>
-                        <a:rPr cap="none" sz="1100" i="0" b="0" u="none">
+                        <a:rPr sz="1100" b="0" i="0" u="none" cap="none">
                           <a:solidFill>
                             <a:srgbClr val="000000">
                               <a:alpha val="100000"/>
@@ -5529,27 +6304,26 @@
                           </a:solidFill>
                           <a:latin typeface="Arial"/>
                           <a:cs typeface="Arial"/>
-                          <a:ea typeface="Arial"/>
                           <a:sym typeface="Arial"/>
                         </a:rPr>
                         <a:t>0.47</a:t>
                       </a:r>
                     </a:p>
                   </a:txBody>
-                  <a:tcPr anchor="ctr" marB="63500" marT="63500" marR="0" marL="0">
-                    <a:lnL algn="ctr" cmpd="sng" cap="flat" w="0">
+                  <a:tcPr marL="0" marR="0" marT="63500" marB="63500" anchor="ctr">
+                    <a:lnL w="0" cap="flat" cmpd="sng" algn="ctr">
                       <a:noFill/>
                       <a:prstDash val="solid"/>
                     </a:lnL>
-                    <a:lnR algn="ctr" cmpd="sng" cap="flat" w="0">
+                    <a:lnR w="0" cap="flat" cmpd="sng" algn="ctr">
                       <a:noFill/>
                       <a:prstDash val="solid"/>
                     </a:lnR>
-                    <a:lnT algn="ctr" cmpd="sng" cap="flat" w="0">
+                    <a:lnT w="0" cap="flat" cmpd="sng" algn="ctr">
                       <a:noFill/>
                       <a:prstDash val="solid"/>
                     </a:lnT>
-                    <a:lnB algn="ctr" cmpd="sng" cap="flat" w="0">
+                    <a:lnB w="0" cap="flat" cmpd="sng" algn="ctr">
                       <a:noFill/>
                       <a:prstDash val="solid"/>
                     </a:lnB>
@@ -5565,7 +6339,7 @@
                     <a:bodyPr/>
                     <a:lstStyle/>
                     <a:p>
-                      <a:pPr algn="ctr" marL="63500" marR="63500">
+                      <a:pPr marL="63500" marR="63500" algn="ctr">
                         <a:lnSpc>
                           <a:spcPct val="100000"/>
                         </a:lnSpc>
@@ -5578,7 +6352,7 @@
                         <a:buNone/>
                       </a:pPr>
                       <a:r>
-                        <a:rPr cap="none" sz="1100" i="0" b="0" u="none">
+                        <a:rPr sz="1100" b="0" i="0" u="none" cap="none">
                           <a:solidFill>
                             <a:srgbClr val="000000">
                               <a:alpha val="100000"/>
@@ -5586,27 +6360,26 @@
                           </a:solidFill>
                           <a:latin typeface="Arial"/>
                           <a:cs typeface="Arial"/>
-                          <a:ea typeface="Arial"/>
                           <a:sym typeface="Arial"/>
                         </a:rPr>
                         <a:t>0.40</a:t>
                       </a:r>
                     </a:p>
                   </a:txBody>
-                  <a:tcPr anchor="ctr" marB="63500" marT="63500" marR="0" marL="0">
-                    <a:lnL algn="ctr" cmpd="sng" cap="flat" w="0">
+                  <a:tcPr marL="0" marR="0" marT="63500" marB="63500" anchor="ctr">
+                    <a:lnL w="0" cap="flat" cmpd="sng" algn="ctr">
                       <a:noFill/>
                       <a:prstDash val="solid"/>
                     </a:lnL>
-                    <a:lnR algn="ctr" cmpd="sng" cap="flat" w="0">
+                    <a:lnR w="0" cap="flat" cmpd="sng" algn="ctr">
                       <a:noFill/>
                       <a:prstDash val="solid"/>
                     </a:lnR>
-                    <a:lnT algn="ctr" cmpd="sng" cap="flat" w="0">
+                    <a:lnT w="0" cap="flat" cmpd="sng" algn="ctr">
                       <a:noFill/>
                       <a:prstDash val="solid"/>
                     </a:lnT>
-                    <a:lnB algn="ctr" cmpd="sng" cap="flat" w="0">
+                    <a:lnB w="0" cap="flat" cmpd="sng" algn="ctr">
                       <a:noFill/>
                       <a:prstDash val="solid"/>
                     </a:lnB>
@@ -5622,7 +6395,7 @@
                     <a:bodyPr/>
                     <a:lstStyle/>
                     <a:p>
-                      <a:pPr algn="ctr" marL="63500" marR="63500">
+                      <a:pPr marL="63500" marR="63500" algn="ctr">
                         <a:lnSpc>
                           <a:spcPct val="100000"/>
                         </a:lnSpc>
@@ -5635,7 +6408,7 @@
                         <a:buNone/>
                       </a:pPr>
                       <a:r>
-                        <a:rPr cap="none" sz="1100" i="0" b="0" u="none">
+                        <a:rPr sz="1100" b="0" i="0" u="none" cap="none">
                           <a:solidFill>
                             <a:srgbClr val="000000">
                               <a:alpha val="100000"/>
@@ -5643,27 +6416,26 @@
                           </a:solidFill>
                           <a:latin typeface="Arial"/>
                           <a:cs typeface="Arial"/>
-                          <a:ea typeface="Arial"/>
                           <a:sym typeface="Arial"/>
                         </a:rPr>
                         <a:t>0.58</a:t>
                       </a:r>
                     </a:p>
                   </a:txBody>
-                  <a:tcPr anchor="ctr" marB="63500" marT="63500" marR="0" marL="0">
-                    <a:lnL algn="ctr" cmpd="sng" cap="flat" w="0">
+                  <a:tcPr marL="0" marR="0" marT="63500" marB="63500" anchor="ctr">
+                    <a:lnL w="0" cap="flat" cmpd="sng" algn="ctr">
                       <a:noFill/>
                       <a:prstDash val="solid"/>
                     </a:lnL>
-                    <a:lnR algn="ctr" cmpd="sng" cap="flat" w="0">
+                    <a:lnR w="0" cap="flat" cmpd="sng" algn="ctr">
                       <a:noFill/>
                       <a:prstDash val="solid"/>
                     </a:lnR>
-                    <a:lnT algn="ctr" cmpd="sng" cap="flat" w="0">
+                    <a:lnT w="0" cap="flat" cmpd="sng" algn="ctr">
                       <a:noFill/>
                       <a:prstDash val="solid"/>
                     </a:lnT>
-                    <a:lnB algn="ctr" cmpd="sng" cap="flat" w="0">
+                    <a:lnB w="0" cap="flat" cmpd="sng" algn="ctr">
                       <a:noFill/>
                       <a:prstDash val="solid"/>
                     </a:lnB>
@@ -5674,6 +6446,11 @@
                     </a:solidFill>
                   </a:tcPr>
                 </a:tc>
+                <a:extLst>
+                  <a:ext uri="{0D108BD9-81ED-4DB2-BD59-A6C34878D82A}">
+                    <a16:rowId xmlns:a16="http://schemas.microsoft.com/office/drawing/2014/main" val="10004"/>
+                  </a:ext>
+                </a:extLst>
               </a:tr>
               <a:tr h="228600">
                 <a:tc>
@@ -5681,7 +6458,7 @@
                     <a:bodyPr/>
                     <a:lstStyle/>
                     <a:p>
-                      <a:pPr algn="l" marL="63500" marR="63500">
+                      <a:pPr marL="63500" marR="63500" algn="l">
                         <a:lnSpc>
                           <a:spcPct val="100000"/>
                         </a:lnSpc>
@@ -5694,7 +6471,7 @@
                         <a:buNone/>
                       </a:pPr>
                       <a:r>
-                        <a:rPr cap="none" sz="1100" i="0" b="0" u="none">
+                        <a:rPr sz="1100" b="0" i="0" u="none" cap="none">
                           <a:solidFill>
                             <a:srgbClr val="000000">
                               <a:alpha val="100000"/>
@@ -5702,27 +6479,26 @@
                           </a:solidFill>
                           <a:latin typeface="Arial"/>
                           <a:cs typeface="Arial"/>
-                          <a:ea typeface="Arial"/>
                           <a:sym typeface="Arial"/>
                         </a:rPr>
                         <a:t>Number of hospitals listed with PBSC collection</a:t>
                       </a:r>
                     </a:p>
                   </a:txBody>
-                  <a:tcPr anchor="ctr" marB="63500" marT="63500" marR="0" marL="0">
-                    <a:lnL algn="ctr" cmpd="sng" cap="flat" w="0">
+                  <a:tcPr marL="0" marR="0" marT="63500" marB="63500" anchor="ctr">
+                    <a:lnL w="0" cap="flat" cmpd="sng" algn="ctr">
                       <a:noFill/>
                       <a:prstDash val="solid"/>
                     </a:lnL>
-                    <a:lnR algn="ctr" cmpd="sng" cap="flat" w="0">
+                    <a:lnR w="0" cap="flat" cmpd="sng" algn="ctr">
                       <a:noFill/>
                       <a:prstDash val="solid"/>
                     </a:lnR>
-                    <a:lnT algn="ctr" cmpd="sng" cap="flat" w="0">
+                    <a:lnT w="0" cap="flat" cmpd="sng" algn="ctr">
                       <a:noFill/>
                       <a:prstDash val="solid"/>
                     </a:lnT>
-                    <a:lnB algn="ctr" cmpd="sng" cap="flat" w="0">
+                    <a:lnB w="0" cap="flat" cmpd="sng" algn="ctr">
                       <a:noFill/>
                       <a:prstDash val="solid"/>
                     </a:lnB>
@@ -5738,7 +6514,7 @@
                     <a:bodyPr/>
                     <a:lstStyle/>
                     <a:p>
-                      <a:pPr algn="ctr" marL="63500" marR="63500">
+                      <a:pPr marL="63500" marR="63500" algn="ctr">
                         <a:lnSpc>
                           <a:spcPct val="100000"/>
                         </a:lnSpc>
@@ -5751,7 +6527,7 @@
                         <a:buNone/>
                       </a:pPr>
                       <a:r>
-                        <a:rPr cap="none" sz="1100" i="0" b="0" u="none">
+                        <a:rPr sz="1100" b="0" i="0" u="none" cap="none">
                           <a:solidFill>
                             <a:srgbClr val="000000">
                               <a:alpha val="100000"/>
@@ -5759,27 +6535,26 @@
                           </a:solidFill>
                           <a:latin typeface="Arial"/>
                           <a:cs typeface="Arial"/>
-                          <a:ea typeface="Arial"/>
                           <a:sym typeface="Arial"/>
                         </a:rPr>
                         <a:t>0.16</a:t>
                       </a:r>
                     </a:p>
                   </a:txBody>
-                  <a:tcPr anchor="ctr" marB="63500" marT="63500" marR="0" marL="0">
-                    <a:lnL algn="ctr" cmpd="sng" cap="flat" w="0">
+                  <a:tcPr marL="0" marR="0" marT="63500" marB="63500" anchor="ctr">
+                    <a:lnL w="0" cap="flat" cmpd="sng" algn="ctr">
                       <a:noFill/>
                       <a:prstDash val="solid"/>
                     </a:lnL>
-                    <a:lnR algn="ctr" cmpd="sng" cap="flat" w="0">
+                    <a:lnR w="0" cap="flat" cmpd="sng" algn="ctr">
                       <a:noFill/>
                       <a:prstDash val="solid"/>
                     </a:lnR>
-                    <a:lnT algn="ctr" cmpd="sng" cap="flat" w="0">
+                    <a:lnT w="0" cap="flat" cmpd="sng" algn="ctr">
                       <a:noFill/>
                       <a:prstDash val="solid"/>
                     </a:lnT>
-                    <a:lnB algn="ctr" cmpd="sng" cap="flat" w="0">
+                    <a:lnB w="0" cap="flat" cmpd="sng" algn="ctr">
                       <a:noFill/>
                       <a:prstDash val="solid"/>
                     </a:lnB>
@@ -5795,7 +6570,7 @@
                     <a:bodyPr/>
                     <a:lstStyle/>
                     <a:p>
-                      <a:pPr algn="ctr" marL="63500" marR="63500">
+                      <a:pPr marL="63500" marR="63500" algn="ctr">
                         <a:lnSpc>
                           <a:spcPct val="100000"/>
                         </a:lnSpc>
@@ -5808,7 +6583,7 @@
                         <a:buNone/>
                       </a:pPr>
                       <a:r>
-                        <a:rPr cap="none" sz="1100" i="0" b="0" u="none">
+                        <a:rPr sz="1100" b="0" i="0" u="none" cap="none">
                           <a:solidFill>
                             <a:srgbClr val="000000">
                               <a:alpha val="100000"/>
@@ -5816,27 +6591,26 @@
                           </a:solidFill>
                           <a:latin typeface="Arial"/>
                           <a:cs typeface="Arial"/>
-                          <a:ea typeface="Arial"/>
                           <a:sym typeface="Arial"/>
                         </a:rPr>
                         <a:t>0.13</a:t>
                       </a:r>
                     </a:p>
                   </a:txBody>
-                  <a:tcPr anchor="ctr" marB="63500" marT="63500" marR="0" marL="0">
-                    <a:lnL algn="ctr" cmpd="sng" cap="flat" w="0">
+                  <a:tcPr marL="0" marR="0" marT="63500" marB="63500" anchor="ctr">
+                    <a:lnL w="0" cap="flat" cmpd="sng" algn="ctr">
                       <a:noFill/>
                       <a:prstDash val="solid"/>
                     </a:lnL>
-                    <a:lnR algn="ctr" cmpd="sng" cap="flat" w="0">
+                    <a:lnR w="0" cap="flat" cmpd="sng" algn="ctr">
                       <a:noFill/>
                       <a:prstDash val="solid"/>
                     </a:lnR>
-                    <a:lnT algn="ctr" cmpd="sng" cap="flat" w="0">
+                    <a:lnT w="0" cap="flat" cmpd="sng" algn="ctr">
                       <a:noFill/>
                       <a:prstDash val="solid"/>
                     </a:lnT>
-                    <a:lnB algn="ctr" cmpd="sng" cap="flat" w="0">
+                    <a:lnB w="0" cap="flat" cmpd="sng" algn="ctr">
                       <a:noFill/>
                       <a:prstDash val="solid"/>
                     </a:lnB>
@@ -5852,7 +6626,7 @@
                     <a:bodyPr/>
                     <a:lstStyle/>
                     <a:p>
-                      <a:pPr algn="ctr" marL="63500" marR="63500">
+                      <a:pPr marL="63500" marR="63500" algn="ctr">
                         <a:lnSpc>
                           <a:spcPct val="100000"/>
                         </a:lnSpc>
@@ -5865,7 +6639,7 @@
                         <a:buNone/>
                       </a:pPr>
                       <a:r>
-                        <a:rPr cap="none" sz="1100" i="0" b="0" u="none">
+                        <a:rPr sz="1100" b="0" i="0" u="none" cap="none">
                           <a:solidFill>
                             <a:srgbClr val="000000">
                               <a:alpha val="100000"/>
@@ -5873,27 +6647,26 @@
                           </a:solidFill>
                           <a:latin typeface="Arial"/>
                           <a:cs typeface="Arial"/>
-                          <a:ea typeface="Arial"/>
                           <a:sym typeface="Arial"/>
                         </a:rPr>
                         <a:t>0.20</a:t>
                       </a:r>
                     </a:p>
                   </a:txBody>
-                  <a:tcPr anchor="ctr" marB="63500" marT="63500" marR="0" marL="0">
-                    <a:lnL algn="ctr" cmpd="sng" cap="flat" w="0">
+                  <a:tcPr marL="0" marR="0" marT="63500" marB="63500" anchor="ctr">
+                    <a:lnL w="0" cap="flat" cmpd="sng" algn="ctr">
                       <a:noFill/>
                       <a:prstDash val="solid"/>
                     </a:lnL>
-                    <a:lnR algn="ctr" cmpd="sng" cap="flat" w="0">
+                    <a:lnR w="0" cap="flat" cmpd="sng" algn="ctr">
                       <a:noFill/>
                       <a:prstDash val="solid"/>
                     </a:lnR>
-                    <a:lnT algn="ctr" cmpd="sng" cap="flat" w="0">
+                    <a:lnT w="0" cap="flat" cmpd="sng" algn="ctr">
                       <a:noFill/>
                       <a:prstDash val="solid"/>
                     </a:lnT>
-                    <a:lnB algn="ctr" cmpd="sng" cap="flat" w="0">
+                    <a:lnB w="0" cap="flat" cmpd="sng" algn="ctr">
                       <a:noFill/>
                       <a:prstDash val="solid"/>
                     </a:lnB>
@@ -5904,6 +6677,11 @@
                     </a:solidFill>
                   </a:tcPr>
                 </a:tc>
+                <a:extLst>
+                  <a:ext uri="{0D108BD9-81ED-4DB2-BD59-A6C34878D82A}">
+                    <a16:rowId xmlns:a16="http://schemas.microsoft.com/office/drawing/2014/main" val="10005"/>
+                  </a:ext>
+                </a:extLst>
               </a:tr>
               <a:tr h="228600">
                 <a:tc>
@@ -5911,7 +6689,7 @@
                     <a:bodyPr/>
                     <a:lstStyle/>
                     <a:p>
-                      <a:pPr algn="l" marL="63500" marR="63500">
+                      <a:pPr marL="63500" marR="63500" algn="l">
                         <a:lnSpc>
                           <a:spcPct val="100000"/>
                         </a:lnSpc>
@@ -5924,7 +6702,7 @@
                         <a:buNone/>
                       </a:pPr>
                       <a:r>
-                        <a:rPr cap="none" sz="1100" i="0" b="0" u="none">
+                        <a:rPr sz="1100" b="0" i="0" u="none" cap="none">
                           <a:solidFill>
                             <a:srgbClr val="000000">
                               <a:alpha val="100000"/>
@@ -5932,27 +6710,26 @@
                           </a:solidFill>
                           <a:latin typeface="Arial"/>
                           <a:cs typeface="Arial"/>
-                          <a:ea typeface="Arial"/>
                           <a:sym typeface="Arial"/>
                         </a:rPr>
                         <a:t>Number of hospitals listed with BM collection</a:t>
                       </a:r>
                     </a:p>
                   </a:txBody>
-                  <a:tcPr anchor="ctr" marB="63500" marT="63500" marR="0" marL="0">
-                    <a:lnL algn="ctr" cmpd="sng" cap="flat" w="0">
+                  <a:tcPr marL="0" marR="0" marT="63500" marB="63500" anchor="ctr">
+                    <a:lnL w="0" cap="flat" cmpd="sng" algn="ctr">
                       <a:noFill/>
                       <a:prstDash val="solid"/>
                     </a:lnL>
-                    <a:lnR algn="ctr" cmpd="sng" cap="flat" w="0">
+                    <a:lnR w="0" cap="flat" cmpd="sng" algn="ctr">
                       <a:noFill/>
                       <a:prstDash val="solid"/>
                     </a:lnR>
-                    <a:lnT algn="ctr" cmpd="sng" cap="flat" w="0">
+                    <a:lnT w="0" cap="flat" cmpd="sng" algn="ctr">
                       <a:noFill/>
                       <a:prstDash val="solid"/>
                     </a:lnT>
-                    <a:lnB algn="ctr" cmpd="sng" cap="flat" w="0">
+                    <a:lnB w="0" cap="flat" cmpd="sng" algn="ctr">
                       <a:noFill/>
                       <a:prstDash val="solid"/>
                     </a:lnB>
@@ -5968,7 +6745,7 @@
                     <a:bodyPr/>
                     <a:lstStyle/>
                     <a:p>
-                      <a:pPr algn="ctr" marL="63500" marR="63500">
+                      <a:pPr marL="63500" marR="63500" algn="ctr">
                         <a:lnSpc>
                           <a:spcPct val="100000"/>
                         </a:lnSpc>
@@ -5981,7 +6758,7 @@
                         <a:buNone/>
                       </a:pPr>
                       <a:r>
-                        <a:rPr cap="none" sz="1100" i="0" b="0" u="none">
+                        <a:rPr sz="1100" b="0" i="0" u="none" cap="none">
                           <a:solidFill>
                             <a:srgbClr val="000000">
                               <a:alpha val="100000"/>
@@ -5989,27 +6766,26 @@
                           </a:solidFill>
                           <a:latin typeface="Arial"/>
                           <a:cs typeface="Arial"/>
-                          <a:ea typeface="Arial"/>
                           <a:sym typeface="Arial"/>
                         </a:rPr>
                         <a:t>0.24</a:t>
                       </a:r>
                     </a:p>
                   </a:txBody>
-                  <a:tcPr anchor="ctr" marB="63500" marT="63500" marR="0" marL="0">
-                    <a:lnL algn="ctr" cmpd="sng" cap="flat" w="0">
+                  <a:tcPr marL="0" marR="0" marT="63500" marB="63500" anchor="ctr">
+                    <a:lnL w="0" cap="flat" cmpd="sng" algn="ctr">
                       <a:noFill/>
                       <a:prstDash val="solid"/>
                     </a:lnL>
-                    <a:lnR algn="ctr" cmpd="sng" cap="flat" w="0">
+                    <a:lnR w="0" cap="flat" cmpd="sng" algn="ctr">
                       <a:noFill/>
                       <a:prstDash val="solid"/>
                     </a:lnR>
-                    <a:lnT algn="ctr" cmpd="sng" cap="flat" w="0">
+                    <a:lnT w="0" cap="flat" cmpd="sng" algn="ctr">
                       <a:noFill/>
                       <a:prstDash val="solid"/>
                     </a:lnT>
-                    <a:lnB algn="ctr" cmpd="sng" cap="flat" w="0">
+                    <a:lnB w="0" cap="flat" cmpd="sng" algn="ctr">
                       <a:noFill/>
                       <a:prstDash val="solid"/>
                     </a:lnB>
@@ -6025,7 +6801,7 @@
                     <a:bodyPr/>
                     <a:lstStyle/>
                     <a:p>
-                      <a:pPr algn="ctr" marL="63500" marR="63500">
+                      <a:pPr marL="63500" marR="63500" algn="ctr">
                         <a:lnSpc>
                           <a:spcPct val="100000"/>
                         </a:lnSpc>
@@ -6038,7 +6814,7 @@
                         <a:buNone/>
                       </a:pPr>
                       <a:r>
-                        <a:rPr cap="none" sz="1100" i="0" b="0" u="none">
+                        <a:rPr sz="1100" b="0" i="0" u="none" cap="none">
                           <a:solidFill>
                             <a:srgbClr val="000000">
                               <a:alpha val="100000"/>
@@ -6046,27 +6822,26 @@
                           </a:solidFill>
                           <a:latin typeface="Arial"/>
                           <a:cs typeface="Arial"/>
-                          <a:ea typeface="Arial"/>
                           <a:sym typeface="Arial"/>
                         </a:rPr>
                         <a:t>0.20</a:t>
                       </a:r>
                     </a:p>
                   </a:txBody>
-                  <a:tcPr anchor="ctr" marB="63500" marT="63500" marR="0" marL="0">
-                    <a:lnL algn="ctr" cmpd="sng" cap="flat" w="0">
+                  <a:tcPr marL="0" marR="0" marT="63500" marB="63500" anchor="ctr">
+                    <a:lnL w="0" cap="flat" cmpd="sng" algn="ctr">
                       <a:noFill/>
                       <a:prstDash val="solid"/>
                     </a:lnL>
-                    <a:lnR algn="ctr" cmpd="sng" cap="flat" w="0">
+                    <a:lnR w="0" cap="flat" cmpd="sng" algn="ctr">
                       <a:noFill/>
                       <a:prstDash val="solid"/>
                     </a:lnR>
-                    <a:lnT algn="ctr" cmpd="sng" cap="flat" w="0">
+                    <a:lnT w="0" cap="flat" cmpd="sng" algn="ctr">
                       <a:noFill/>
                       <a:prstDash val="solid"/>
                     </a:lnT>
-                    <a:lnB algn="ctr" cmpd="sng" cap="flat" w="0">
+                    <a:lnB w="0" cap="flat" cmpd="sng" algn="ctr">
                       <a:noFill/>
                       <a:prstDash val="solid"/>
                     </a:lnB>
@@ -6082,7 +6857,7 @@
                     <a:bodyPr/>
                     <a:lstStyle/>
                     <a:p>
-                      <a:pPr algn="ctr" marL="63500" marR="63500">
+                      <a:pPr marL="63500" marR="63500" algn="ctr">
                         <a:lnSpc>
                           <a:spcPct val="100000"/>
                         </a:lnSpc>
@@ -6095,7 +6870,7 @@
                         <a:buNone/>
                       </a:pPr>
                       <a:r>
-                        <a:rPr cap="none" sz="1100" i="0" b="0" u="none">
+                        <a:rPr sz="1100" b="0" i="0" u="none" cap="none">
                           <a:solidFill>
                             <a:srgbClr val="000000">
                               <a:alpha val="100000"/>
@@ -6103,27 +6878,26 @@
                           </a:solidFill>
                           <a:latin typeface="Arial"/>
                           <a:cs typeface="Arial"/>
-                          <a:ea typeface="Arial"/>
                           <a:sym typeface="Arial"/>
                         </a:rPr>
                         <a:t>0.31</a:t>
                       </a:r>
                     </a:p>
                   </a:txBody>
-                  <a:tcPr anchor="ctr" marB="63500" marT="63500" marR="0" marL="0">
-                    <a:lnL algn="ctr" cmpd="sng" cap="flat" w="0">
+                  <a:tcPr marL="0" marR="0" marT="63500" marB="63500" anchor="ctr">
+                    <a:lnL w="0" cap="flat" cmpd="sng" algn="ctr">
                       <a:noFill/>
                       <a:prstDash val="solid"/>
                     </a:lnL>
-                    <a:lnR algn="ctr" cmpd="sng" cap="flat" w="0">
+                    <a:lnR w="0" cap="flat" cmpd="sng" algn="ctr">
                       <a:noFill/>
                       <a:prstDash val="solid"/>
                     </a:lnR>
-                    <a:lnT algn="ctr" cmpd="sng" cap="flat" w="0">
+                    <a:lnT w="0" cap="flat" cmpd="sng" algn="ctr">
                       <a:noFill/>
                       <a:prstDash val="solid"/>
                     </a:lnT>
-                    <a:lnB algn="ctr" cmpd="sng" cap="flat" w="0">
+                    <a:lnB w="0" cap="flat" cmpd="sng" algn="ctr">
                       <a:noFill/>
                       <a:prstDash val="solid"/>
                     </a:lnB>
@@ -6134,6 +6908,11 @@
                     </a:solidFill>
                   </a:tcPr>
                 </a:tc>
+                <a:extLst>
+                  <a:ext uri="{0D108BD9-81ED-4DB2-BD59-A6C34878D82A}">
+                    <a16:rowId xmlns:a16="http://schemas.microsoft.com/office/drawing/2014/main" val="10006"/>
+                  </a:ext>
+                </a:extLst>
               </a:tr>
               <a:tr h="228600">
                 <a:tc>
@@ -6141,7 +6920,7 @@
                     <a:bodyPr/>
                     <a:lstStyle/>
                     <a:p>
-                      <a:pPr algn="l" marL="63500" marR="63500">
+                      <a:pPr marL="63500" marR="63500" algn="l">
                         <a:lnSpc>
                           <a:spcPct val="100000"/>
                         </a:lnSpc>
@@ -6154,7 +6933,7 @@
                         <a:buNone/>
                       </a:pPr>
                       <a:r>
-                        <a:rPr cap="none" sz="1100" i="0" b="0" u="none">
+                        <a:rPr sz="1100" b="0" i="0" u="none" cap="none">
                           <a:solidFill>
                             <a:srgbClr val="000000">
                               <a:alpha val="100000"/>
@@ -6162,27 +6941,26 @@
                           </a:solidFill>
                           <a:latin typeface="Arial"/>
                           <a:cs typeface="Arial"/>
-                          <a:ea typeface="Arial"/>
                           <a:sym typeface="Arial"/>
                         </a:rPr>
                         <a:t>N</a:t>
                       </a:r>
                     </a:p>
                   </a:txBody>
-                  <a:tcPr anchor="ctr" marB="63500" marT="63500" marR="0" marL="0">
-                    <a:lnL algn="ctr" cmpd="sng" cap="flat" w="0">
+                  <a:tcPr marL="0" marR="0" marT="63500" marB="63500" anchor="ctr">
+                    <a:lnL w="0" cap="flat" cmpd="sng" algn="ctr">
                       <a:noFill/>
                       <a:prstDash val="solid"/>
                     </a:lnL>
-                    <a:lnR algn="ctr" cmpd="sng" cap="flat" w="0">
+                    <a:lnR w="0" cap="flat" cmpd="sng" algn="ctr">
                       <a:noFill/>
                       <a:prstDash val="solid"/>
                     </a:lnR>
-                    <a:lnT algn="ctr" cmpd="sng" cap="flat" w="0">
+                    <a:lnT w="0" cap="flat" cmpd="sng" algn="ctr">
                       <a:noFill/>
                       <a:prstDash val="solid"/>
                     </a:lnT>
-                    <a:lnB algn="ctr" cmpd="sng" cap="flat" w="12700">
+                    <a:lnB w="12700" cap="flat" cmpd="sng" algn="ctr">
                       <a:solidFill>
                         <a:srgbClr val="000000">
                           <a:alpha val="100000"/>
@@ -6202,7 +6980,7 @@
                     <a:bodyPr/>
                     <a:lstStyle/>
                     <a:p>
-                      <a:pPr algn="ctr" marL="63500" marR="63500">
+                      <a:pPr marL="63500" marR="63500" algn="ctr">
                         <a:lnSpc>
                           <a:spcPct val="100000"/>
                         </a:lnSpc>
@@ -6215,7 +6993,7 @@
                         <a:buNone/>
                       </a:pPr>
                       <a:r>
-                        <a:rPr cap="none" sz="1100" i="0" b="0" u="none">
+                        <a:rPr sz="1100" b="0" i="0" u="none" cap="none">
                           <a:solidFill>
                             <a:srgbClr val="000000">
                               <a:alpha val="100000"/>
@@ -6223,27 +7001,26 @@
                           </a:solidFill>
                           <a:latin typeface="Arial"/>
                           <a:cs typeface="Arial"/>
-                          <a:ea typeface="Arial"/>
                           <a:sym typeface="Arial"/>
                         </a:rPr>
                         <a:t>4980</a:t>
                       </a:r>
                     </a:p>
                   </a:txBody>
-                  <a:tcPr anchor="ctr" marB="63500" marT="63500" marR="0" marL="0">
-                    <a:lnL algn="ctr" cmpd="sng" cap="flat" w="0">
+                  <a:tcPr marL="0" marR="0" marT="63500" marB="63500" anchor="ctr">
+                    <a:lnL w="0" cap="flat" cmpd="sng" algn="ctr">
                       <a:noFill/>
                       <a:prstDash val="solid"/>
                     </a:lnL>
-                    <a:lnR algn="ctr" cmpd="sng" cap="flat" w="0">
+                    <a:lnR w="0" cap="flat" cmpd="sng" algn="ctr">
                       <a:noFill/>
                       <a:prstDash val="solid"/>
                     </a:lnR>
-                    <a:lnT algn="ctr" cmpd="sng" cap="flat" w="0">
+                    <a:lnT w="0" cap="flat" cmpd="sng" algn="ctr">
                       <a:noFill/>
                       <a:prstDash val="solid"/>
                     </a:lnT>
-                    <a:lnB algn="ctr" cmpd="sng" cap="flat" w="12700">
+                    <a:lnB w="12700" cap="flat" cmpd="sng" algn="ctr">
                       <a:solidFill>
                         <a:srgbClr val="000000">
                           <a:alpha val="100000"/>
@@ -6263,7 +7040,7 @@
                     <a:bodyPr/>
                     <a:lstStyle/>
                     <a:p>
-                      <a:pPr algn="ctr" marL="63500" marR="63500">
+                      <a:pPr marL="63500" marR="63500" algn="ctr">
                         <a:lnSpc>
                           <a:spcPct val="100000"/>
                         </a:lnSpc>
@@ -6276,7 +7053,7 @@
                         <a:buNone/>
                       </a:pPr>
                       <a:r>
-                        <a:rPr cap="none" sz="1100" i="0" b="0" u="none">
+                        <a:rPr sz="1100" b="0" i="0" u="none" cap="none">
                           <a:solidFill>
                             <a:srgbClr val="000000">
                               <a:alpha val="100000"/>
@@ -6284,27 +7061,26 @@
                           </a:solidFill>
                           <a:latin typeface="Arial"/>
                           <a:cs typeface="Arial"/>
-                          <a:ea typeface="Arial"/>
                           <a:sym typeface="Arial"/>
                         </a:rPr>
                         <a:t>2728</a:t>
                       </a:r>
                     </a:p>
                   </a:txBody>
-                  <a:tcPr anchor="ctr" marB="63500" marT="63500" marR="0" marL="0">
-                    <a:lnL algn="ctr" cmpd="sng" cap="flat" w="0">
+                  <a:tcPr marL="0" marR="0" marT="63500" marB="63500" anchor="ctr">
+                    <a:lnL w="0" cap="flat" cmpd="sng" algn="ctr">
                       <a:noFill/>
                       <a:prstDash val="solid"/>
                     </a:lnL>
-                    <a:lnR algn="ctr" cmpd="sng" cap="flat" w="0">
+                    <a:lnR w="0" cap="flat" cmpd="sng" algn="ctr">
                       <a:noFill/>
                       <a:prstDash val="solid"/>
                     </a:lnR>
-                    <a:lnT algn="ctr" cmpd="sng" cap="flat" w="0">
+                    <a:lnT w="0" cap="flat" cmpd="sng" algn="ctr">
                       <a:noFill/>
                       <a:prstDash val="solid"/>
                     </a:lnT>
-                    <a:lnB algn="ctr" cmpd="sng" cap="flat" w="12700">
+                    <a:lnB w="12700" cap="flat" cmpd="sng" algn="ctr">
                       <a:solidFill>
                         <a:srgbClr val="000000">
                           <a:alpha val="100000"/>
@@ -6324,7 +7100,7 @@
                     <a:bodyPr/>
                     <a:lstStyle/>
                     <a:p>
-                      <a:pPr algn="ctr" marL="63500" marR="63500">
+                      <a:pPr marL="63500" marR="63500" algn="ctr">
                         <a:lnSpc>
                           <a:spcPct val="100000"/>
                         </a:lnSpc>
@@ -6337,7 +7113,7 @@
                         <a:buNone/>
                       </a:pPr>
                       <a:r>
-                        <a:rPr cap="none" sz="1100" i="0" b="0" u="none">
+                        <a:rPr sz="1100" b="0" i="0" u="none" cap="none">
                           <a:solidFill>
                             <a:srgbClr val="000000">
                               <a:alpha val="100000"/>
@@ -6345,27 +7121,26 @@
                           </a:solidFill>
                           <a:latin typeface="Arial"/>
                           <a:cs typeface="Arial"/>
-                          <a:ea typeface="Arial"/>
                           <a:sym typeface="Arial"/>
                         </a:rPr>
                         <a:t>3341</a:t>
                       </a:r>
                     </a:p>
                   </a:txBody>
-                  <a:tcPr anchor="ctr" marB="63500" marT="63500" marR="0" marL="0">
-                    <a:lnL algn="ctr" cmpd="sng" cap="flat" w="0">
+                  <a:tcPr marL="0" marR="0" marT="63500" marB="63500" anchor="ctr">
+                    <a:lnL w="0" cap="flat" cmpd="sng" algn="ctr">
                       <a:noFill/>
                       <a:prstDash val="solid"/>
                     </a:lnL>
-                    <a:lnR algn="ctr" cmpd="sng" cap="flat" w="0">
+                    <a:lnR w="0" cap="flat" cmpd="sng" algn="ctr">
                       <a:noFill/>
                       <a:prstDash val="solid"/>
                     </a:lnR>
-                    <a:lnT algn="ctr" cmpd="sng" cap="flat" w="0">
+                    <a:lnT w="0" cap="flat" cmpd="sng" algn="ctr">
                       <a:noFill/>
                       <a:prstDash val="solid"/>
                     </a:lnT>
-                    <a:lnB algn="ctr" cmpd="sng" cap="flat" w="12700">
+                    <a:lnB w="12700" cap="flat" cmpd="sng" algn="ctr">
                       <a:solidFill>
                         <a:srgbClr val="000000">
                           <a:alpha val="100000"/>
@@ -6380,6 +7155,11 @@
                     </a:solidFill>
                   </a:tcPr>
                 </a:tc>
+                <a:extLst>
+                  <a:ext uri="{0D108BD9-81ED-4DB2-BD59-A6C34878D82A}">
+                    <a16:rowId xmlns:a16="http://schemas.microsoft.com/office/drawing/2014/main" val="10007"/>
+                  </a:ext>
+                </a:extLst>
               </a:tr>
             </a:tbl>
           </a:graphicData>
@@ -6387,6 +7167,9 @@
       </p:graphicFrame>
     </p:spTree>
   </p:cSld>
+  <p:clrMapOvr>
+    <a:masterClrMapping/>
+  </p:clrMapOvr>
 </p:sld>
 </file>
 
@@ -6422,11 +7205,10 @@
           <a:bodyPr/>
           <a:lstStyle/>
           <a:p>
-            <a:pPr lvl="0" indent="0" marL="0">
+            <a:pPr marL="0" lvl="0" indent="0">
               <a:buNone/>
             </a:pPr>
             <a:r>
-              <a:rPr/>
               <a:t>個人属性の分布</a:t>
             </a:r>
           </a:p>
@@ -6434,7 +7216,7 @@
       </p:sp>
       <p:pic>
         <p:nvPicPr>
-          <p:cNvPr descr="targeting_files/figure-pptx/chacteristics-targeting-dist-1.png" id="0" name="Picture 1"/>
+          <p:cNvPr id="3" name="Picture 1" descr="targeting_files/figure-pptx/chacteristics-targeting-dist-1.png"/>
           <p:cNvPicPr>
             <a:picLocks noGrp="1" noChangeAspect="1"/>
           </p:cNvPicPr>
@@ -6464,6 +7246,9 @@
       </p:pic>
     </p:spTree>
   </p:cSld>
+  <p:clrMapOvr>
+    <a:masterClrMapping/>
+  </p:clrMapOvr>
 </p:sld>
 </file>
 
@@ -6785,265 +7570,4 @@
   </a:objectDefaults>
   <a:extraClrSchemeLst/>
 </a:theme>
-</file>
-
-<file path=ppt/theme/theme2.xml><?xml version="1.0" encoding="utf-8"?>
-<a:theme xmlns:a="http://schemas.openxmlformats.org/drawingml/2006/main" name="Office Theme">
-  <a:themeElements>
-    <a:clrScheme name="Office">
-      <a:dk1>
-        <a:sysClr val="windowText" lastClr="000000"/>
-      </a:dk1>
-      <a:lt1>
-        <a:sysClr val="window" lastClr="FFFFFF"/>
-      </a:lt1>
-      <a:dk2>
-        <a:srgbClr val="44546A"/>
-      </a:dk2>
-      <a:lt2>
-        <a:srgbClr val="E7E6E6"/>
-      </a:lt2>
-      <a:accent1>
-        <a:srgbClr val="5B9BD5"/>
-      </a:accent1>
-      <a:accent2>
-        <a:srgbClr val="ED7D31"/>
-      </a:accent2>
-      <a:accent3>
-        <a:srgbClr val="A5A5A5"/>
-      </a:accent3>
-      <a:accent4>
-        <a:srgbClr val="FFC000"/>
-      </a:accent4>
-      <a:accent5>
-        <a:srgbClr val="4472C4"/>
-      </a:accent5>
-      <a:accent6>
-        <a:srgbClr val="70AD47"/>
-      </a:accent6>
-      <a:hlink>
-        <a:srgbClr val="0563C1"/>
-      </a:hlink>
-      <a:folHlink>
-        <a:srgbClr val="954F72"/>
-      </a:folHlink>
-    </a:clrScheme>
-    <a:fontScheme name="Office">
-      <a:majorFont>
-        <a:latin typeface="Calibri Light" panose="020F0302020204030204"/>
-        <a:ea typeface=""/>
-        <a:cs typeface=""/>
-        <a:font script="Jpan" typeface="ＭＳ Ｐゴシック"/>
-        <a:font script="Hang" typeface="맑은 고딕"/>
-        <a:font script="Hans" typeface="宋体"/>
-        <a:font script="Hant" typeface="新細明體"/>
-        <a:font script="Arab" typeface="Times New Roman"/>
-        <a:font script="Hebr" typeface="Times New Roman"/>
-        <a:font script="Thai" typeface="Angsana New"/>
-        <a:font script="Ethi" typeface="Nyala"/>
-        <a:font script="Beng" typeface="Vrinda"/>
-        <a:font script="Gujr" typeface="Shruti"/>
-        <a:font script="Khmr" typeface="MoolBoran"/>
-        <a:font script="Knda" typeface="Tunga"/>
-        <a:font script="Guru" typeface="Raavi"/>
-        <a:font script="Cans" typeface="Euphemia"/>
-        <a:font script="Cher" typeface="Plantagenet Cherokee"/>
-        <a:font script="Yiii" typeface="Microsoft Yi Baiti"/>
-        <a:font script="Tibt" typeface="Microsoft Himalaya"/>
-        <a:font script="Thaa" typeface="MV Boli"/>
-        <a:font script="Deva" typeface="Mangal"/>
-        <a:font script="Telu" typeface="Gautami"/>
-        <a:font script="Taml" typeface="Latha"/>
-        <a:font script="Syrc" typeface="Estrangelo Edessa"/>
-        <a:font script="Orya" typeface="Kalinga"/>
-        <a:font script="Mlym" typeface="Kartika"/>
-        <a:font script="Laoo" typeface="DokChampa"/>
-        <a:font script="Sinh" typeface="Iskoola Pota"/>
-        <a:font script="Mong" typeface="Mongolian Baiti"/>
-        <a:font script="Viet" typeface="Times New Roman"/>
-        <a:font script="Uigh" typeface="Microsoft Uighur"/>
-        <a:font script="Geor" typeface="Sylfaen"/>
-      </a:majorFont>
-      <a:minorFont>
-        <a:latin typeface="Calibri" panose="020F0502020204030204"/>
-        <a:ea typeface=""/>
-        <a:cs typeface=""/>
-        <a:font script="Jpan" typeface="ＭＳ Ｐゴシック"/>
-        <a:font script="Hang" typeface="맑은 고딕"/>
-        <a:font script="Hans" typeface="宋体"/>
-        <a:font script="Hant" typeface="新細明體"/>
-        <a:font script="Arab" typeface="Arial"/>
-        <a:font script="Hebr" typeface="Arial"/>
-        <a:font script="Thai" typeface="Cordia New"/>
-        <a:font script="Ethi" typeface="Nyala"/>
-        <a:font script="Beng" typeface="Vrinda"/>
-        <a:font script="Gujr" typeface="Shruti"/>
-        <a:font script="Khmr" typeface="DaunPenh"/>
-        <a:font script="Knda" typeface="Tunga"/>
-        <a:font script="Guru" typeface="Raavi"/>
-        <a:font script="Cans" typeface="Euphemia"/>
-        <a:font script="Cher" typeface="Plantagenet Cherokee"/>
-        <a:font script="Yiii" typeface="Microsoft Yi Baiti"/>
-        <a:font script="Tibt" typeface="Microsoft Himalaya"/>
-        <a:font script="Thaa" typeface="MV Boli"/>
-        <a:font script="Deva" typeface="Mangal"/>
-        <a:font script="Telu" typeface="Gautami"/>
-        <a:font script="Taml" typeface="Latha"/>
-        <a:font script="Syrc" typeface="Estrangelo Edessa"/>
-        <a:font script="Orya" typeface="Kalinga"/>
-        <a:font script="Mlym" typeface="Kartika"/>
-        <a:font script="Laoo" typeface="DokChampa"/>
-        <a:font script="Sinh" typeface="Iskoola Pota"/>
-        <a:font script="Mong" typeface="Mongolian Baiti"/>
-        <a:font script="Viet" typeface="Arial"/>
-        <a:font script="Uigh" typeface="Microsoft Uighur"/>
-        <a:font script="Geor" typeface="Sylfaen"/>
-      </a:minorFont>
-    </a:fontScheme>
-    <a:fmtScheme name="Office">
-      <a:fillStyleLst>
-        <a:solidFill>
-          <a:schemeClr val="phClr"/>
-        </a:solidFill>
-        <a:gradFill rotWithShape="1">
-          <a:gsLst>
-            <a:gs pos="0">
-              <a:schemeClr val="phClr">
-                <a:lumMod val="110000"/>
-                <a:satMod val="105000"/>
-                <a:tint val="67000"/>
-              </a:schemeClr>
-            </a:gs>
-            <a:gs pos="50000">
-              <a:schemeClr val="phClr">
-                <a:lumMod val="105000"/>
-                <a:satMod val="103000"/>
-                <a:tint val="73000"/>
-              </a:schemeClr>
-            </a:gs>
-            <a:gs pos="100000">
-              <a:schemeClr val="phClr">
-                <a:lumMod val="105000"/>
-                <a:satMod val="109000"/>
-                <a:tint val="81000"/>
-              </a:schemeClr>
-            </a:gs>
-          </a:gsLst>
-          <a:lin ang="5400000" scaled="0"/>
-        </a:gradFill>
-        <a:gradFill rotWithShape="1">
-          <a:gsLst>
-            <a:gs pos="0">
-              <a:schemeClr val="phClr">
-                <a:satMod val="103000"/>
-                <a:lumMod val="102000"/>
-                <a:tint val="94000"/>
-              </a:schemeClr>
-            </a:gs>
-            <a:gs pos="50000">
-              <a:schemeClr val="phClr">
-                <a:satMod val="110000"/>
-                <a:lumMod val="100000"/>
-                <a:shade val="100000"/>
-              </a:schemeClr>
-            </a:gs>
-            <a:gs pos="100000">
-              <a:schemeClr val="phClr">
-                <a:lumMod val="99000"/>
-                <a:satMod val="120000"/>
-                <a:shade val="78000"/>
-              </a:schemeClr>
-            </a:gs>
-          </a:gsLst>
-          <a:lin ang="5400000" scaled="0"/>
-        </a:gradFill>
-      </a:fillStyleLst>
-      <a:lnStyleLst>
-        <a:ln w="6350" cap="flat" cmpd="sng" algn="ctr">
-          <a:solidFill>
-            <a:schemeClr val="phClr"/>
-          </a:solidFill>
-          <a:prstDash val="solid"/>
-          <a:miter lim="800000"/>
-        </a:ln>
-        <a:ln w="12700" cap="flat" cmpd="sng" algn="ctr">
-          <a:solidFill>
-            <a:schemeClr val="phClr"/>
-          </a:solidFill>
-          <a:prstDash val="solid"/>
-          <a:miter lim="800000"/>
-        </a:ln>
-        <a:ln w="19050" cap="flat" cmpd="sng" algn="ctr">
-          <a:solidFill>
-            <a:schemeClr val="phClr"/>
-          </a:solidFill>
-          <a:prstDash val="solid"/>
-          <a:miter lim="800000"/>
-        </a:ln>
-      </a:lnStyleLst>
-      <a:effectStyleLst>
-        <a:effectStyle>
-          <a:effectLst/>
-        </a:effectStyle>
-        <a:effectStyle>
-          <a:effectLst/>
-        </a:effectStyle>
-        <a:effectStyle>
-          <a:effectLst>
-            <a:outerShdw blurRad="57150" dist="19050" dir="5400000" algn="ctr" rotWithShape="0">
-              <a:srgbClr val="000000">
-                <a:alpha val="63000"/>
-              </a:srgbClr>
-            </a:outerShdw>
-          </a:effectLst>
-        </a:effectStyle>
-      </a:effectStyleLst>
-      <a:bgFillStyleLst>
-        <a:solidFill>
-          <a:schemeClr val="phClr"/>
-        </a:solidFill>
-        <a:solidFill>
-          <a:schemeClr val="phClr">
-            <a:tint val="95000"/>
-            <a:satMod val="170000"/>
-          </a:schemeClr>
-        </a:solidFill>
-        <a:gradFill rotWithShape="1">
-          <a:gsLst>
-            <a:gs pos="0">
-              <a:schemeClr val="phClr">
-                <a:tint val="93000"/>
-                <a:satMod val="150000"/>
-                <a:shade val="98000"/>
-                <a:lumMod val="102000"/>
-              </a:schemeClr>
-            </a:gs>
-            <a:gs pos="50000">
-              <a:schemeClr val="phClr">
-                <a:tint val="98000"/>
-                <a:satMod val="130000"/>
-                <a:shade val="90000"/>
-                <a:lumMod val="103000"/>
-              </a:schemeClr>
-            </a:gs>
-            <a:gs pos="100000">
-              <a:schemeClr val="phClr">
-                <a:shade val="63000"/>
-                <a:satMod val="120000"/>
-              </a:schemeClr>
-            </a:gs>
-          </a:gsLst>
-          <a:lin ang="5400000" scaled="0"/>
-        </a:gradFill>
-      </a:bgFillStyleLst>
-    </a:fmtScheme>
-  </a:themeElements>
-  <a:objectDefaults/>
-  <a:extraClrSchemeLst/>
-  <a:extLst>
-    <a:ext uri="{05A4C25C-085E-4340-85A3-A5531E510DB2}">
-      <thm15:themeFamily xmlns:thm15="http://schemas.microsoft.com/office/thememl/2012/main" name="Office Theme" id="{62F939B6-93AF-4DB8-9C6B-D6C7DFDC589F}" vid="{4A3C46E8-61CC-4603-A589-7422A47A8E4A}"/>
-    </a:ext>
-  </a:extLst>
-</a:theme>
 </file>
</xml_diff>